<commit_message>
subindo novo diagrama de software
</commit_message>
<xml_diff>
--- a/Documentação/arquitetura/diagrama_software.pptx
+++ b/Documentação/arquitetura/diagrama_software.pptx
@@ -6,6 +6,7 @@
   </p:sldMasterIdLst>
   <p:sldIdLst>
     <p:sldId id="257" r:id="rId2"/>
+    <p:sldId id="258" r:id="rId3"/>
   </p:sldIdLst>
   <p:sldSz cx="12192000" cy="6858000"/>
   <p:notesSz cx="6858000" cy="9144000"/>
@@ -104,6 +105,11 @@
       </a:defRPr>
     </a:lvl9pPr>
   </p:defaultTextStyle>
+  <p:extLst>
+    <p:ext uri="{EFAFB233-063F-42B5-8137-9DF3F51BA10A}">
+      <p15:sldGuideLst xmlns:p15="http://schemas.microsoft.com/office/powerpoint/2012/main"/>
+    </p:ext>
+  </p:extLst>
 </p:presentation>
 </file>
 
@@ -254,7 +260,7 @@
           <a:p>
             <a:fld id="{DFA6C581-6C24-4FE8-96B9-9DFD4212CBDB}" type="datetimeFigureOut">
               <a:rPr lang="pt-BR" smtClean="0"/>
-              <a:t>16/10/2021</a:t>
+              <a:t>03/11/2021</a:t>
             </a:fld>
             <a:endParaRPr lang="pt-BR"/>
           </a:p>
@@ -452,7 +458,7 @@
           <a:p>
             <a:fld id="{DFA6C581-6C24-4FE8-96B9-9DFD4212CBDB}" type="datetimeFigureOut">
               <a:rPr lang="pt-BR" smtClean="0"/>
-              <a:t>16/10/2021</a:t>
+              <a:t>03/11/2021</a:t>
             </a:fld>
             <a:endParaRPr lang="pt-BR"/>
           </a:p>
@@ -660,7 +666,7 @@
           <a:p>
             <a:fld id="{DFA6C581-6C24-4FE8-96B9-9DFD4212CBDB}" type="datetimeFigureOut">
               <a:rPr lang="pt-BR" smtClean="0"/>
-              <a:t>16/10/2021</a:t>
+              <a:t>03/11/2021</a:t>
             </a:fld>
             <a:endParaRPr lang="pt-BR"/>
           </a:p>
@@ -858,7 +864,7 @@
           <a:p>
             <a:fld id="{DFA6C581-6C24-4FE8-96B9-9DFD4212CBDB}" type="datetimeFigureOut">
               <a:rPr lang="pt-BR" smtClean="0"/>
-              <a:t>16/10/2021</a:t>
+              <a:t>03/11/2021</a:t>
             </a:fld>
             <a:endParaRPr lang="pt-BR"/>
           </a:p>
@@ -1133,7 +1139,7 @@
           <a:p>
             <a:fld id="{DFA6C581-6C24-4FE8-96B9-9DFD4212CBDB}" type="datetimeFigureOut">
               <a:rPr lang="pt-BR" smtClean="0"/>
-              <a:t>16/10/2021</a:t>
+              <a:t>03/11/2021</a:t>
             </a:fld>
             <a:endParaRPr lang="pt-BR"/>
           </a:p>
@@ -1398,7 +1404,7 @@
           <a:p>
             <a:fld id="{DFA6C581-6C24-4FE8-96B9-9DFD4212CBDB}" type="datetimeFigureOut">
               <a:rPr lang="pt-BR" smtClean="0"/>
-              <a:t>16/10/2021</a:t>
+              <a:t>03/11/2021</a:t>
             </a:fld>
             <a:endParaRPr lang="pt-BR"/>
           </a:p>
@@ -1810,7 +1816,7 @@
           <a:p>
             <a:fld id="{DFA6C581-6C24-4FE8-96B9-9DFD4212CBDB}" type="datetimeFigureOut">
               <a:rPr lang="pt-BR" smtClean="0"/>
-              <a:t>16/10/2021</a:t>
+              <a:t>03/11/2021</a:t>
             </a:fld>
             <a:endParaRPr lang="pt-BR"/>
           </a:p>
@@ -1951,7 +1957,7 @@
           <a:p>
             <a:fld id="{DFA6C581-6C24-4FE8-96B9-9DFD4212CBDB}" type="datetimeFigureOut">
               <a:rPr lang="pt-BR" smtClean="0"/>
-              <a:t>16/10/2021</a:t>
+              <a:t>03/11/2021</a:t>
             </a:fld>
             <a:endParaRPr lang="pt-BR"/>
           </a:p>
@@ -2064,7 +2070,7 @@
           <a:p>
             <a:fld id="{DFA6C581-6C24-4FE8-96B9-9DFD4212CBDB}" type="datetimeFigureOut">
               <a:rPr lang="pt-BR" smtClean="0"/>
-              <a:t>16/10/2021</a:t>
+              <a:t>03/11/2021</a:t>
             </a:fld>
             <a:endParaRPr lang="pt-BR"/>
           </a:p>
@@ -2375,7 +2381,7 @@
           <a:p>
             <a:fld id="{DFA6C581-6C24-4FE8-96B9-9DFD4212CBDB}" type="datetimeFigureOut">
               <a:rPr lang="pt-BR" smtClean="0"/>
-              <a:t>16/10/2021</a:t>
+              <a:t>03/11/2021</a:t>
             </a:fld>
             <a:endParaRPr lang="pt-BR"/>
           </a:p>
@@ -2663,7 +2669,7 @@
           <a:p>
             <a:fld id="{DFA6C581-6C24-4FE8-96B9-9DFD4212CBDB}" type="datetimeFigureOut">
               <a:rPr lang="pt-BR" smtClean="0"/>
-              <a:t>16/10/2021</a:t>
+              <a:t>03/11/2021</a:t>
             </a:fld>
             <a:endParaRPr lang="pt-BR"/>
           </a:p>
@@ -2904,7 +2910,7 @@
           <a:p>
             <a:fld id="{DFA6C581-6C24-4FE8-96B9-9DFD4212CBDB}" type="datetimeFigureOut">
               <a:rPr lang="pt-BR" smtClean="0"/>
-              <a:t>16/10/2021</a:t>
+              <a:t>03/11/2021</a:t>
             </a:fld>
             <a:endParaRPr lang="pt-BR"/>
           </a:p>
@@ -3815,7 +3821,7 @@
         </p:blipFill>
         <p:spPr bwMode="auto">
           <a:xfrm>
-            <a:off x="9438360" y="1856596"/>
+            <a:off x="9440176" y="1870886"/>
             <a:ext cx="886014" cy="822923"/>
           </a:xfrm>
           <a:prstGeom prst="rect">
@@ -4054,6 +4060,2078 @@
     <p:extLst>
       <p:ext uri="{BB962C8B-B14F-4D97-AF65-F5344CB8AC3E}">
         <p14:creationId xmlns:p14="http://schemas.microsoft.com/office/powerpoint/2010/main" val="2207464406"/>
+      </p:ext>
+    </p:extLst>
+  </p:cSld>
+  <p:clrMapOvr>
+    <a:masterClrMapping/>
+  </p:clrMapOvr>
+</p:sld>
+</file>
+
+<file path=ppt/slides/slide2.xml><?xml version="1.0" encoding="utf-8"?>
+<p:sld xmlns:a="http://schemas.openxmlformats.org/drawingml/2006/main" xmlns:r="http://schemas.openxmlformats.org/officeDocument/2006/relationships" xmlns:p="http://schemas.openxmlformats.org/presentationml/2006/main">
+  <p:cSld>
+    <p:spTree>
+      <p:nvGrpSpPr>
+        <p:cNvPr id="1" name=""/>
+        <p:cNvGrpSpPr/>
+        <p:nvPr/>
+      </p:nvGrpSpPr>
+      <p:grpSpPr>
+        <a:xfrm>
+          <a:off x="0" y="0"/>
+          <a:ext cx="0" cy="0"/>
+          <a:chOff x="0" y="0"/>
+          <a:chExt cx="0" cy="0"/>
+        </a:xfrm>
+      </p:grpSpPr>
+      <p:cxnSp>
+        <p:nvCxnSpPr>
+          <p:cNvPr id="152" name="Conector: Curvo 151">
+            <a:extLst>
+              <a:ext uri="{FF2B5EF4-FFF2-40B4-BE49-F238E27FC236}">
+                <a16:creationId xmlns:a16="http://schemas.microsoft.com/office/drawing/2014/main" id="{31D14FFE-E06D-4658-83F4-C3B8D42EDA06}"/>
+              </a:ext>
+            </a:extLst>
+          </p:cNvPr>
+          <p:cNvCxnSpPr>
+            <a:cxnSpLocks/>
+            <a:stCxn id="19" idx="3"/>
+            <a:endCxn id="5" idx="2"/>
+          </p:cNvCxnSpPr>
+          <p:nvPr/>
+        </p:nvCxnSpPr>
+        <p:spPr>
+          <a:xfrm flipV="1">
+            <a:off x="3008364" y="829779"/>
+            <a:ext cx="4426150" cy="3256858"/>
+          </a:xfrm>
+          <a:prstGeom prst="straightConnector1">
+            <a:avLst/>
+          </a:prstGeom>
+          <a:ln>
+            <a:headEnd type="triangle"/>
+            <a:tailEnd type="triangle"/>
+          </a:ln>
+          <a:effectLst>
+            <a:outerShdw blurRad="50800" dist="38100" dir="2700000" algn="tl" rotWithShape="0">
+              <a:prstClr val="black">
+                <a:alpha val="40000"/>
+              </a:prstClr>
+            </a:outerShdw>
+          </a:effectLst>
+        </p:spPr>
+        <p:style>
+          <a:lnRef idx="1">
+            <a:schemeClr val="dk1"/>
+          </a:lnRef>
+          <a:fillRef idx="0">
+            <a:schemeClr val="dk1"/>
+          </a:fillRef>
+          <a:effectRef idx="0">
+            <a:schemeClr val="dk1"/>
+          </a:effectRef>
+          <a:fontRef idx="minor">
+            <a:schemeClr val="tx1"/>
+          </a:fontRef>
+        </p:style>
+      </p:cxnSp>
+      <p:sp>
+        <p:nvSpPr>
+          <p:cNvPr id="5" name="Nuvem 4">
+            <a:extLst>
+              <a:ext uri="{FF2B5EF4-FFF2-40B4-BE49-F238E27FC236}">
+                <a16:creationId xmlns:a16="http://schemas.microsoft.com/office/drawing/2014/main" id="{7D8A9C01-6E8D-47BD-9576-47950182459D}"/>
+              </a:ext>
+            </a:extLst>
+          </p:cNvPr>
+          <p:cNvSpPr/>
+          <p:nvPr/>
+        </p:nvSpPr>
+        <p:spPr>
+          <a:xfrm>
+            <a:off x="7414058" y="-1442532"/>
+            <a:ext cx="6594787" cy="4544622"/>
+          </a:xfrm>
+          <a:prstGeom prst="cloud">
+            <a:avLst/>
+          </a:prstGeom>
+          <a:noFill/>
+          <a:ln w="9525" cap="flat" cmpd="sng" algn="ctr">
+            <a:solidFill>
+              <a:schemeClr val="dk1"/>
+            </a:solidFill>
+            <a:prstDash val="solid"/>
+            <a:round/>
+            <a:headEnd type="none" w="med" len="med"/>
+            <a:tailEnd type="none" w="med" len="med"/>
+          </a:ln>
+          <a:effectLst>
+            <a:outerShdw blurRad="50800" dist="38100" dir="2700000" algn="tl" rotWithShape="0">
+              <a:prstClr val="black">
+                <a:alpha val="40000"/>
+              </a:prstClr>
+            </a:outerShdw>
+          </a:effectLst>
+        </p:spPr>
+        <p:style>
+          <a:lnRef idx="0">
+            <a:scrgbClr r="0" g="0" b="0"/>
+          </a:lnRef>
+          <a:fillRef idx="0">
+            <a:scrgbClr r="0" g="0" b="0"/>
+          </a:fillRef>
+          <a:effectRef idx="0">
+            <a:scrgbClr r="0" g="0" b="0"/>
+          </a:effectRef>
+          <a:fontRef idx="minor">
+            <a:schemeClr val="dk1"/>
+          </a:fontRef>
+        </p:style>
+        <p:txBody>
+          <a:bodyPr rtlCol="0" anchor="ctr"/>
+          <a:lstStyle/>
+          <a:p>
+            <a:pPr algn="ctr"/>
+            <a:endParaRPr lang="pt-BR"/>
+          </a:p>
+        </p:txBody>
+      </p:sp>
+      <p:pic>
+        <p:nvPicPr>
+          <p:cNvPr id="9" name="Picture 22" descr="javascript grátis ícone">
+            <a:extLst>
+              <a:ext uri="{FF2B5EF4-FFF2-40B4-BE49-F238E27FC236}">
+                <a16:creationId xmlns:a16="http://schemas.microsoft.com/office/drawing/2014/main" id="{B79EA4E0-4A1A-4538-A3C4-C89499EEECDC}"/>
+              </a:ext>
+            </a:extLst>
+          </p:cNvPr>
+          <p:cNvPicPr>
+            <a:picLocks noChangeAspect="1" noChangeArrowheads="1"/>
+          </p:cNvPicPr>
+          <p:nvPr/>
+        </p:nvPicPr>
+        <p:blipFill>
+          <a:blip r:embed="rId2">
+            <a:extLst>
+              <a:ext uri="{28A0092B-C50C-407E-A947-70E740481C1C}">
+                <a14:useLocalDpi xmlns:a14="http://schemas.microsoft.com/office/drawing/2010/main" val="0"/>
+              </a:ext>
+            </a:extLst>
+          </a:blip>
+          <a:srcRect/>
+          <a:stretch>
+            <a:fillRect/>
+          </a:stretch>
+        </p:blipFill>
+        <p:spPr bwMode="auto">
+          <a:xfrm>
+            <a:off x="8603831" y="1651012"/>
+            <a:ext cx="886014" cy="822923"/>
+          </a:xfrm>
+          <a:prstGeom prst="rect">
+            <a:avLst/>
+          </a:prstGeom>
+          <a:noFill/>
+          <a:extLst>
+            <a:ext uri="{909E8E84-426E-40DD-AFC4-6F175D3DCCD1}">
+              <a14:hiddenFill xmlns:a14="http://schemas.microsoft.com/office/drawing/2010/main">
+                <a:solidFill>
+                  <a:srgbClr val="FFFFFF"/>
+                </a:solidFill>
+              </a14:hiddenFill>
+            </a:ext>
+          </a:extLst>
+        </p:spPr>
+      </p:pic>
+      <p:pic>
+        <p:nvPicPr>
+          <p:cNvPr id="10" name="Picture 20" descr="css grátis ícone">
+            <a:extLst>
+              <a:ext uri="{FF2B5EF4-FFF2-40B4-BE49-F238E27FC236}">
+                <a16:creationId xmlns:a16="http://schemas.microsoft.com/office/drawing/2014/main" id="{A7EB3E5D-7EEE-4E9A-8FD6-880E130B16B5}"/>
+              </a:ext>
+            </a:extLst>
+          </p:cNvPr>
+          <p:cNvPicPr>
+            <a:picLocks noChangeAspect="1" noChangeArrowheads="1"/>
+          </p:cNvPicPr>
+          <p:nvPr/>
+        </p:nvPicPr>
+        <p:blipFill>
+          <a:blip r:embed="rId3">
+            <a:extLst>
+              <a:ext uri="{28A0092B-C50C-407E-A947-70E740481C1C}">
+                <a14:useLocalDpi xmlns:a14="http://schemas.microsoft.com/office/drawing/2010/main" val="0"/>
+              </a:ext>
+            </a:extLst>
+          </a:blip>
+          <a:srcRect/>
+          <a:stretch>
+            <a:fillRect/>
+          </a:stretch>
+        </p:blipFill>
+        <p:spPr bwMode="auto">
+          <a:xfrm>
+            <a:off x="11075570" y="1264862"/>
+            <a:ext cx="821107" cy="821107"/>
+          </a:xfrm>
+          <a:prstGeom prst="rect">
+            <a:avLst/>
+          </a:prstGeom>
+          <a:noFill/>
+          <a:extLst>
+            <a:ext uri="{909E8E84-426E-40DD-AFC4-6F175D3DCCD1}">
+              <a14:hiddenFill xmlns:a14="http://schemas.microsoft.com/office/drawing/2010/main">
+                <a:solidFill>
+                  <a:srgbClr val="FFFFFF"/>
+                </a:solidFill>
+              </a14:hiddenFill>
+            </a:ext>
+          </a:extLst>
+        </p:spPr>
+      </p:pic>
+      <p:pic>
+        <p:nvPicPr>
+          <p:cNvPr id="1026" name="Picture 2" descr="Ver a imagem de origem">
+            <a:extLst>
+              <a:ext uri="{FF2B5EF4-FFF2-40B4-BE49-F238E27FC236}">
+                <a16:creationId xmlns:a16="http://schemas.microsoft.com/office/drawing/2014/main" id="{85A19106-33A1-499D-A254-314B0164C8CB}"/>
+              </a:ext>
+            </a:extLst>
+          </p:cNvPr>
+          <p:cNvPicPr>
+            <a:picLocks noChangeAspect="1" noChangeArrowheads="1"/>
+          </p:cNvPicPr>
+          <p:nvPr/>
+        </p:nvPicPr>
+        <p:blipFill>
+          <a:blip r:embed="rId4">
+            <a:extLst>
+              <a:ext uri="{28A0092B-C50C-407E-A947-70E740481C1C}">
+                <a14:useLocalDpi xmlns:a14="http://schemas.microsoft.com/office/drawing/2010/main" val="0"/>
+              </a:ext>
+            </a:extLst>
+          </a:blip>
+          <a:srcRect/>
+          <a:stretch>
+            <a:fillRect/>
+          </a:stretch>
+        </p:blipFill>
+        <p:spPr bwMode="auto">
+          <a:xfrm>
+            <a:off x="10014347" y="60559"/>
+            <a:ext cx="1833355" cy="916678"/>
+          </a:xfrm>
+          <a:prstGeom prst="rect">
+            <a:avLst/>
+          </a:prstGeom>
+          <a:noFill/>
+          <a:extLst>
+            <a:ext uri="{909E8E84-426E-40DD-AFC4-6F175D3DCCD1}">
+              <a14:hiddenFill xmlns:a14="http://schemas.microsoft.com/office/drawing/2010/main">
+                <a:solidFill>
+                  <a:srgbClr val="FFFFFF"/>
+                </a:solidFill>
+              </a14:hiddenFill>
+            </a:ext>
+          </a:extLst>
+        </p:spPr>
+      </p:pic>
+      <p:sp>
+        <p:nvSpPr>
+          <p:cNvPr id="16" name="Nuvem 15">
+            <a:extLst>
+              <a:ext uri="{FF2B5EF4-FFF2-40B4-BE49-F238E27FC236}">
+                <a16:creationId xmlns:a16="http://schemas.microsoft.com/office/drawing/2014/main" id="{76394CD3-4455-45C5-BB3B-CD16048B7695}"/>
+              </a:ext>
+            </a:extLst>
+          </p:cNvPr>
+          <p:cNvSpPr/>
+          <p:nvPr/>
+        </p:nvSpPr>
+        <p:spPr>
+          <a:xfrm>
+            <a:off x="-666198" y="-503103"/>
+            <a:ext cx="4067140" cy="2719025"/>
+          </a:xfrm>
+          <a:prstGeom prst="cloud">
+            <a:avLst/>
+          </a:prstGeom>
+          <a:noFill/>
+          <a:ln w="9525" cap="flat" cmpd="sng" algn="ctr">
+            <a:solidFill>
+              <a:schemeClr val="dk1"/>
+            </a:solidFill>
+            <a:prstDash val="solid"/>
+            <a:round/>
+            <a:headEnd type="none" w="med" len="med"/>
+            <a:tailEnd type="none" w="med" len="med"/>
+          </a:ln>
+          <a:effectLst>
+            <a:outerShdw blurRad="50800" dist="38100" dir="2700000" algn="tl" rotWithShape="0">
+              <a:prstClr val="black">
+                <a:alpha val="40000"/>
+              </a:prstClr>
+            </a:outerShdw>
+          </a:effectLst>
+        </p:spPr>
+        <p:style>
+          <a:lnRef idx="0">
+            <a:scrgbClr r="0" g="0" b="0"/>
+          </a:lnRef>
+          <a:fillRef idx="0">
+            <a:scrgbClr r="0" g="0" b="0"/>
+          </a:fillRef>
+          <a:effectRef idx="0">
+            <a:scrgbClr r="0" g="0" b="0"/>
+          </a:effectRef>
+          <a:fontRef idx="minor">
+            <a:schemeClr val="dk1"/>
+          </a:fontRef>
+        </p:style>
+        <p:txBody>
+          <a:bodyPr rtlCol="0" anchor="ctr"/>
+          <a:lstStyle/>
+          <a:p>
+            <a:pPr algn="ctr"/>
+            <a:endParaRPr lang="pt-BR" dirty="0"/>
+          </a:p>
+        </p:txBody>
+      </p:sp>
+      <p:pic>
+        <p:nvPicPr>
+          <p:cNvPr id="1028" name="Picture 4" descr="Ver a imagem de origem">
+            <a:extLst>
+              <a:ext uri="{FF2B5EF4-FFF2-40B4-BE49-F238E27FC236}">
+                <a16:creationId xmlns:a16="http://schemas.microsoft.com/office/drawing/2014/main" id="{8C30BDF8-1F71-439C-A2E7-017FC86DB759}"/>
+              </a:ext>
+            </a:extLst>
+          </p:cNvPr>
+          <p:cNvPicPr>
+            <a:picLocks noChangeAspect="1" noChangeArrowheads="1"/>
+          </p:cNvPicPr>
+          <p:nvPr/>
+        </p:nvPicPr>
+        <p:blipFill>
+          <a:blip r:embed="rId5">
+            <a:extLst>
+              <a:ext uri="{28A0092B-C50C-407E-A947-70E740481C1C}">
+                <a14:useLocalDpi xmlns:a14="http://schemas.microsoft.com/office/drawing/2010/main" val="0"/>
+              </a:ext>
+            </a:extLst>
+          </a:blip>
+          <a:srcRect/>
+          <a:stretch>
+            <a:fillRect/>
+          </a:stretch>
+        </p:blipFill>
+        <p:spPr bwMode="auto">
+          <a:xfrm>
+            <a:off x="74993" y="27264"/>
+            <a:ext cx="1912030" cy="1003816"/>
+          </a:xfrm>
+          <a:prstGeom prst="rect">
+            <a:avLst/>
+          </a:prstGeom>
+          <a:noFill/>
+          <a:extLst>
+            <a:ext uri="{909E8E84-426E-40DD-AFC4-6F175D3DCCD1}">
+              <a14:hiddenFill xmlns:a14="http://schemas.microsoft.com/office/drawing/2010/main">
+                <a:solidFill>
+                  <a:srgbClr val="FFFFFF"/>
+                </a:solidFill>
+              </a14:hiddenFill>
+            </a:ext>
+          </a:extLst>
+        </p:spPr>
+      </p:pic>
+      <p:pic>
+        <p:nvPicPr>
+          <p:cNvPr id="1030" name="Picture 6" descr="Ver a imagem de origem">
+            <a:extLst>
+              <a:ext uri="{FF2B5EF4-FFF2-40B4-BE49-F238E27FC236}">
+                <a16:creationId xmlns:a16="http://schemas.microsoft.com/office/drawing/2014/main" id="{F0D54E87-26B6-4142-BE76-323B9B230266}"/>
+              </a:ext>
+            </a:extLst>
+          </p:cNvPr>
+          <p:cNvPicPr>
+            <a:picLocks noChangeAspect="1" noChangeArrowheads="1"/>
+          </p:cNvPicPr>
+          <p:nvPr/>
+        </p:nvPicPr>
+        <p:blipFill>
+          <a:blip r:embed="rId6">
+            <a:extLst>
+              <a:ext uri="{28A0092B-C50C-407E-A947-70E740481C1C}">
+                <a14:useLocalDpi xmlns:a14="http://schemas.microsoft.com/office/drawing/2010/main" val="0"/>
+              </a:ext>
+            </a:extLst>
+          </a:blip>
+          <a:srcRect/>
+          <a:stretch>
+            <a:fillRect/>
+          </a:stretch>
+        </p:blipFill>
+        <p:spPr bwMode="auto">
+          <a:xfrm>
+            <a:off x="1230840" y="549528"/>
+            <a:ext cx="1691950" cy="1080969"/>
+          </a:xfrm>
+          <a:prstGeom prst="rect">
+            <a:avLst/>
+          </a:prstGeom>
+          <a:noFill/>
+          <a:extLst>
+            <a:ext uri="{909E8E84-426E-40DD-AFC4-6F175D3DCCD1}">
+              <a14:hiddenFill xmlns:a14="http://schemas.microsoft.com/office/drawing/2010/main">
+                <a:solidFill>
+                  <a:srgbClr val="FFFFFF"/>
+                </a:solidFill>
+              </a14:hiddenFill>
+            </a:ext>
+          </a:extLst>
+        </p:spPr>
+      </p:pic>
+      <p:pic>
+        <p:nvPicPr>
+          <p:cNvPr id="1032" name="Picture 8" descr="Java free icon">
+            <a:extLst>
+              <a:ext uri="{FF2B5EF4-FFF2-40B4-BE49-F238E27FC236}">
+                <a16:creationId xmlns:a16="http://schemas.microsoft.com/office/drawing/2014/main" id="{F6E50CB6-3934-4BE2-8BF0-2A849D685861}"/>
+              </a:ext>
+            </a:extLst>
+          </p:cNvPr>
+          <p:cNvPicPr>
+            <a:picLocks noChangeAspect="1" noChangeArrowheads="1"/>
+          </p:cNvPicPr>
+          <p:nvPr/>
+        </p:nvPicPr>
+        <p:blipFill>
+          <a:blip r:embed="rId7">
+            <a:extLst>
+              <a:ext uri="{28A0092B-C50C-407E-A947-70E740481C1C}">
+                <a14:useLocalDpi xmlns:a14="http://schemas.microsoft.com/office/drawing/2010/main" val="0"/>
+              </a:ext>
+            </a:extLst>
+          </a:blip>
+          <a:srcRect/>
+          <a:stretch>
+            <a:fillRect/>
+          </a:stretch>
+        </p:blipFill>
+        <p:spPr bwMode="auto">
+          <a:xfrm>
+            <a:off x="449024" y="868411"/>
+            <a:ext cx="617450" cy="617450"/>
+          </a:xfrm>
+          <a:prstGeom prst="rect">
+            <a:avLst/>
+          </a:prstGeom>
+          <a:noFill/>
+          <a:extLst>
+            <a:ext uri="{909E8E84-426E-40DD-AFC4-6F175D3DCCD1}">
+              <a14:hiddenFill xmlns:a14="http://schemas.microsoft.com/office/drawing/2010/main">
+                <a:solidFill>
+                  <a:srgbClr val="FFFFFF"/>
+                </a:solidFill>
+              </a14:hiddenFill>
+            </a:ext>
+          </a:extLst>
+        </p:spPr>
+      </p:pic>
+      <p:pic>
+        <p:nvPicPr>
+          <p:cNvPr id="20" name="Picture 26" descr="Ver a imagem de origem">
+            <a:extLst>
+              <a:ext uri="{FF2B5EF4-FFF2-40B4-BE49-F238E27FC236}">
+                <a16:creationId xmlns:a16="http://schemas.microsoft.com/office/drawing/2014/main" id="{C88607D7-C440-478C-BFF1-787DBA1E987F}"/>
+              </a:ext>
+            </a:extLst>
+          </p:cNvPr>
+          <p:cNvPicPr>
+            <a:picLocks noChangeAspect="1" noChangeArrowheads="1"/>
+          </p:cNvPicPr>
+          <p:nvPr/>
+        </p:nvPicPr>
+        <p:blipFill>
+          <a:blip r:embed="rId8">
+            <a:extLst>
+              <a:ext uri="{28A0092B-C50C-407E-A947-70E740481C1C}">
+                <a14:useLocalDpi xmlns:a14="http://schemas.microsoft.com/office/drawing/2010/main" val="0"/>
+              </a:ext>
+            </a:extLst>
+          </a:blip>
+          <a:srcRect/>
+          <a:stretch>
+            <a:fillRect/>
+          </a:stretch>
+        </p:blipFill>
+        <p:spPr bwMode="auto">
+          <a:xfrm>
+            <a:off x="8209259" y="333808"/>
+            <a:ext cx="996606" cy="1006429"/>
+          </a:xfrm>
+          <a:prstGeom prst="rect">
+            <a:avLst/>
+          </a:prstGeom>
+          <a:noFill/>
+          <a:extLst>
+            <a:ext uri="{909E8E84-426E-40DD-AFC4-6F175D3DCCD1}">
+              <a14:hiddenFill xmlns:a14="http://schemas.microsoft.com/office/drawing/2010/main">
+                <a:solidFill>
+                  <a:srgbClr val="FFFFFF"/>
+                </a:solidFill>
+              </a14:hiddenFill>
+            </a:ext>
+          </a:extLst>
+        </p:spPr>
+      </p:pic>
+      <p:pic>
+        <p:nvPicPr>
+          <p:cNvPr id="1034" name="Picture 10" descr="Html 5 free icon">
+            <a:extLst>
+              <a:ext uri="{FF2B5EF4-FFF2-40B4-BE49-F238E27FC236}">
+                <a16:creationId xmlns:a16="http://schemas.microsoft.com/office/drawing/2014/main" id="{4F4611F7-8846-401B-9D06-C3F28E34607F}"/>
+              </a:ext>
+            </a:extLst>
+          </p:cNvPr>
+          <p:cNvPicPr>
+            <a:picLocks noChangeAspect="1" noChangeArrowheads="1"/>
+          </p:cNvPicPr>
+          <p:nvPr/>
+        </p:nvPicPr>
+        <p:blipFill>
+          <a:blip r:embed="rId9">
+            <a:extLst>
+              <a:ext uri="{28A0092B-C50C-407E-A947-70E740481C1C}">
+                <a14:useLocalDpi xmlns:a14="http://schemas.microsoft.com/office/drawing/2010/main" val="0"/>
+              </a:ext>
+            </a:extLst>
+          </a:blip>
+          <a:srcRect/>
+          <a:stretch>
+            <a:fillRect/>
+          </a:stretch>
+        </p:blipFill>
+        <p:spPr bwMode="auto">
+          <a:xfrm>
+            <a:off x="10125454" y="1933422"/>
+            <a:ext cx="863857" cy="863857"/>
+          </a:xfrm>
+          <a:prstGeom prst="rect">
+            <a:avLst/>
+          </a:prstGeom>
+          <a:noFill/>
+          <a:extLst>
+            <a:ext uri="{909E8E84-426E-40DD-AFC4-6F175D3DCCD1}">
+              <a14:hiddenFill xmlns:a14="http://schemas.microsoft.com/office/drawing/2010/main">
+                <a:solidFill>
+                  <a:srgbClr val="FFFFFF"/>
+                </a:solidFill>
+              </a14:hiddenFill>
+            </a:ext>
+          </a:extLst>
+        </p:spPr>
+      </p:pic>
+      <p:sp>
+        <p:nvSpPr>
+          <p:cNvPr id="27" name="Retângulo: Cantos Arredondados 26">
+            <a:extLst>
+              <a:ext uri="{FF2B5EF4-FFF2-40B4-BE49-F238E27FC236}">
+                <a16:creationId xmlns:a16="http://schemas.microsoft.com/office/drawing/2014/main" id="{D2AD038B-48D1-48AE-A3E1-27E423E6DB9A}"/>
+              </a:ext>
+            </a:extLst>
+          </p:cNvPr>
+          <p:cNvSpPr/>
+          <p:nvPr/>
+        </p:nvSpPr>
+        <p:spPr>
+          <a:xfrm>
+            <a:off x="344297" y="3292158"/>
+            <a:ext cx="2972761" cy="2674574"/>
+          </a:xfrm>
+          <a:prstGeom prst="roundRect">
+            <a:avLst>
+              <a:gd name="adj" fmla="val 0"/>
+            </a:avLst>
+          </a:prstGeom>
+          <a:noFill/>
+          <a:ln w="9525" cap="flat" cmpd="sng" algn="ctr">
+            <a:solidFill>
+              <a:schemeClr val="dk1"/>
+            </a:solidFill>
+            <a:prstDash val="solid"/>
+            <a:round/>
+            <a:headEnd type="none" w="med" len="med"/>
+            <a:tailEnd type="none" w="med" len="med"/>
+          </a:ln>
+          <a:effectLst>
+            <a:outerShdw blurRad="50800" dist="38100" dir="2700000" algn="tl" rotWithShape="0">
+              <a:prstClr val="black">
+                <a:alpha val="40000"/>
+              </a:prstClr>
+            </a:outerShdw>
+          </a:effectLst>
+        </p:spPr>
+        <p:style>
+          <a:lnRef idx="0">
+            <a:scrgbClr r="0" g="0" b="0"/>
+          </a:lnRef>
+          <a:fillRef idx="0">
+            <a:scrgbClr r="0" g="0" b="0"/>
+          </a:fillRef>
+          <a:effectRef idx="0">
+            <a:scrgbClr r="0" g="0" b="0"/>
+          </a:effectRef>
+          <a:fontRef idx="minor">
+            <a:schemeClr val="dk1"/>
+          </a:fontRef>
+        </p:style>
+        <p:txBody>
+          <a:bodyPr rtlCol="0" anchor="ctr"/>
+          <a:lstStyle/>
+          <a:p>
+            <a:pPr algn="ctr"/>
+            <a:endParaRPr lang="pt-BR"/>
+          </a:p>
+        </p:txBody>
+      </p:sp>
+      <p:sp>
+        <p:nvSpPr>
+          <p:cNvPr id="28" name="CaixaDeTexto 27">
+            <a:extLst>
+              <a:ext uri="{FF2B5EF4-FFF2-40B4-BE49-F238E27FC236}">
+                <a16:creationId xmlns:a16="http://schemas.microsoft.com/office/drawing/2014/main" id="{19D125B1-9053-4A35-97C8-3C97CE1BD2E5}"/>
+              </a:ext>
+            </a:extLst>
+          </p:cNvPr>
+          <p:cNvSpPr txBox="1"/>
+          <p:nvPr/>
+        </p:nvSpPr>
+        <p:spPr>
+          <a:xfrm>
+            <a:off x="0" y="6018275"/>
+            <a:ext cx="3850734" cy="461665"/>
+          </a:xfrm>
+          <a:prstGeom prst="rect">
+            <a:avLst/>
+          </a:prstGeom>
+          <a:noFill/>
+        </p:spPr>
+        <p:txBody>
+          <a:bodyPr wrap="none" rtlCol="0">
+            <a:spAutoFit/>
+          </a:bodyPr>
+          <a:lstStyle/>
+          <a:p>
+            <a:r>
+              <a:rPr lang="pt-BR" sz="2400" dirty="0">
+                <a:latin typeface="Aharoni" panose="02010803020104030203" pitchFamily="2" charset="-79"/>
+                <a:cs typeface="Aharoni" panose="02010803020104030203" pitchFamily="2" charset="-79"/>
+              </a:rPr>
+              <a:t>Dispositivos monitorados</a:t>
+            </a:r>
+          </a:p>
+        </p:txBody>
+      </p:sp>
+      <p:pic>
+        <p:nvPicPr>
+          <p:cNvPr id="30" name="Picture 8" descr="Java free icon">
+            <a:extLst>
+              <a:ext uri="{FF2B5EF4-FFF2-40B4-BE49-F238E27FC236}">
+                <a16:creationId xmlns:a16="http://schemas.microsoft.com/office/drawing/2014/main" id="{B07D78B9-C745-4D2D-A1E9-145518EB766B}"/>
+              </a:ext>
+            </a:extLst>
+          </p:cNvPr>
+          <p:cNvPicPr>
+            <a:picLocks noChangeAspect="1" noChangeArrowheads="1"/>
+          </p:cNvPicPr>
+          <p:nvPr/>
+        </p:nvPicPr>
+        <p:blipFill>
+          <a:blip r:embed="rId7">
+            <a:extLst>
+              <a:ext uri="{28A0092B-C50C-407E-A947-70E740481C1C}">
+                <a14:useLocalDpi xmlns:a14="http://schemas.microsoft.com/office/drawing/2010/main" val="0"/>
+              </a:ext>
+            </a:extLst>
+          </a:blip>
+          <a:srcRect/>
+          <a:stretch>
+            <a:fillRect/>
+          </a:stretch>
+        </p:blipFill>
+        <p:spPr bwMode="auto">
+          <a:xfrm>
+            <a:off x="1397245" y="4852239"/>
+            <a:ext cx="639512" cy="639512"/>
+          </a:xfrm>
+          <a:prstGeom prst="rect">
+            <a:avLst/>
+          </a:prstGeom>
+          <a:noFill/>
+          <a:extLst>
+            <a:ext uri="{909E8E84-426E-40DD-AFC4-6F175D3DCCD1}">
+              <a14:hiddenFill xmlns:a14="http://schemas.microsoft.com/office/drawing/2010/main">
+                <a:solidFill>
+                  <a:srgbClr val="FFFFFF"/>
+                </a:solidFill>
+              </a14:hiddenFill>
+            </a:ext>
+          </a:extLst>
+        </p:spPr>
+      </p:pic>
+      <p:pic>
+        <p:nvPicPr>
+          <p:cNvPr id="19" name="Imagem 18">
+            <a:extLst>
+              <a:ext uri="{FF2B5EF4-FFF2-40B4-BE49-F238E27FC236}">
+                <a16:creationId xmlns:a16="http://schemas.microsoft.com/office/drawing/2014/main" id="{3AE7EC6B-168F-4545-AEE0-066337448272}"/>
+              </a:ext>
+            </a:extLst>
+          </p:cNvPr>
+          <p:cNvPicPr>
+            <a:picLocks noChangeAspect="1"/>
+          </p:cNvPicPr>
+          <p:nvPr/>
+        </p:nvPicPr>
+        <p:blipFill>
+          <a:blip r:embed="rId10"/>
+          <a:stretch>
+            <a:fillRect/>
+          </a:stretch>
+        </p:blipFill>
+        <p:spPr>
+          <a:xfrm>
+            <a:off x="2069248" y="3496826"/>
+            <a:ext cx="939116" cy="1179621"/>
+          </a:xfrm>
+          <a:prstGeom prst="rect">
+            <a:avLst/>
+          </a:prstGeom>
+        </p:spPr>
+      </p:pic>
+      <p:pic>
+        <p:nvPicPr>
+          <p:cNvPr id="37" name="Picture 30" descr="Qr code free icon">
+            <a:extLst>
+              <a:ext uri="{FF2B5EF4-FFF2-40B4-BE49-F238E27FC236}">
+                <a16:creationId xmlns:a16="http://schemas.microsoft.com/office/drawing/2014/main" id="{1F4E6668-3379-4426-8C3F-29C5828B38E0}"/>
+              </a:ext>
+            </a:extLst>
+          </p:cNvPr>
+          <p:cNvPicPr>
+            <a:picLocks noChangeAspect="1" noChangeArrowheads="1"/>
+          </p:cNvPicPr>
+          <p:nvPr/>
+        </p:nvPicPr>
+        <p:blipFill>
+          <a:blip r:embed="rId11">
+            <a:extLst>
+              <a:ext uri="{28A0092B-C50C-407E-A947-70E740481C1C}">
+                <a14:useLocalDpi xmlns:a14="http://schemas.microsoft.com/office/drawing/2010/main" val="0"/>
+              </a:ext>
+            </a:extLst>
+          </a:blip>
+          <a:srcRect/>
+          <a:stretch>
+            <a:fillRect/>
+          </a:stretch>
+        </p:blipFill>
+        <p:spPr bwMode="auto">
+          <a:xfrm>
+            <a:off x="537529" y="3605311"/>
+            <a:ext cx="767815" cy="767815"/>
+          </a:xfrm>
+          <a:prstGeom prst="rect">
+            <a:avLst/>
+          </a:prstGeom>
+          <a:noFill/>
+          <a:extLst>
+            <a:ext uri="{909E8E84-426E-40DD-AFC4-6F175D3DCCD1}">
+              <a14:hiddenFill xmlns:a14="http://schemas.microsoft.com/office/drawing/2010/main">
+                <a:solidFill>
+                  <a:srgbClr val="FFFFFF"/>
+                </a:solidFill>
+              </a14:hiddenFill>
+            </a:ext>
+          </a:extLst>
+        </p:spPr>
+      </p:pic>
+      <p:pic>
+        <p:nvPicPr>
+          <p:cNvPr id="22" name="Picture 10" descr="Nodejs free icon">
+            <a:extLst>
+              <a:ext uri="{FF2B5EF4-FFF2-40B4-BE49-F238E27FC236}">
+                <a16:creationId xmlns:a16="http://schemas.microsoft.com/office/drawing/2014/main" id="{82CC0558-0600-4103-8527-4F828A8F0E8E}"/>
+              </a:ext>
+            </a:extLst>
+          </p:cNvPr>
+          <p:cNvPicPr>
+            <a:picLocks noChangeAspect="1" noChangeArrowheads="1"/>
+          </p:cNvPicPr>
+          <p:nvPr/>
+        </p:nvPicPr>
+        <p:blipFill>
+          <a:blip r:embed="rId12">
+            <a:extLst>
+              <a:ext uri="{28A0092B-C50C-407E-A947-70E740481C1C}">
+                <a14:useLocalDpi xmlns:a14="http://schemas.microsoft.com/office/drawing/2010/main" val="0"/>
+              </a:ext>
+            </a:extLst>
+          </a:blip>
+          <a:stretch>
+            <a:fillRect/>
+          </a:stretch>
+        </p:blipFill>
+        <p:spPr bwMode="auto">
+          <a:xfrm>
+            <a:off x="10961688" y="4728043"/>
+            <a:ext cx="886014" cy="886014"/>
+          </a:xfrm>
+          <a:prstGeom prst="rect">
+            <a:avLst/>
+          </a:prstGeom>
+          <a:noFill/>
+          <a:extLst>
+            <a:ext uri="{909E8E84-426E-40DD-AFC4-6F175D3DCCD1}">
+              <a14:hiddenFill xmlns:a14="http://schemas.microsoft.com/office/drawing/2010/main">
+                <a:solidFill>
+                  <a:srgbClr val="FFFFFF"/>
+                </a:solidFill>
+              </a14:hiddenFill>
+            </a:ext>
+          </a:extLst>
+        </p:spPr>
+      </p:pic>
+      <p:sp>
+        <p:nvSpPr>
+          <p:cNvPr id="15" name="Retângulo: Cantos Arredondados 14">
+            <a:extLst>
+              <a:ext uri="{FF2B5EF4-FFF2-40B4-BE49-F238E27FC236}">
+                <a16:creationId xmlns:a16="http://schemas.microsoft.com/office/drawing/2014/main" id="{C77BBB91-D654-458D-925C-50963AE4C1C5}"/>
+              </a:ext>
+            </a:extLst>
+          </p:cNvPr>
+          <p:cNvSpPr/>
+          <p:nvPr/>
+        </p:nvSpPr>
+        <p:spPr>
+          <a:xfrm>
+            <a:off x="8180084" y="3358854"/>
+            <a:ext cx="3890741" cy="2796128"/>
+          </a:xfrm>
+          <a:prstGeom prst="roundRect">
+            <a:avLst>
+              <a:gd name="adj" fmla="val 0"/>
+            </a:avLst>
+          </a:prstGeom>
+          <a:noFill/>
+          <a:ln w="9525" cap="flat" cmpd="sng" algn="ctr">
+            <a:solidFill>
+              <a:schemeClr val="dk1"/>
+            </a:solidFill>
+            <a:prstDash val="solid"/>
+            <a:round/>
+            <a:headEnd type="none" w="med" len="med"/>
+            <a:tailEnd type="none" w="med" len="med"/>
+          </a:ln>
+          <a:effectLst>
+            <a:outerShdw blurRad="50800" dist="38100" dir="2700000" algn="tl" rotWithShape="0">
+              <a:prstClr val="black">
+                <a:alpha val="40000"/>
+              </a:prstClr>
+            </a:outerShdw>
+          </a:effectLst>
+        </p:spPr>
+        <p:style>
+          <a:lnRef idx="0">
+            <a:scrgbClr r="0" g="0" b="0"/>
+          </a:lnRef>
+          <a:fillRef idx="0">
+            <a:scrgbClr r="0" g="0" b="0"/>
+          </a:fillRef>
+          <a:effectRef idx="0">
+            <a:scrgbClr r="0" g="0" b="0"/>
+          </a:effectRef>
+          <a:fontRef idx="minor">
+            <a:schemeClr val="dk1"/>
+          </a:fontRef>
+        </p:style>
+        <p:txBody>
+          <a:bodyPr rtlCol="0" anchor="ctr"/>
+          <a:lstStyle/>
+          <a:p>
+            <a:pPr algn="ctr"/>
+            <a:endParaRPr lang="pt-BR"/>
+          </a:p>
+        </p:txBody>
+      </p:sp>
+      <p:sp>
+        <p:nvSpPr>
+          <p:cNvPr id="29" name="CaixaDeTexto 28">
+            <a:extLst>
+              <a:ext uri="{FF2B5EF4-FFF2-40B4-BE49-F238E27FC236}">
+                <a16:creationId xmlns:a16="http://schemas.microsoft.com/office/drawing/2014/main" id="{4399947B-C9A7-4289-B373-B0829D9DA0D7}"/>
+              </a:ext>
+            </a:extLst>
+          </p:cNvPr>
+          <p:cNvSpPr txBox="1"/>
+          <p:nvPr/>
+        </p:nvSpPr>
+        <p:spPr>
+          <a:xfrm>
+            <a:off x="9457678" y="6154982"/>
+            <a:ext cx="1340432" cy="461665"/>
+          </a:xfrm>
+          <a:prstGeom prst="rect">
+            <a:avLst/>
+          </a:prstGeom>
+          <a:noFill/>
+        </p:spPr>
+        <p:txBody>
+          <a:bodyPr wrap="none" rtlCol="0">
+            <a:spAutoFit/>
+          </a:bodyPr>
+          <a:lstStyle/>
+          <a:p>
+            <a:r>
+              <a:rPr lang="pt-BR" sz="2400" dirty="0">
+                <a:latin typeface="Aharoni" panose="02010803020104030203" pitchFamily="2" charset="-79"/>
+                <a:cs typeface="Aharoni" panose="02010803020104030203" pitchFamily="2" charset="-79"/>
+              </a:rPr>
+              <a:t>Monitor</a:t>
+            </a:r>
+          </a:p>
+        </p:txBody>
+      </p:sp>
+      <p:pic>
+        <p:nvPicPr>
+          <p:cNvPr id="35" name="Picture 14" descr="Business report">
+            <a:extLst>
+              <a:ext uri="{FF2B5EF4-FFF2-40B4-BE49-F238E27FC236}">
+                <a16:creationId xmlns:a16="http://schemas.microsoft.com/office/drawing/2014/main" id="{08D9786B-1887-4F03-9A98-8522F8F1D5EB}"/>
+              </a:ext>
+            </a:extLst>
+          </p:cNvPr>
+          <p:cNvPicPr>
+            <a:picLocks noChangeAspect="1" noChangeArrowheads="1"/>
+          </p:cNvPicPr>
+          <p:nvPr/>
+        </p:nvPicPr>
+        <p:blipFill>
+          <a:blip r:embed="rId13">
+            <a:extLst>
+              <a:ext uri="{28A0092B-C50C-407E-A947-70E740481C1C}">
+                <a14:useLocalDpi xmlns:a14="http://schemas.microsoft.com/office/drawing/2010/main" val="0"/>
+              </a:ext>
+            </a:extLst>
+          </a:blip>
+          <a:srcRect/>
+          <a:stretch>
+            <a:fillRect/>
+          </a:stretch>
+        </p:blipFill>
+        <p:spPr bwMode="auto">
+          <a:xfrm>
+            <a:off x="8525087" y="3608877"/>
+            <a:ext cx="1004430" cy="1004430"/>
+          </a:xfrm>
+          <a:prstGeom prst="rect">
+            <a:avLst/>
+          </a:prstGeom>
+          <a:noFill/>
+          <a:extLst>
+            <a:ext uri="{909E8E84-426E-40DD-AFC4-6F175D3DCCD1}">
+              <a14:hiddenFill xmlns:a14="http://schemas.microsoft.com/office/drawing/2010/main">
+                <a:solidFill>
+                  <a:srgbClr val="FFFFFF"/>
+                </a:solidFill>
+              </a14:hiddenFill>
+            </a:ext>
+          </a:extLst>
+        </p:spPr>
+      </p:pic>
+      <p:pic>
+        <p:nvPicPr>
+          <p:cNvPr id="36" name="Picture 8" descr="Java free icon">
+            <a:extLst>
+              <a:ext uri="{FF2B5EF4-FFF2-40B4-BE49-F238E27FC236}">
+                <a16:creationId xmlns:a16="http://schemas.microsoft.com/office/drawing/2014/main" id="{8C6E24BD-968E-4EB2-8117-BA08DF8808FD}"/>
+              </a:ext>
+            </a:extLst>
+          </p:cNvPr>
+          <p:cNvPicPr>
+            <a:picLocks noChangeAspect="1" noChangeArrowheads="1"/>
+          </p:cNvPicPr>
+          <p:nvPr/>
+        </p:nvPicPr>
+        <p:blipFill>
+          <a:blip r:embed="rId7">
+            <a:extLst>
+              <a:ext uri="{28A0092B-C50C-407E-A947-70E740481C1C}">
+                <a14:useLocalDpi xmlns:a14="http://schemas.microsoft.com/office/drawing/2010/main" val="0"/>
+              </a:ext>
+            </a:extLst>
+          </a:blip>
+          <a:srcRect/>
+          <a:stretch>
+            <a:fillRect/>
+          </a:stretch>
+        </p:blipFill>
+        <p:spPr bwMode="auto">
+          <a:xfrm>
+            <a:off x="9415899" y="4756918"/>
+            <a:ext cx="689785" cy="689785"/>
+          </a:xfrm>
+          <a:prstGeom prst="rect">
+            <a:avLst/>
+          </a:prstGeom>
+          <a:noFill/>
+          <a:extLst>
+            <a:ext uri="{909E8E84-426E-40DD-AFC4-6F175D3DCCD1}">
+              <a14:hiddenFill xmlns:a14="http://schemas.microsoft.com/office/drawing/2010/main">
+                <a:solidFill>
+                  <a:srgbClr val="FFFFFF"/>
+                </a:solidFill>
+              </a14:hiddenFill>
+            </a:ext>
+          </a:extLst>
+        </p:spPr>
+      </p:pic>
+      <p:pic>
+        <p:nvPicPr>
+          <p:cNvPr id="1038" name="Picture 14" descr="Warning free icon">
+            <a:extLst>
+              <a:ext uri="{FF2B5EF4-FFF2-40B4-BE49-F238E27FC236}">
+                <a16:creationId xmlns:a16="http://schemas.microsoft.com/office/drawing/2014/main" id="{09385C36-81E1-480A-9B33-6E6157223345}"/>
+              </a:ext>
+            </a:extLst>
+          </p:cNvPr>
+          <p:cNvPicPr>
+            <a:picLocks noChangeAspect="1" noChangeArrowheads="1"/>
+          </p:cNvPicPr>
+          <p:nvPr/>
+        </p:nvPicPr>
+        <p:blipFill>
+          <a:blip r:embed="rId14">
+            <a:extLst>
+              <a:ext uri="{28A0092B-C50C-407E-A947-70E740481C1C}">
+                <a14:useLocalDpi xmlns:a14="http://schemas.microsoft.com/office/drawing/2010/main" val="0"/>
+              </a:ext>
+            </a:extLst>
+          </a:blip>
+          <a:srcRect/>
+          <a:stretch>
+            <a:fillRect/>
+          </a:stretch>
+        </p:blipFill>
+        <p:spPr bwMode="auto">
+          <a:xfrm>
+            <a:off x="8276706" y="3382517"/>
+            <a:ext cx="496761" cy="496761"/>
+          </a:xfrm>
+          <a:prstGeom prst="rect">
+            <a:avLst/>
+          </a:prstGeom>
+          <a:noFill/>
+          <a:extLst>
+            <a:ext uri="{909E8E84-426E-40DD-AFC4-6F175D3DCCD1}">
+              <a14:hiddenFill xmlns:a14="http://schemas.microsoft.com/office/drawing/2010/main">
+                <a:solidFill>
+                  <a:srgbClr val="FFFFFF"/>
+                </a:solidFill>
+              </a14:hiddenFill>
+            </a:ext>
+          </a:extLst>
+        </p:spPr>
+      </p:pic>
+      <p:cxnSp>
+        <p:nvCxnSpPr>
+          <p:cNvPr id="44" name="Conector: Curvo 43">
+            <a:extLst>
+              <a:ext uri="{FF2B5EF4-FFF2-40B4-BE49-F238E27FC236}">
+                <a16:creationId xmlns:a16="http://schemas.microsoft.com/office/drawing/2014/main" id="{A4058254-FA69-4AB2-B917-34F272CF9798}"/>
+              </a:ext>
+            </a:extLst>
+          </p:cNvPr>
+          <p:cNvCxnSpPr>
+            <a:cxnSpLocks/>
+            <a:stCxn id="1038" idx="0"/>
+            <a:endCxn id="4" idx="1"/>
+          </p:cNvCxnSpPr>
+          <p:nvPr/>
+        </p:nvCxnSpPr>
+        <p:spPr>
+          <a:xfrm rot="16200000" flipV="1">
+            <a:off x="5908845" y="766275"/>
+            <a:ext cx="1978044" cy="3254440"/>
+          </a:xfrm>
+          <a:prstGeom prst="curvedConnector3">
+            <a:avLst>
+              <a:gd name="adj1" fmla="val 50000"/>
+            </a:avLst>
+          </a:prstGeom>
+          <a:ln>
+            <a:headEnd type="triangle"/>
+            <a:tailEnd type="triangle"/>
+          </a:ln>
+          <a:effectLst>
+            <a:outerShdw blurRad="50800" dist="38100" dir="2700000" algn="tl" rotWithShape="0">
+              <a:prstClr val="black">
+                <a:alpha val="40000"/>
+              </a:prstClr>
+            </a:outerShdw>
+          </a:effectLst>
+        </p:spPr>
+        <p:style>
+          <a:lnRef idx="1">
+            <a:schemeClr val="dk1"/>
+          </a:lnRef>
+          <a:fillRef idx="0">
+            <a:schemeClr val="dk1"/>
+          </a:fillRef>
+          <a:effectRef idx="0">
+            <a:schemeClr val="dk1"/>
+          </a:effectRef>
+          <a:fontRef idx="minor">
+            <a:schemeClr val="tx1"/>
+          </a:fontRef>
+        </p:style>
+      </p:cxnSp>
+      <p:cxnSp>
+        <p:nvCxnSpPr>
+          <p:cNvPr id="41" name="Conector: Curvo 40">
+            <a:extLst>
+              <a:ext uri="{FF2B5EF4-FFF2-40B4-BE49-F238E27FC236}">
+                <a16:creationId xmlns:a16="http://schemas.microsoft.com/office/drawing/2014/main" id="{52462E38-8CD1-49E2-85CD-0ED81E519739}"/>
+              </a:ext>
+            </a:extLst>
+          </p:cNvPr>
+          <p:cNvCxnSpPr>
+            <a:cxnSpLocks/>
+            <a:stCxn id="27" idx="0"/>
+            <a:endCxn id="16" idx="1"/>
+          </p:cNvCxnSpPr>
+          <p:nvPr/>
+        </p:nvCxnSpPr>
+        <p:spPr>
+          <a:xfrm rot="16200000" flipV="1">
+            <a:off x="1059460" y="2520940"/>
+            <a:ext cx="1079131" cy="463306"/>
+          </a:xfrm>
+          <a:prstGeom prst="curvedConnector3">
+            <a:avLst/>
+          </a:prstGeom>
+          <a:ln>
+            <a:tailEnd type="triangle"/>
+          </a:ln>
+          <a:effectLst>
+            <a:outerShdw blurRad="50800" dist="38100" dir="2700000" algn="tl" rotWithShape="0">
+              <a:prstClr val="black">
+                <a:alpha val="40000"/>
+              </a:prstClr>
+            </a:outerShdw>
+          </a:effectLst>
+        </p:spPr>
+        <p:style>
+          <a:lnRef idx="1">
+            <a:schemeClr val="dk1"/>
+          </a:lnRef>
+          <a:fillRef idx="0">
+            <a:schemeClr val="dk1"/>
+          </a:fillRef>
+          <a:effectRef idx="0">
+            <a:schemeClr val="dk1"/>
+          </a:effectRef>
+          <a:fontRef idx="minor">
+            <a:schemeClr val="tx1"/>
+          </a:fontRef>
+        </p:style>
+      </p:cxnSp>
+      <p:cxnSp>
+        <p:nvCxnSpPr>
+          <p:cNvPr id="55" name="Conector: Curvo 54">
+            <a:extLst>
+              <a:ext uri="{FF2B5EF4-FFF2-40B4-BE49-F238E27FC236}">
+                <a16:creationId xmlns:a16="http://schemas.microsoft.com/office/drawing/2014/main" id="{03A88442-EA09-4A10-AACF-8344818A501D}"/>
+              </a:ext>
+            </a:extLst>
+          </p:cNvPr>
+          <p:cNvCxnSpPr>
+            <a:cxnSpLocks/>
+            <a:stCxn id="5" idx="1"/>
+            <a:endCxn id="35" idx="0"/>
+          </p:cNvCxnSpPr>
+          <p:nvPr/>
+        </p:nvCxnSpPr>
+        <p:spPr>
+          <a:xfrm rot="5400000">
+            <a:off x="9613564" y="2510989"/>
+            <a:ext cx="511626" cy="1684150"/>
+          </a:xfrm>
+          <a:prstGeom prst="curvedConnector3">
+            <a:avLst>
+              <a:gd name="adj1" fmla="val 50000"/>
+            </a:avLst>
+          </a:prstGeom>
+          <a:ln>
+            <a:tailEnd type="triangle"/>
+          </a:ln>
+          <a:effectLst>
+            <a:outerShdw blurRad="50800" dist="38100" dir="2700000" algn="tl" rotWithShape="0">
+              <a:prstClr val="black">
+                <a:alpha val="40000"/>
+              </a:prstClr>
+            </a:outerShdw>
+          </a:effectLst>
+        </p:spPr>
+        <p:style>
+          <a:lnRef idx="1">
+            <a:schemeClr val="dk1"/>
+          </a:lnRef>
+          <a:fillRef idx="0">
+            <a:schemeClr val="dk1"/>
+          </a:fillRef>
+          <a:effectRef idx="0">
+            <a:schemeClr val="dk1"/>
+          </a:effectRef>
+          <a:fontRef idx="minor">
+            <a:schemeClr val="tx1"/>
+          </a:fontRef>
+        </p:style>
+      </p:cxnSp>
+      <p:sp>
+        <p:nvSpPr>
+          <p:cNvPr id="71" name="CaixaDeTexto 70">
+            <a:extLst>
+              <a:ext uri="{FF2B5EF4-FFF2-40B4-BE49-F238E27FC236}">
+                <a16:creationId xmlns:a16="http://schemas.microsoft.com/office/drawing/2014/main" id="{1B501B2B-764A-416F-B6F8-A1E67021A346}"/>
+              </a:ext>
+            </a:extLst>
+          </p:cNvPr>
+          <p:cNvSpPr txBox="1"/>
+          <p:nvPr/>
+        </p:nvSpPr>
+        <p:spPr>
+          <a:xfrm>
+            <a:off x="5318497" y="6025488"/>
+            <a:ext cx="1361270" cy="461665"/>
+          </a:xfrm>
+          <a:prstGeom prst="rect">
+            <a:avLst/>
+          </a:prstGeom>
+          <a:noFill/>
+        </p:spPr>
+        <p:txBody>
+          <a:bodyPr wrap="none" rtlCol="0">
+            <a:spAutoFit/>
+          </a:bodyPr>
+          <a:lstStyle/>
+          <a:p>
+            <a:r>
+              <a:rPr lang="pt-BR" sz="2400" dirty="0">
+                <a:latin typeface="Aharoni" panose="02010803020104030203" pitchFamily="2" charset="-79"/>
+                <a:cs typeface="Aharoni" panose="02010803020104030203" pitchFamily="2" charset="-79"/>
+              </a:rPr>
+              <a:t>Gerente</a:t>
+            </a:r>
+          </a:p>
+        </p:txBody>
+      </p:sp>
+      <p:pic>
+        <p:nvPicPr>
+          <p:cNvPr id="1042" name="Picture 18" descr="Employee">
+            <a:extLst>
+              <a:ext uri="{FF2B5EF4-FFF2-40B4-BE49-F238E27FC236}">
+                <a16:creationId xmlns:a16="http://schemas.microsoft.com/office/drawing/2014/main" id="{070357AB-57C9-4390-9E5F-C40C28CFC239}"/>
+              </a:ext>
+            </a:extLst>
+          </p:cNvPr>
+          <p:cNvPicPr>
+            <a:picLocks noChangeAspect="1" noChangeArrowheads="1"/>
+          </p:cNvPicPr>
+          <p:nvPr/>
+        </p:nvPicPr>
+        <p:blipFill>
+          <a:blip r:embed="rId15">
+            <a:extLst>
+              <a:ext uri="{28A0092B-C50C-407E-A947-70E740481C1C}">
+                <a14:useLocalDpi xmlns:a14="http://schemas.microsoft.com/office/drawing/2010/main" val="0"/>
+              </a:ext>
+            </a:extLst>
+          </a:blip>
+          <a:srcRect/>
+          <a:stretch>
+            <a:fillRect/>
+          </a:stretch>
+        </p:blipFill>
+        <p:spPr bwMode="auto">
+          <a:xfrm>
+            <a:off x="10191535" y="3523701"/>
+            <a:ext cx="1041002" cy="1041002"/>
+          </a:xfrm>
+          <a:prstGeom prst="rect">
+            <a:avLst/>
+          </a:prstGeom>
+          <a:noFill/>
+          <a:extLst>
+            <a:ext uri="{909E8E84-426E-40DD-AFC4-6F175D3DCCD1}">
+              <a14:hiddenFill xmlns:a14="http://schemas.microsoft.com/office/drawing/2010/main">
+                <a:solidFill>
+                  <a:srgbClr val="FFFFFF"/>
+                </a:solidFill>
+              </a14:hiddenFill>
+            </a:ext>
+          </a:extLst>
+        </p:spPr>
+      </p:pic>
+      <p:cxnSp>
+        <p:nvCxnSpPr>
+          <p:cNvPr id="82" name="Conector: Curvo 81">
+            <a:extLst>
+              <a:ext uri="{FF2B5EF4-FFF2-40B4-BE49-F238E27FC236}">
+                <a16:creationId xmlns:a16="http://schemas.microsoft.com/office/drawing/2014/main" id="{B2CF3EB7-B355-4526-8823-F5036EB537A3}"/>
+              </a:ext>
+            </a:extLst>
+          </p:cNvPr>
+          <p:cNvCxnSpPr>
+            <a:cxnSpLocks/>
+            <a:stCxn id="81" idx="0"/>
+            <a:endCxn id="4" idx="1"/>
+          </p:cNvCxnSpPr>
+          <p:nvPr/>
+        </p:nvCxnSpPr>
+        <p:spPr>
+          <a:xfrm rot="5400000" flipH="1" flipV="1">
+            <a:off x="4046897" y="1704700"/>
+            <a:ext cx="1523976" cy="923523"/>
+          </a:xfrm>
+          <a:prstGeom prst="curvedConnector3">
+            <a:avLst>
+              <a:gd name="adj1" fmla="val 50000"/>
+            </a:avLst>
+          </a:prstGeom>
+          <a:ln>
+            <a:headEnd type="triangle"/>
+            <a:tailEnd type="triangle"/>
+          </a:ln>
+          <a:effectLst>
+            <a:outerShdw blurRad="50800" dist="38100" dir="2700000" algn="tl" rotWithShape="0">
+              <a:prstClr val="black">
+                <a:alpha val="40000"/>
+              </a:prstClr>
+            </a:outerShdw>
+          </a:effectLst>
+        </p:spPr>
+        <p:style>
+          <a:lnRef idx="1">
+            <a:schemeClr val="dk1"/>
+          </a:lnRef>
+          <a:fillRef idx="0">
+            <a:schemeClr val="dk1"/>
+          </a:fillRef>
+          <a:effectRef idx="0">
+            <a:schemeClr val="dk1"/>
+          </a:effectRef>
+          <a:fontRef idx="minor">
+            <a:schemeClr val="tx1"/>
+          </a:fontRef>
+        </p:style>
+      </p:cxnSp>
+      <p:grpSp>
+        <p:nvGrpSpPr>
+          <p:cNvPr id="123" name="Agrupar 122">
+            <a:extLst>
+              <a:ext uri="{FF2B5EF4-FFF2-40B4-BE49-F238E27FC236}">
+                <a16:creationId xmlns:a16="http://schemas.microsoft.com/office/drawing/2014/main" id="{7CED2AE3-D645-488C-B035-5F041094A372}"/>
+              </a:ext>
+            </a:extLst>
+          </p:cNvPr>
+          <p:cNvGrpSpPr/>
+          <p:nvPr/>
+        </p:nvGrpSpPr>
+        <p:grpSpPr>
+          <a:xfrm>
+            <a:off x="4289355" y="49716"/>
+            <a:ext cx="1962584" cy="1356201"/>
+            <a:chOff x="3746013" y="67225"/>
+            <a:chExt cx="1962584" cy="1356201"/>
+          </a:xfrm>
+        </p:grpSpPr>
+        <p:sp>
+          <p:nvSpPr>
+            <p:cNvPr id="4" name="Nuvem 3">
+              <a:extLst>
+                <a:ext uri="{FF2B5EF4-FFF2-40B4-BE49-F238E27FC236}">
+                  <a16:creationId xmlns:a16="http://schemas.microsoft.com/office/drawing/2014/main" id="{96A9AF9C-E8B5-4CC8-BFC1-77B3A0EA581B}"/>
+                </a:ext>
+              </a:extLst>
+            </p:cNvPr>
+            <p:cNvSpPr/>
+            <p:nvPr/>
+          </p:nvSpPr>
+          <p:spPr>
+            <a:xfrm>
+              <a:off x="3746013" y="67225"/>
+              <a:ext cx="1962584" cy="1356201"/>
+            </a:xfrm>
+            <a:prstGeom prst="cloud">
+              <a:avLst/>
+            </a:prstGeom>
+            <a:noFill/>
+            <a:ln w="9525" cap="flat" cmpd="sng" algn="ctr">
+              <a:solidFill>
+                <a:schemeClr val="dk1"/>
+              </a:solidFill>
+              <a:prstDash val="solid"/>
+              <a:round/>
+              <a:headEnd type="none" w="med" len="med"/>
+              <a:tailEnd type="none" w="med" len="med"/>
+            </a:ln>
+            <a:effectLst>
+              <a:outerShdw blurRad="50800" dist="38100" dir="2700000" algn="tl" rotWithShape="0">
+                <a:prstClr val="black">
+                  <a:alpha val="40000"/>
+                </a:prstClr>
+              </a:outerShdw>
+            </a:effectLst>
+          </p:spPr>
+          <p:style>
+            <a:lnRef idx="0">
+              <a:scrgbClr r="0" g="0" b="0"/>
+            </a:lnRef>
+            <a:fillRef idx="0">
+              <a:scrgbClr r="0" g="0" b="0"/>
+            </a:fillRef>
+            <a:effectRef idx="0">
+              <a:scrgbClr r="0" g="0" b="0"/>
+            </a:effectRef>
+            <a:fontRef idx="minor">
+              <a:schemeClr val="dk1"/>
+            </a:fontRef>
+          </p:style>
+          <p:txBody>
+            <a:bodyPr rtlCol="0" anchor="ctr"/>
+            <a:lstStyle/>
+            <a:p>
+              <a:pPr algn="ctr"/>
+              <a:endParaRPr lang="pt-BR" dirty="0"/>
+            </a:p>
+          </p:txBody>
+        </p:sp>
+        <p:pic>
+          <p:nvPicPr>
+            <p:cNvPr id="1036" name="Picture 12" descr="Slack free icon">
+              <a:extLst>
+                <a:ext uri="{FF2B5EF4-FFF2-40B4-BE49-F238E27FC236}">
+                  <a16:creationId xmlns:a16="http://schemas.microsoft.com/office/drawing/2014/main" id="{5C9E6C79-BC0E-45AC-81AE-A7DAE6A410BE}"/>
+                </a:ext>
+              </a:extLst>
+            </p:cNvPr>
+            <p:cNvPicPr>
+              <a:picLocks noChangeAspect="1" noChangeArrowheads="1"/>
+            </p:cNvPicPr>
+            <p:nvPr/>
+          </p:nvPicPr>
+          <p:blipFill>
+            <a:blip r:embed="rId16">
+              <a:extLst>
+                <a:ext uri="{28A0092B-C50C-407E-A947-70E740481C1C}">
+                  <a14:useLocalDpi xmlns:a14="http://schemas.microsoft.com/office/drawing/2010/main" val="0"/>
+                </a:ext>
+              </a:extLst>
+            </a:blip>
+            <a:srcRect/>
+            <a:stretch>
+              <a:fillRect/>
+            </a:stretch>
+          </p:blipFill>
+          <p:spPr bwMode="auto">
+            <a:xfrm>
+              <a:off x="4412176" y="312812"/>
+              <a:ext cx="593035" cy="593035"/>
+            </a:xfrm>
+            <a:prstGeom prst="rect">
+              <a:avLst/>
+            </a:prstGeom>
+            <a:noFill/>
+            <a:extLst>
+              <a:ext uri="{909E8E84-426E-40DD-AFC4-6F175D3DCCD1}">
+                <a14:hiddenFill xmlns:a14="http://schemas.microsoft.com/office/drawing/2010/main">
+                  <a:solidFill>
+                    <a:srgbClr val="FFFFFF"/>
+                  </a:solidFill>
+                </a14:hiddenFill>
+              </a:ext>
+            </a:extLst>
+          </p:spPr>
+        </p:pic>
+        <p:sp>
+          <p:nvSpPr>
+            <p:cNvPr id="92" name="CaixaDeTexto 91">
+              <a:extLst>
+                <a:ext uri="{FF2B5EF4-FFF2-40B4-BE49-F238E27FC236}">
+                  <a16:creationId xmlns:a16="http://schemas.microsoft.com/office/drawing/2014/main" id="{89564DE4-AC7D-4776-A9C8-C96D63AA7944}"/>
+                </a:ext>
+              </a:extLst>
+            </p:cNvPr>
+            <p:cNvSpPr txBox="1"/>
+            <p:nvPr/>
+          </p:nvSpPr>
+          <p:spPr>
+            <a:xfrm>
+              <a:off x="4379364" y="891269"/>
+              <a:ext cx="658657" cy="372730"/>
+            </a:xfrm>
+            <a:prstGeom prst="rect">
+              <a:avLst/>
+            </a:prstGeom>
+            <a:noFill/>
+          </p:spPr>
+          <p:txBody>
+            <a:bodyPr wrap="square" rtlCol="0">
+              <a:spAutoFit/>
+            </a:bodyPr>
+            <a:lstStyle/>
+            <a:p>
+              <a:r>
+                <a:rPr lang="pt-BR" dirty="0"/>
+                <a:t>Slack</a:t>
+              </a:r>
+            </a:p>
+          </p:txBody>
+        </p:sp>
+      </p:grpSp>
+      <p:sp>
+        <p:nvSpPr>
+          <p:cNvPr id="109" name="CaixaDeTexto 108">
+            <a:extLst>
+              <a:ext uri="{FF2B5EF4-FFF2-40B4-BE49-F238E27FC236}">
+                <a16:creationId xmlns:a16="http://schemas.microsoft.com/office/drawing/2014/main" id="{E3232BF4-7574-4468-BC02-0AAB12955D8C}"/>
+              </a:ext>
+            </a:extLst>
+          </p:cNvPr>
+          <p:cNvSpPr txBox="1"/>
+          <p:nvPr/>
+        </p:nvSpPr>
+        <p:spPr>
+          <a:xfrm>
+            <a:off x="11086026" y="5614057"/>
+            <a:ext cx="637338" cy="338554"/>
+          </a:xfrm>
+          <a:prstGeom prst="rect">
+            <a:avLst/>
+          </a:prstGeom>
+          <a:noFill/>
+        </p:spPr>
+        <p:txBody>
+          <a:bodyPr wrap="square" rtlCol="0">
+            <a:spAutoFit/>
+          </a:bodyPr>
+          <a:lstStyle/>
+          <a:p>
+            <a:r>
+              <a:rPr lang="pt-BR" sz="1600" b="1" dirty="0"/>
+              <a:t>Login</a:t>
+            </a:r>
+          </a:p>
+        </p:txBody>
+      </p:sp>
+      <p:sp>
+        <p:nvSpPr>
+          <p:cNvPr id="110" name="CaixaDeTexto 109">
+            <a:extLst>
+              <a:ext uri="{FF2B5EF4-FFF2-40B4-BE49-F238E27FC236}">
+                <a16:creationId xmlns:a16="http://schemas.microsoft.com/office/drawing/2014/main" id="{B7950EE6-4619-473E-A485-ED571A593E55}"/>
+              </a:ext>
+            </a:extLst>
+          </p:cNvPr>
+          <p:cNvSpPr txBox="1"/>
+          <p:nvPr/>
+        </p:nvSpPr>
+        <p:spPr>
+          <a:xfrm>
+            <a:off x="488569" y="1428374"/>
+            <a:ext cx="568396" cy="338554"/>
+          </a:xfrm>
+          <a:prstGeom prst="rect">
+            <a:avLst/>
+          </a:prstGeom>
+          <a:noFill/>
+        </p:spPr>
+        <p:txBody>
+          <a:bodyPr wrap="square" rtlCol="0">
+            <a:spAutoFit/>
+          </a:bodyPr>
+          <a:lstStyle/>
+          <a:p>
+            <a:r>
+              <a:rPr lang="pt-BR" sz="1600" b="1" dirty="0"/>
+              <a:t>.</a:t>
+            </a:r>
+            <a:r>
+              <a:rPr lang="pt-BR" sz="1600" b="1" dirty="0" err="1"/>
+              <a:t>jar</a:t>
+            </a:r>
+            <a:endParaRPr lang="pt-BR" sz="1600" b="1" dirty="0"/>
+          </a:p>
+        </p:txBody>
+      </p:sp>
+      <p:sp>
+        <p:nvSpPr>
+          <p:cNvPr id="112" name="CaixaDeTexto 111">
+            <a:extLst>
+              <a:ext uri="{FF2B5EF4-FFF2-40B4-BE49-F238E27FC236}">
+                <a16:creationId xmlns:a16="http://schemas.microsoft.com/office/drawing/2014/main" id="{FC5AFC6C-814F-49DE-8EB7-8330D63373CC}"/>
+              </a:ext>
+            </a:extLst>
+          </p:cNvPr>
+          <p:cNvSpPr txBox="1"/>
+          <p:nvPr/>
+        </p:nvSpPr>
+        <p:spPr>
+          <a:xfrm>
+            <a:off x="1407322" y="5491751"/>
+            <a:ext cx="607008" cy="338554"/>
+          </a:xfrm>
+          <a:prstGeom prst="rect">
+            <a:avLst/>
+          </a:prstGeom>
+          <a:noFill/>
+        </p:spPr>
+        <p:txBody>
+          <a:bodyPr wrap="square" rtlCol="0">
+            <a:spAutoFit/>
+          </a:bodyPr>
+          <a:lstStyle/>
+          <a:p>
+            <a:r>
+              <a:rPr lang="pt-BR" sz="1600" b="1" dirty="0"/>
+              <a:t>Java</a:t>
+            </a:r>
+          </a:p>
+        </p:txBody>
+      </p:sp>
+      <p:sp>
+        <p:nvSpPr>
+          <p:cNvPr id="114" name="CaixaDeTexto 113">
+            <a:extLst>
+              <a:ext uri="{FF2B5EF4-FFF2-40B4-BE49-F238E27FC236}">
+                <a16:creationId xmlns:a16="http://schemas.microsoft.com/office/drawing/2014/main" id="{8D582758-A885-472B-BE95-7449A34D5092}"/>
+              </a:ext>
+            </a:extLst>
+          </p:cNvPr>
+          <p:cNvSpPr txBox="1"/>
+          <p:nvPr/>
+        </p:nvSpPr>
+        <p:spPr>
+          <a:xfrm>
+            <a:off x="488569" y="4371338"/>
+            <a:ext cx="878803" cy="338554"/>
+          </a:xfrm>
+          <a:prstGeom prst="rect">
+            <a:avLst/>
+          </a:prstGeom>
+          <a:noFill/>
+        </p:spPr>
+        <p:txBody>
+          <a:bodyPr wrap="square" rtlCol="0">
+            <a:spAutoFit/>
+          </a:bodyPr>
+          <a:lstStyle/>
+          <a:p>
+            <a:r>
+              <a:rPr lang="pt-BR" sz="1600" b="1" dirty="0" err="1"/>
+              <a:t>QRCode</a:t>
+            </a:r>
+            <a:endParaRPr lang="pt-BR" sz="1600" b="1" dirty="0"/>
+          </a:p>
+        </p:txBody>
+      </p:sp>
+      <p:sp>
+        <p:nvSpPr>
+          <p:cNvPr id="115" name="CaixaDeTexto 114">
+            <a:extLst>
+              <a:ext uri="{FF2B5EF4-FFF2-40B4-BE49-F238E27FC236}">
+                <a16:creationId xmlns:a16="http://schemas.microsoft.com/office/drawing/2014/main" id="{DCD55C8E-B68C-40BC-8A2E-151D07F8E61B}"/>
+              </a:ext>
+            </a:extLst>
+          </p:cNvPr>
+          <p:cNvSpPr txBox="1"/>
+          <p:nvPr/>
+        </p:nvSpPr>
+        <p:spPr>
+          <a:xfrm>
+            <a:off x="2126836" y="4599313"/>
+            <a:ext cx="823940" cy="338554"/>
+          </a:xfrm>
+          <a:prstGeom prst="rect">
+            <a:avLst/>
+          </a:prstGeom>
+          <a:noFill/>
+        </p:spPr>
+        <p:txBody>
+          <a:bodyPr wrap="square" rtlCol="0">
+            <a:spAutoFit/>
+          </a:bodyPr>
+          <a:lstStyle/>
+          <a:p>
+            <a:r>
+              <a:rPr lang="pt-BR" sz="1600" b="1" dirty="0"/>
+              <a:t>Totem</a:t>
+            </a:r>
+          </a:p>
+        </p:txBody>
+      </p:sp>
+      <p:grpSp>
+        <p:nvGrpSpPr>
+          <p:cNvPr id="1057" name="Agrupar 1056">
+            <a:extLst>
+              <a:ext uri="{FF2B5EF4-FFF2-40B4-BE49-F238E27FC236}">
+                <a16:creationId xmlns:a16="http://schemas.microsoft.com/office/drawing/2014/main" id="{7BF6C113-A67B-480D-BBCF-0E344D524451}"/>
+              </a:ext>
+            </a:extLst>
+          </p:cNvPr>
+          <p:cNvGrpSpPr/>
+          <p:nvPr/>
+        </p:nvGrpSpPr>
+        <p:grpSpPr>
+          <a:xfrm>
+            <a:off x="4098743" y="2928449"/>
+            <a:ext cx="3652619" cy="3069148"/>
+            <a:chOff x="4098743" y="2928449"/>
+            <a:chExt cx="3652619" cy="3069148"/>
+          </a:xfrm>
+        </p:grpSpPr>
+        <p:pic>
+          <p:nvPicPr>
+            <p:cNvPr id="1040" name="Picture 16" descr="Team">
+              <a:extLst>
+                <a:ext uri="{FF2B5EF4-FFF2-40B4-BE49-F238E27FC236}">
+                  <a16:creationId xmlns:a16="http://schemas.microsoft.com/office/drawing/2014/main" id="{612A93BF-BD56-4FA4-9A52-C4534EABD50E}"/>
+                </a:ext>
+              </a:extLst>
+            </p:cNvPr>
+            <p:cNvPicPr>
+              <a:picLocks noChangeAspect="1" noChangeArrowheads="1"/>
+            </p:cNvPicPr>
+            <p:nvPr/>
+          </p:nvPicPr>
+          <p:blipFill>
+            <a:blip r:embed="rId17">
+              <a:extLst>
+                <a:ext uri="{28A0092B-C50C-407E-A947-70E740481C1C}">
+                  <a14:useLocalDpi xmlns:a14="http://schemas.microsoft.com/office/drawing/2010/main" val="0"/>
+                </a:ext>
+              </a:extLst>
+            </a:blip>
+            <a:srcRect/>
+            <a:stretch>
+              <a:fillRect/>
+            </a:stretch>
+          </p:blipFill>
+          <p:spPr bwMode="auto">
+            <a:xfrm>
+              <a:off x="4835347" y="3460631"/>
+              <a:ext cx="1098777" cy="1098777"/>
+            </a:xfrm>
+            <a:prstGeom prst="rect">
+              <a:avLst/>
+            </a:prstGeom>
+            <a:noFill/>
+            <a:extLst>
+              <a:ext uri="{909E8E84-426E-40DD-AFC4-6F175D3DCCD1}">
+                <a14:hiddenFill xmlns:a14="http://schemas.microsoft.com/office/drawing/2010/main">
+                  <a:solidFill>
+                    <a:srgbClr val="FFFFFF"/>
+                  </a:solidFill>
+                </a14:hiddenFill>
+              </a:ext>
+            </a:extLst>
+          </p:spPr>
+        </p:pic>
+        <p:pic>
+          <p:nvPicPr>
+            <p:cNvPr id="78" name="Picture 32" descr="conteúdo da tabela">
+              <a:extLst>
+                <a:ext uri="{FF2B5EF4-FFF2-40B4-BE49-F238E27FC236}">
+                  <a16:creationId xmlns:a16="http://schemas.microsoft.com/office/drawing/2014/main" id="{6C5EB986-C435-4B34-A193-0E6722F6EAF5}"/>
+                </a:ext>
+              </a:extLst>
+            </p:cNvPr>
+            <p:cNvPicPr>
+              <a:picLocks noChangeAspect="1" noChangeArrowheads="1"/>
+            </p:cNvPicPr>
+            <p:nvPr/>
+          </p:nvPicPr>
+          <p:blipFill>
+            <a:blip r:embed="rId18">
+              <a:extLst>
+                <a:ext uri="{28A0092B-C50C-407E-A947-70E740481C1C}">
+                  <a14:useLocalDpi xmlns:a14="http://schemas.microsoft.com/office/drawing/2010/main" val="0"/>
+                </a:ext>
+              </a:extLst>
+            </a:blip>
+            <a:srcRect/>
+            <a:stretch>
+              <a:fillRect/>
+            </a:stretch>
+          </p:blipFill>
+          <p:spPr bwMode="auto">
+            <a:xfrm>
+              <a:off x="6364273" y="4214009"/>
+              <a:ext cx="1140656" cy="1140656"/>
+            </a:xfrm>
+            <a:prstGeom prst="rect">
+              <a:avLst/>
+            </a:prstGeom>
+            <a:noFill/>
+            <a:extLst>
+              <a:ext uri="{909E8E84-426E-40DD-AFC4-6F175D3DCCD1}">
+                <a14:hiddenFill xmlns:a14="http://schemas.microsoft.com/office/drawing/2010/main">
+                  <a:solidFill>
+                    <a:srgbClr val="FFFFFF"/>
+                  </a:solidFill>
+                </a14:hiddenFill>
+              </a:ext>
+            </a:extLst>
+          </p:spPr>
+        </p:pic>
+        <p:sp>
+          <p:nvSpPr>
+            <p:cNvPr id="79" name="Retângulo: Cantos Arredondados 78">
+              <a:extLst>
+                <a:ext uri="{FF2B5EF4-FFF2-40B4-BE49-F238E27FC236}">
+                  <a16:creationId xmlns:a16="http://schemas.microsoft.com/office/drawing/2014/main" id="{51FD2151-215B-48AE-A43D-BF07A5D65DB9}"/>
+                </a:ext>
+              </a:extLst>
+            </p:cNvPr>
+            <p:cNvSpPr/>
+            <p:nvPr/>
+          </p:nvSpPr>
+          <p:spPr>
+            <a:xfrm>
+              <a:off x="4276214" y="3229016"/>
+              <a:ext cx="3475148" cy="2768581"/>
+            </a:xfrm>
+            <a:prstGeom prst="roundRect">
+              <a:avLst>
+                <a:gd name="adj" fmla="val 0"/>
+              </a:avLst>
+            </a:prstGeom>
+            <a:noFill/>
+            <a:ln w="9525" cap="flat" cmpd="sng" algn="ctr">
+              <a:solidFill>
+                <a:schemeClr val="dk1"/>
+              </a:solidFill>
+              <a:prstDash val="solid"/>
+              <a:round/>
+              <a:headEnd type="none" w="med" len="med"/>
+              <a:tailEnd type="none" w="med" len="med"/>
+            </a:ln>
+            <a:effectLst>
+              <a:outerShdw blurRad="50800" dist="38100" dir="2700000" algn="tl" rotWithShape="0">
+                <a:prstClr val="black">
+                  <a:alpha val="40000"/>
+                </a:prstClr>
+              </a:outerShdw>
+            </a:effectLst>
+          </p:spPr>
+          <p:style>
+            <a:lnRef idx="0">
+              <a:scrgbClr r="0" g="0" b="0"/>
+            </a:lnRef>
+            <a:fillRef idx="0">
+              <a:scrgbClr r="0" g="0" b="0"/>
+            </a:fillRef>
+            <a:effectRef idx="0">
+              <a:scrgbClr r="0" g="0" b="0"/>
+            </a:effectRef>
+            <a:fontRef idx="minor">
+              <a:schemeClr val="dk1"/>
+            </a:fontRef>
+          </p:style>
+          <p:txBody>
+            <a:bodyPr rtlCol="0" anchor="ctr"/>
+            <a:lstStyle/>
+            <a:p>
+              <a:pPr algn="ctr"/>
+              <a:endParaRPr lang="pt-BR"/>
+            </a:p>
+          </p:txBody>
+        </p:sp>
+        <p:pic>
+          <p:nvPicPr>
+            <p:cNvPr id="80" name="Picture 10" descr="Nodejs free icon">
+              <a:extLst>
+                <a:ext uri="{FF2B5EF4-FFF2-40B4-BE49-F238E27FC236}">
+                  <a16:creationId xmlns:a16="http://schemas.microsoft.com/office/drawing/2014/main" id="{44A2EB34-A0E6-4245-9983-E1AFDAF498F0}"/>
+                </a:ext>
+              </a:extLst>
+            </p:cNvPr>
+            <p:cNvPicPr>
+              <a:picLocks noChangeAspect="1" noChangeArrowheads="1"/>
+            </p:cNvPicPr>
+            <p:nvPr/>
+          </p:nvPicPr>
+          <p:blipFill>
+            <a:blip r:embed="rId12">
+              <a:extLst>
+                <a:ext uri="{28A0092B-C50C-407E-A947-70E740481C1C}">
+                  <a14:useLocalDpi xmlns:a14="http://schemas.microsoft.com/office/drawing/2010/main" val="0"/>
+                </a:ext>
+              </a:extLst>
+            </a:blip>
+            <a:stretch>
+              <a:fillRect/>
+            </a:stretch>
+          </p:blipFill>
+          <p:spPr bwMode="auto">
+            <a:xfrm>
+              <a:off x="4507862" y="4763170"/>
+              <a:ext cx="886014" cy="886014"/>
+            </a:xfrm>
+            <a:prstGeom prst="rect">
+              <a:avLst/>
+            </a:prstGeom>
+            <a:noFill/>
+            <a:extLst>
+              <a:ext uri="{909E8E84-426E-40DD-AFC4-6F175D3DCCD1}">
+                <a14:hiddenFill xmlns:a14="http://schemas.microsoft.com/office/drawing/2010/main">
+                  <a:solidFill>
+                    <a:srgbClr val="FFFFFF"/>
+                  </a:solidFill>
+                </a14:hiddenFill>
+              </a:ext>
+            </a:extLst>
+          </p:spPr>
+        </p:pic>
+        <p:pic>
+          <p:nvPicPr>
+            <p:cNvPr id="81" name="Picture 14" descr="Warning free icon">
+              <a:extLst>
+                <a:ext uri="{FF2B5EF4-FFF2-40B4-BE49-F238E27FC236}">
+                  <a16:creationId xmlns:a16="http://schemas.microsoft.com/office/drawing/2014/main" id="{B2607F99-9769-4F52-98A5-5FC728ED16ED}"/>
+                </a:ext>
+              </a:extLst>
+            </p:cNvPr>
+            <p:cNvPicPr>
+              <a:picLocks noChangeAspect="1" noChangeArrowheads="1"/>
+            </p:cNvPicPr>
+            <p:nvPr/>
+          </p:nvPicPr>
+          <p:blipFill>
+            <a:blip r:embed="rId14">
+              <a:extLst>
+                <a:ext uri="{28A0092B-C50C-407E-A947-70E740481C1C}">
+                  <a14:useLocalDpi xmlns:a14="http://schemas.microsoft.com/office/drawing/2010/main" val="0"/>
+                </a:ext>
+              </a:extLst>
+            </a:blip>
+            <a:srcRect/>
+            <a:stretch>
+              <a:fillRect/>
+            </a:stretch>
+          </p:blipFill>
+          <p:spPr bwMode="auto">
+            <a:xfrm>
+              <a:off x="4098743" y="2928449"/>
+              <a:ext cx="496761" cy="496761"/>
+            </a:xfrm>
+            <a:prstGeom prst="rect">
+              <a:avLst/>
+            </a:prstGeom>
+            <a:noFill/>
+            <a:extLst>
+              <a:ext uri="{909E8E84-426E-40DD-AFC4-6F175D3DCCD1}">
+                <a14:hiddenFill xmlns:a14="http://schemas.microsoft.com/office/drawing/2010/main">
+                  <a:solidFill>
+                    <a:srgbClr val="FFFFFF"/>
+                  </a:solidFill>
+                </a14:hiddenFill>
+              </a:ext>
+            </a:extLst>
+          </p:spPr>
+        </p:pic>
+        <p:sp>
+          <p:nvSpPr>
+            <p:cNvPr id="108" name="CaixaDeTexto 107">
+              <a:extLst>
+                <a:ext uri="{FF2B5EF4-FFF2-40B4-BE49-F238E27FC236}">
+                  <a16:creationId xmlns:a16="http://schemas.microsoft.com/office/drawing/2014/main" id="{B8F23A74-2B1F-482E-B812-3BF5618C4B9A}"/>
+                </a:ext>
+              </a:extLst>
+            </p:cNvPr>
+            <p:cNvSpPr txBox="1"/>
+            <p:nvPr/>
+          </p:nvSpPr>
+          <p:spPr>
+            <a:xfrm>
+              <a:off x="4471186" y="5621404"/>
+              <a:ext cx="959365" cy="338554"/>
+            </a:xfrm>
+            <a:prstGeom prst="rect">
+              <a:avLst/>
+            </a:prstGeom>
+            <a:noFill/>
+          </p:spPr>
+          <p:txBody>
+            <a:bodyPr wrap="square" rtlCol="0">
+              <a:spAutoFit/>
+            </a:bodyPr>
+            <a:lstStyle/>
+            <a:p>
+              <a:r>
+                <a:rPr lang="pt-BR" sz="1600" b="1" dirty="0"/>
+                <a:t>Cadastro</a:t>
+              </a:r>
+            </a:p>
+          </p:txBody>
+        </p:sp>
+        <p:sp>
+          <p:nvSpPr>
+            <p:cNvPr id="122" name="CaixaDeTexto 121">
+              <a:extLst>
+                <a:ext uri="{FF2B5EF4-FFF2-40B4-BE49-F238E27FC236}">
+                  <a16:creationId xmlns:a16="http://schemas.microsoft.com/office/drawing/2014/main" id="{A67C30BE-D11B-4C06-80A4-FE2647CCFDF6}"/>
+                </a:ext>
+              </a:extLst>
+            </p:cNvPr>
+            <p:cNvSpPr txBox="1"/>
+            <p:nvPr/>
+          </p:nvSpPr>
+          <p:spPr>
+            <a:xfrm>
+              <a:off x="6265105" y="5245530"/>
+              <a:ext cx="1331526" cy="584775"/>
+            </a:xfrm>
+            <a:prstGeom prst="rect">
+              <a:avLst/>
+            </a:prstGeom>
+            <a:noFill/>
+          </p:spPr>
+          <p:txBody>
+            <a:bodyPr wrap="square" rtlCol="0">
+              <a:spAutoFit/>
+            </a:bodyPr>
+            <a:lstStyle/>
+            <a:p>
+              <a:pPr algn="ctr"/>
+              <a:r>
+                <a:rPr lang="pt-BR" sz="1600" b="1" dirty="0"/>
+                <a:t>Controle de cadastro</a:t>
+              </a:r>
+            </a:p>
+          </p:txBody>
+        </p:sp>
+      </p:grpSp>
+    </p:spTree>
+    <p:extLst>
+      <p:ext uri="{BB962C8B-B14F-4D97-AF65-F5344CB8AC3E}">
+        <p14:creationId xmlns:p14="http://schemas.microsoft.com/office/powerpoint/2010/main" val="4086607182"/>
       </p:ext>
     </p:extLst>
   </p:cSld>

</xml_diff>

<commit_message>
subindo nova versão diagrama de software
</commit_message>
<xml_diff>
--- a/Documentação/arquitetura/diagrama_software.pptx
+++ b/Documentação/arquitetura/diagrama_software.pptx
@@ -5,8 +5,7 @@
     <p:sldMasterId id="2147483648" r:id="rId1"/>
   </p:sldMasterIdLst>
   <p:sldIdLst>
-    <p:sldId id="257" r:id="rId2"/>
-    <p:sldId id="258" r:id="rId3"/>
+    <p:sldId id="258" r:id="rId2"/>
   </p:sldIdLst>
   <p:sldSz cx="12192000" cy="6858000"/>
   <p:notesSz cx="6858000" cy="9144000"/>
@@ -260,7 +259,7 @@
           <a:p>
             <a:fld id="{DFA6C581-6C24-4FE8-96B9-9DFD4212CBDB}" type="datetimeFigureOut">
               <a:rPr lang="pt-BR" smtClean="0"/>
-              <a:t>03/11/2021</a:t>
+              <a:t>15/11/2021</a:t>
             </a:fld>
             <a:endParaRPr lang="pt-BR"/>
           </a:p>
@@ -458,7 +457,7 @@
           <a:p>
             <a:fld id="{DFA6C581-6C24-4FE8-96B9-9DFD4212CBDB}" type="datetimeFigureOut">
               <a:rPr lang="pt-BR" smtClean="0"/>
-              <a:t>03/11/2021</a:t>
+              <a:t>15/11/2021</a:t>
             </a:fld>
             <a:endParaRPr lang="pt-BR"/>
           </a:p>
@@ -666,7 +665,7 @@
           <a:p>
             <a:fld id="{DFA6C581-6C24-4FE8-96B9-9DFD4212CBDB}" type="datetimeFigureOut">
               <a:rPr lang="pt-BR" smtClean="0"/>
-              <a:t>03/11/2021</a:t>
+              <a:t>15/11/2021</a:t>
             </a:fld>
             <a:endParaRPr lang="pt-BR"/>
           </a:p>
@@ -864,7 +863,7 @@
           <a:p>
             <a:fld id="{DFA6C581-6C24-4FE8-96B9-9DFD4212CBDB}" type="datetimeFigureOut">
               <a:rPr lang="pt-BR" smtClean="0"/>
-              <a:t>03/11/2021</a:t>
+              <a:t>15/11/2021</a:t>
             </a:fld>
             <a:endParaRPr lang="pt-BR"/>
           </a:p>
@@ -1139,7 +1138,7 @@
           <a:p>
             <a:fld id="{DFA6C581-6C24-4FE8-96B9-9DFD4212CBDB}" type="datetimeFigureOut">
               <a:rPr lang="pt-BR" smtClean="0"/>
-              <a:t>03/11/2021</a:t>
+              <a:t>15/11/2021</a:t>
             </a:fld>
             <a:endParaRPr lang="pt-BR"/>
           </a:p>
@@ -1404,7 +1403,7 @@
           <a:p>
             <a:fld id="{DFA6C581-6C24-4FE8-96B9-9DFD4212CBDB}" type="datetimeFigureOut">
               <a:rPr lang="pt-BR" smtClean="0"/>
-              <a:t>03/11/2021</a:t>
+              <a:t>15/11/2021</a:t>
             </a:fld>
             <a:endParaRPr lang="pt-BR"/>
           </a:p>
@@ -1816,7 +1815,7 @@
           <a:p>
             <a:fld id="{DFA6C581-6C24-4FE8-96B9-9DFD4212CBDB}" type="datetimeFigureOut">
               <a:rPr lang="pt-BR" smtClean="0"/>
-              <a:t>03/11/2021</a:t>
+              <a:t>15/11/2021</a:t>
             </a:fld>
             <a:endParaRPr lang="pt-BR"/>
           </a:p>
@@ -1957,7 +1956,7 @@
           <a:p>
             <a:fld id="{DFA6C581-6C24-4FE8-96B9-9DFD4212CBDB}" type="datetimeFigureOut">
               <a:rPr lang="pt-BR" smtClean="0"/>
-              <a:t>03/11/2021</a:t>
+              <a:t>15/11/2021</a:t>
             </a:fld>
             <a:endParaRPr lang="pt-BR"/>
           </a:p>
@@ -2070,7 +2069,7 @@
           <a:p>
             <a:fld id="{DFA6C581-6C24-4FE8-96B9-9DFD4212CBDB}" type="datetimeFigureOut">
               <a:rPr lang="pt-BR" smtClean="0"/>
-              <a:t>03/11/2021</a:t>
+              <a:t>15/11/2021</a:t>
             </a:fld>
             <a:endParaRPr lang="pt-BR"/>
           </a:p>
@@ -2381,7 +2380,7 @@
           <a:p>
             <a:fld id="{DFA6C581-6C24-4FE8-96B9-9DFD4212CBDB}" type="datetimeFigureOut">
               <a:rPr lang="pt-BR" smtClean="0"/>
-              <a:t>03/11/2021</a:t>
+              <a:t>15/11/2021</a:t>
             </a:fld>
             <a:endParaRPr lang="pt-BR"/>
           </a:p>
@@ -2669,7 +2668,7 @@
           <a:p>
             <a:fld id="{DFA6C581-6C24-4FE8-96B9-9DFD4212CBDB}" type="datetimeFigureOut">
               <a:rPr lang="pt-BR" smtClean="0"/>
-              <a:t>03/11/2021</a:t>
+              <a:t>15/11/2021</a:t>
             </a:fld>
             <a:endParaRPr lang="pt-BR"/>
           </a:p>
@@ -2910,7 +2909,7 @@
           <a:p>
             <a:fld id="{DFA6C581-6C24-4FE8-96B9-9DFD4212CBDB}" type="datetimeFigureOut">
               <a:rPr lang="pt-BR" smtClean="0"/>
-              <a:t>03/11/2021</a:t>
+              <a:t>15/11/2021</a:t>
             </a:fld>
             <a:endParaRPr lang="pt-BR"/>
           </a:p>
@@ -3313,14 +3312,6 @@
 <file path=ppt/slides/slide1.xml><?xml version="1.0" encoding="utf-8"?>
 <p:sld xmlns:a="http://schemas.openxmlformats.org/drawingml/2006/main" xmlns:r="http://schemas.openxmlformats.org/officeDocument/2006/relationships" xmlns:p="http://schemas.openxmlformats.org/presentationml/2006/main">
   <p:cSld>
-    <p:bg>
-      <p:bgPr>
-        <a:solidFill>
-          <a:schemeClr val="bg1"/>
-        </a:solidFill>
-        <a:effectLst/>
-      </p:bgPr>
-    </p:bg>
     <p:spTree>
       <p:nvGrpSpPr>
         <p:cNvPr id="1" name=""/>
@@ -3335,59 +3326,12 @@
           <a:chExt cx="0" cy="0"/>
         </a:xfrm>
       </p:grpSpPr>
-      <p:pic>
-        <p:nvPicPr>
-          <p:cNvPr id="2062" name="Picture 14" descr="Business report">
-            <a:extLst>
-              <a:ext uri="{FF2B5EF4-FFF2-40B4-BE49-F238E27FC236}">
-                <a16:creationId xmlns:a16="http://schemas.microsoft.com/office/drawing/2014/main" id="{A236C859-1C03-45D2-8006-735841AE3667}"/>
-              </a:ext>
-            </a:extLst>
-          </p:cNvPr>
-          <p:cNvPicPr>
-            <a:picLocks noChangeAspect="1" noChangeArrowheads="1"/>
-          </p:cNvPicPr>
-          <p:nvPr/>
-        </p:nvPicPr>
-        <p:blipFill>
-          <a:blip r:embed="rId2">
-            <a:extLst>
-              <a:ext uri="{28A0092B-C50C-407E-A947-70E740481C1C}">
-                <a14:useLocalDpi xmlns:a14="http://schemas.microsoft.com/office/drawing/2010/main" val="0"/>
-              </a:ext>
-            </a:extLst>
-          </a:blip>
-          <a:srcRect/>
-          <a:stretch>
-            <a:fillRect/>
-          </a:stretch>
-        </p:blipFill>
-        <p:spPr bwMode="auto">
-          <a:xfrm>
-            <a:off x="1074692" y="833320"/>
-            <a:ext cx="1140656" cy="1140656"/>
-          </a:xfrm>
-          <a:prstGeom prst="rect">
-            <a:avLst/>
-          </a:prstGeom>
-          <a:noFill/>
-          <a:extLst>
-            <a:ext uri="{909E8E84-426E-40DD-AFC4-6F175D3DCCD1}">
-              <a14:hiddenFill xmlns:a14="http://schemas.microsoft.com/office/drawing/2010/main">
-                <a:solidFill>
-                  <a:srgbClr val="FFFFFF"/>
-                </a:solidFill>
-              </a14:hiddenFill>
-            </a:ext>
-          </a:extLst>
-        </p:spPr>
-      </p:pic>
-      <p:sp>
-        <p:nvSpPr>
-          <p:cNvPr id="20" name="Balão de Pensamento: Nuvem 19">
-            <a:extLst>
-              <a:ext uri="{FF2B5EF4-FFF2-40B4-BE49-F238E27FC236}">
-                <a16:creationId xmlns:a16="http://schemas.microsoft.com/office/drawing/2014/main" id="{B3BBBE8B-E743-41DD-8DFA-B6D8D19FB440}"/>
+      <p:sp>
+        <p:nvSpPr>
+          <p:cNvPr id="5" name="Nuvem 4">
+            <a:extLst>
+              <a:ext uri="{FF2B5EF4-FFF2-40B4-BE49-F238E27FC236}">
+                <a16:creationId xmlns:a16="http://schemas.microsoft.com/office/drawing/2014/main" id="{7D8A9C01-6E8D-47BD-9576-47950182459D}"/>
               </a:ext>
             </a:extLst>
           </p:cNvPr>
@@ -3395,763 +3339,8 @@
           <p:nvPr/>
         </p:nvSpPr>
         <p:spPr>
-          <a:xfrm rot="16200000">
-            <a:off x="3688616" y="-5462814"/>
-            <a:ext cx="11306071" cy="9848793"/>
-          </a:xfrm>
-          <a:prstGeom prst="cloudCallout">
-            <a:avLst/>
-          </a:prstGeom>
-          <a:noFill/>
-          <a:ln w="9525" cap="flat" cmpd="sng" algn="ctr">
-            <a:solidFill>
-              <a:schemeClr val="dk1"/>
-            </a:solidFill>
-            <a:prstDash val="solid"/>
-            <a:round/>
-            <a:headEnd type="none" w="med" len="med"/>
-            <a:tailEnd type="none" w="med" len="med"/>
-          </a:ln>
-        </p:spPr>
-        <p:style>
-          <a:lnRef idx="0">
-            <a:scrgbClr r="0" g="0" b="0"/>
-          </a:lnRef>
-          <a:fillRef idx="0">
-            <a:scrgbClr r="0" g="0" b="0"/>
-          </a:fillRef>
-          <a:effectRef idx="0">
-            <a:scrgbClr r="0" g="0" b="0"/>
-          </a:effectRef>
-          <a:fontRef idx="minor">
-            <a:schemeClr val="dk1"/>
-          </a:fontRef>
-        </p:style>
-        <p:txBody>
-          <a:bodyPr rtlCol="0" anchor="ctr"/>
-          <a:lstStyle/>
-          <a:p>
-            <a:pPr algn="ctr"/>
-            <a:endParaRPr lang="pt-BR" dirty="0"/>
-          </a:p>
-        </p:txBody>
-      </p:sp>
-      <p:grpSp>
-        <p:nvGrpSpPr>
-          <p:cNvPr id="23" name="Agrupar 22">
-            <a:extLst>
-              <a:ext uri="{FF2B5EF4-FFF2-40B4-BE49-F238E27FC236}">
-                <a16:creationId xmlns:a16="http://schemas.microsoft.com/office/drawing/2014/main" id="{87ACDFC7-CDF2-4606-A719-D970666FB211}"/>
-              </a:ext>
-            </a:extLst>
-          </p:cNvPr>
-          <p:cNvGrpSpPr/>
-          <p:nvPr/>
-        </p:nvGrpSpPr>
-        <p:grpSpPr>
-          <a:xfrm>
-            <a:off x="6320853" y="2572170"/>
-            <a:ext cx="1213908" cy="1129381"/>
-            <a:chOff x="10582601" y="2968735"/>
-            <a:chExt cx="1213908" cy="1129381"/>
-          </a:xfrm>
-        </p:grpSpPr>
-        <p:pic>
-          <p:nvPicPr>
-            <p:cNvPr id="2060" name="Picture 12" descr="Server free icon">
-              <a:extLst>
-                <a:ext uri="{FF2B5EF4-FFF2-40B4-BE49-F238E27FC236}">
-                  <a16:creationId xmlns:a16="http://schemas.microsoft.com/office/drawing/2014/main" id="{BE151CF4-C3A8-4845-87CC-D5AB01732602}"/>
-                </a:ext>
-              </a:extLst>
-            </p:cNvPr>
-            <p:cNvPicPr>
-              <a:picLocks noChangeAspect="1" noChangeArrowheads="1"/>
-            </p:cNvPicPr>
-            <p:nvPr/>
-          </p:nvPicPr>
-          <p:blipFill>
-            <a:blip r:embed="rId3">
-              <a:extLst>
-                <a:ext uri="{28A0092B-C50C-407E-A947-70E740481C1C}">
-                  <a14:useLocalDpi xmlns:a14="http://schemas.microsoft.com/office/drawing/2010/main" val="0"/>
-                </a:ext>
-              </a:extLst>
-            </a:blip>
-            <a:srcRect/>
-            <a:stretch>
-              <a:fillRect/>
-            </a:stretch>
-          </p:blipFill>
-          <p:spPr bwMode="auto">
-            <a:xfrm>
-              <a:off x="10828698" y="2968735"/>
-              <a:ext cx="721715" cy="721715"/>
-            </a:xfrm>
-            <a:prstGeom prst="rect">
-              <a:avLst/>
-            </a:prstGeom>
-            <a:noFill/>
-            <a:extLst>
-              <a:ext uri="{909E8E84-426E-40DD-AFC4-6F175D3DCCD1}">
-                <a14:hiddenFill xmlns:a14="http://schemas.microsoft.com/office/drawing/2010/main">
-                  <a:solidFill>
-                    <a:srgbClr val="FFFFFF"/>
-                  </a:solidFill>
-                </a14:hiddenFill>
-              </a:ext>
-            </a:extLst>
-          </p:spPr>
-        </p:pic>
-        <p:sp>
-          <p:nvSpPr>
-            <p:cNvPr id="22" name="CaixaDeTexto 21">
-              <a:extLst>
-                <a:ext uri="{FF2B5EF4-FFF2-40B4-BE49-F238E27FC236}">
-                  <a16:creationId xmlns:a16="http://schemas.microsoft.com/office/drawing/2014/main" id="{338B3DEB-C7A4-4C32-89BC-8D7DCB6A74ED}"/>
-                </a:ext>
-              </a:extLst>
-            </p:cNvPr>
-            <p:cNvSpPr txBox="1"/>
-            <p:nvPr/>
-          </p:nvSpPr>
-          <p:spPr>
-            <a:xfrm>
-              <a:off x="10582601" y="3728784"/>
-              <a:ext cx="1213908" cy="369332"/>
-            </a:xfrm>
-            <a:prstGeom prst="rect">
-              <a:avLst/>
-            </a:prstGeom>
-            <a:noFill/>
-          </p:spPr>
-          <p:txBody>
-            <a:bodyPr wrap="square" rtlCol="0">
-              <a:spAutoFit/>
-            </a:bodyPr>
-            <a:lstStyle/>
-            <a:p>
-              <a:r>
-                <a:rPr lang="pt-BR" dirty="0"/>
-                <a:t>SQL Server</a:t>
-              </a:r>
-            </a:p>
-          </p:txBody>
-        </p:sp>
-      </p:grpSp>
-      <p:pic>
-        <p:nvPicPr>
-          <p:cNvPr id="2076" name="Picture 28" descr="Imagem">
-            <a:extLst>
-              <a:ext uri="{FF2B5EF4-FFF2-40B4-BE49-F238E27FC236}">
-                <a16:creationId xmlns:a16="http://schemas.microsoft.com/office/drawing/2014/main" id="{41566129-CF4C-4496-A6AA-495C1EF35F2F}"/>
-              </a:ext>
-            </a:extLst>
-          </p:cNvPr>
-          <p:cNvPicPr>
-            <a:picLocks noChangeAspect="1" noChangeArrowheads="1"/>
-          </p:cNvPicPr>
-          <p:nvPr/>
-        </p:nvPicPr>
-        <p:blipFill>
-          <a:blip r:embed="rId4">
-            <a:extLst>
-              <a:ext uri="{28A0092B-C50C-407E-A947-70E740481C1C}">
-                <a14:useLocalDpi xmlns:a14="http://schemas.microsoft.com/office/drawing/2010/main" val="0"/>
-              </a:ext>
-            </a:extLst>
-          </a:blip>
-          <a:srcRect/>
-          <a:stretch>
-            <a:fillRect/>
-          </a:stretch>
-        </p:blipFill>
-        <p:spPr bwMode="auto">
-          <a:xfrm>
-            <a:off x="283788" y="3860336"/>
-            <a:ext cx="3108003" cy="1678737"/>
-          </a:xfrm>
-          <a:prstGeom prst="rect">
-            <a:avLst/>
-          </a:prstGeom>
-          <a:noFill/>
-          <a:extLst>
-            <a:ext uri="{909E8E84-426E-40DD-AFC4-6F175D3DCCD1}">
-              <a14:hiddenFill xmlns:a14="http://schemas.microsoft.com/office/drawing/2010/main">
-                <a:solidFill>
-                  <a:srgbClr val="FFFFFF"/>
-                </a:solidFill>
-              </a14:hiddenFill>
-            </a:ext>
-          </a:extLst>
-        </p:spPr>
-      </p:pic>
-      <p:pic>
-        <p:nvPicPr>
-          <p:cNvPr id="2058" name="Picture 10" descr="Nodejs free icon">
-            <a:extLst>
-              <a:ext uri="{FF2B5EF4-FFF2-40B4-BE49-F238E27FC236}">
-                <a16:creationId xmlns:a16="http://schemas.microsoft.com/office/drawing/2014/main" id="{B258033D-B4C6-4863-9E05-DB04A3313D9E}"/>
-              </a:ext>
-            </a:extLst>
-          </p:cNvPr>
-          <p:cNvPicPr>
-            <a:picLocks noChangeAspect="1" noChangeArrowheads="1"/>
-          </p:cNvPicPr>
-          <p:nvPr/>
-        </p:nvPicPr>
-        <p:blipFill>
-          <a:blip r:embed="rId5">
-            <a:extLst>
-              <a:ext uri="{28A0092B-C50C-407E-A947-70E740481C1C}">
-                <a14:useLocalDpi xmlns:a14="http://schemas.microsoft.com/office/drawing/2010/main" val="0"/>
-              </a:ext>
-            </a:extLst>
-          </a:blip>
-          <a:stretch>
-            <a:fillRect/>
-          </a:stretch>
-        </p:blipFill>
-        <p:spPr bwMode="auto">
-          <a:xfrm>
-            <a:off x="10668890" y="1807795"/>
-            <a:ext cx="886014" cy="886014"/>
-          </a:xfrm>
-          <a:prstGeom prst="rect">
-            <a:avLst/>
-          </a:prstGeom>
-          <a:noFill/>
-          <a:extLst>
-            <a:ext uri="{909E8E84-426E-40DD-AFC4-6F175D3DCCD1}">
-              <a14:hiddenFill xmlns:a14="http://schemas.microsoft.com/office/drawing/2010/main">
-                <a:solidFill>
-                  <a:srgbClr val="FFFFFF"/>
-                </a:solidFill>
-              </a14:hiddenFill>
-            </a:ext>
-          </a:extLst>
-        </p:spPr>
-      </p:pic>
-      <p:pic>
-        <p:nvPicPr>
-          <p:cNvPr id="42" name="Imagem 41">
-            <a:extLst>
-              <a:ext uri="{FF2B5EF4-FFF2-40B4-BE49-F238E27FC236}">
-                <a16:creationId xmlns:a16="http://schemas.microsoft.com/office/drawing/2014/main" id="{10D3B6F3-B4E8-40C0-AEEF-B9D2E32415C8}"/>
-              </a:ext>
-            </a:extLst>
-          </p:cNvPr>
-          <p:cNvPicPr>
-            <a:picLocks noChangeAspect="1"/>
-          </p:cNvPicPr>
-          <p:nvPr/>
-        </p:nvPicPr>
-        <p:blipFill>
-          <a:blip r:embed="rId6"/>
-          <a:stretch>
-            <a:fillRect/>
-          </a:stretch>
-        </p:blipFill>
-        <p:spPr>
-          <a:xfrm>
-            <a:off x="1260394" y="4884025"/>
-            <a:ext cx="3097546" cy="1549947"/>
-          </a:xfrm>
-          <a:prstGeom prst="rect">
-            <a:avLst/>
-          </a:prstGeom>
-        </p:spPr>
-      </p:pic>
-      <p:pic>
-        <p:nvPicPr>
-          <p:cNvPr id="16" name="Imagem 15" descr="Trem de metrô&#10;&#10;Descrição gerada automaticamente">
-            <a:extLst>
-              <a:ext uri="{FF2B5EF4-FFF2-40B4-BE49-F238E27FC236}">
-                <a16:creationId xmlns:a16="http://schemas.microsoft.com/office/drawing/2014/main" id="{8B90ABAE-D047-41BD-BECF-066B27E54CC8}"/>
-              </a:ext>
-            </a:extLst>
-          </p:cNvPr>
-          <p:cNvPicPr>
-            <a:picLocks noChangeAspect="1"/>
-          </p:cNvPicPr>
-          <p:nvPr/>
-        </p:nvPicPr>
-        <p:blipFill>
-          <a:blip r:embed="rId7">
-            <a:extLst>
-              <a:ext uri="{28A0092B-C50C-407E-A947-70E740481C1C}">
-                <a14:useLocalDpi xmlns:a14="http://schemas.microsoft.com/office/drawing/2010/main" val="0"/>
-              </a:ext>
-            </a:extLst>
-          </a:blip>
-          <a:stretch>
-            <a:fillRect/>
-          </a:stretch>
-        </p:blipFill>
-        <p:spPr>
-          <a:xfrm>
-            <a:off x="6204325" y="625946"/>
-            <a:ext cx="2963561" cy="1662538"/>
-          </a:xfrm>
-          <a:prstGeom prst="rect">
-            <a:avLst/>
-          </a:prstGeom>
-        </p:spPr>
-      </p:pic>
-      <p:pic>
-        <p:nvPicPr>
-          <p:cNvPr id="2066" name="Picture 18" descr="Ver a imagem de origem">
-            <a:extLst>
-              <a:ext uri="{FF2B5EF4-FFF2-40B4-BE49-F238E27FC236}">
-                <a16:creationId xmlns:a16="http://schemas.microsoft.com/office/drawing/2014/main" id="{46C27DB8-6993-4731-B7ED-2FFE21F2C01B}"/>
-              </a:ext>
-            </a:extLst>
-          </p:cNvPr>
-          <p:cNvPicPr>
-            <a:picLocks noChangeAspect="1" noChangeArrowheads="1"/>
-          </p:cNvPicPr>
-          <p:nvPr/>
-        </p:nvPicPr>
-        <p:blipFill>
-          <a:blip r:embed="rId8">
-            <a:extLst>
-              <a:ext uri="{28A0092B-C50C-407E-A947-70E740481C1C}">
-                <a14:useLocalDpi xmlns:a14="http://schemas.microsoft.com/office/drawing/2010/main" val="0"/>
-              </a:ext>
-            </a:extLst>
-          </a:blip>
-          <a:srcRect/>
-          <a:stretch>
-            <a:fillRect/>
-          </a:stretch>
-        </p:blipFill>
-        <p:spPr bwMode="auto">
-          <a:xfrm>
-            <a:off x="9613761" y="3060344"/>
-            <a:ext cx="1857503" cy="773960"/>
-          </a:xfrm>
-          <a:prstGeom prst="rect">
-            <a:avLst/>
-          </a:prstGeom>
-          <a:noFill/>
-          <a:extLst>
-            <a:ext uri="{909E8E84-426E-40DD-AFC4-6F175D3DCCD1}">
-              <a14:hiddenFill xmlns:a14="http://schemas.microsoft.com/office/drawing/2010/main">
-                <a:solidFill>
-                  <a:srgbClr val="FFFFFF"/>
-                </a:solidFill>
-              </a14:hiddenFill>
-            </a:ext>
-          </a:extLst>
-        </p:spPr>
-      </p:pic>
-      <p:pic>
-        <p:nvPicPr>
-          <p:cNvPr id="2068" name="Picture 20" descr="css grátis ícone">
-            <a:extLst>
-              <a:ext uri="{FF2B5EF4-FFF2-40B4-BE49-F238E27FC236}">
-                <a16:creationId xmlns:a16="http://schemas.microsoft.com/office/drawing/2014/main" id="{5636830B-7879-45B6-8C98-03939EB63098}"/>
-              </a:ext>
-            </a:extLst>
-          </p:cNvPr>
-          <p:cNvPicPr>
-            <a:picLocks noChangeAspect="1" noChangeArrowheads="1"/>
-          </p:cNvPicPr>
-          <p:nvPr/>
-        </p:nvPicPr>
-        <p:blipFill>
-          <a:blip r:embed="rId9">
-            <a:extLst>
-              <a:ext uri="{28A0092B-C50C-407E-A947-70E740481C1C}">
-                <a14:useLocalDpi xmlns:a14="http://schemas.microsoft.com/office/drawing/2010/main" val="0"/>
-              </a:ext>
-            </a:extLst>
-          </a:blip>
-          <a:srcRect/>
-          <a:stretch>
-            <a:fillRect/>
-          </a:stretch>
-        </p:blipFill>
-        <p:spPr bwMode="auto">
-          <a:xfrm>
-            <a:off x="9440176" y="728859"/>
-            <a:ext cx="821107" cy="821107"/>
-          </a:xfrm>
-          <a:prstGeom prst="rect">
-            <a:avLst/>
-          </a:prstGeom>
-          <a:noFill/>
-          <a:extLst>
-            <a:ext uri="{909E8E84-426E-40DD-AFC4-6F175D3DCCD1}">
-              <a14:hiddenFill xmlns:a14="http://schemas.microsoft.com/office/drawing/2010/main">
-                <a:solidFill>
-                  <a:srgbClr val="FFFFFF"/>
-                </a:solidFill>
-              </a14:hiddenFill>
-            </a:ext>
-          </a:extLst>
-        </p:spPr>
-      </p:pic>
-      <p:pic>
-        <p:nvPicPr>
-          <p:cNvPr id="2070" name="Picture 22" descr="javascript grátis ícone">
-            <a:extLst>
-              <a:ext uri="{FF2B5EF4-FFF2-40B4-BE49-F238E27FC236}">
-                <a16:creationId xmlns:a16="http://schemas.microsoft.com/office/drawing/2014/main" id="{BE230740-2DF9-42AD-BCA5-AFEDDC97B435}"/>
-              </a:ext>
-            </a:extLst>
-          </p:cNvPr>
-          <p:cNvPicPr>
-            <a:picLocks noChangeAspect="1" noChangeArrowheads="1"/>
-          </p:cNvPicPr>
-          <p:nvPr/>
-        </p:nvPicPr>
-        <p:blipFill>
-          <a:blip r:embed="rId10">
-            <a:extLst>
-              <a:ext uri="{28A0092B-C50C-407E-A947-70E740481C1C}">
-                <a14:useLocalDpi xmlns:a14="http://schemas.microsoft.com/office/drawing/2010/main" val="0"/>
-              </a:ext>
-            </a:extLst>
-          </a:blip>
-          <a:srcRect/>
-          <a:stretch>
-            <a:fillRect/>
-          </a:stretch>
-        </p:blipFill>
-        <p:spPr bwMode="auto">
-          <a:xfrm>
-            <a:off x="9440176" y="1870886"/>
-            <a:ext cx="886014" cy="822923"/>
-          </a:xfrm>
-          <a:prstGeom prst="rect">
-            <a:avLst/>
-          </a:prstGeom>
-          <a:noFill/>
-          <a:extLst>
-            <a:ext uri="{909E8E84-426E-40DD-AFC4-6F175D3DCCD1}">
-              <a14:hiddenFill xmlns:a14="http://schemas.microsoft.com/office/drawing/2010/main">
-                <a:solidFill>
-                  <a:srgbClr val="FFFFFF"/>
-                </a:solidFill>
-              </a14:hiddenFill>
-            </a:ext>
-          </a:extLst>
-        </p:spPr>
-      </p:pic>
-      <p:pic>
-        <p:nvPicPr>
-          <p:cNvPr id="2074" name="Picture 26" descr="Ver a imagem de origem">
-            <a:extLst>
-              <a:ext uri="{FF2B5EF4-FFF2-40B4-BE49-F238E27FC236}">
-                <a16:creationId xmlns:a16="http://schemas.microsoft.com/office/drawing/2014/main" id="{D6252C49-E560-421A-BA4F-FF838A792DE5}"/>
-              </a:ext>
-            </a:extLst>
-          </p:cNvPr>
-          <p:cNvPicPr>
-            <a:picLocks noChangeAspect="1" noChangeArrowheads="1"/>
-          </p:cNvPicPr>
-          <p:nvPr/>
-        </p:nvPicPr>
-        <p:blipFill>
-          <a:blip r:embed="rId11">
-            <a:extLst>
-              <a:ext uri="{28A0092B-C50C-407E-A947-70E740481C1C}">
-                <a14:useLocalDpi xmlns:a14="http://schemas.microsoft.com/office/drawing/2010/main" val="0"/>
-              </a:ext>
-            </a:extLst>
-          </a:blip>
-          <a:srcRect/>
-          <a:stretch>
-            <a:fillRect/>
-          </a:stretch>
-        </p:blipFill>
-        <p:spPr bwMode="auto">
-          <a:xfrm>
-            <a:off x="10562253" y="728859"/>
-            <a:ext cx="996606" cy="1006429"/>
-          </a:xfrm>
-          <a:prstGeom prst="rect">
-            <a:avLst/>
-          </a:prstGeom>
-          <a:noFill/>
-          <a:extLst>
-            <a:ext uri="{909E8E84-426E-40DD-AFC4-6F175D3DCCD1}">
-              <a14:hiddenFill xmlns:a14="http://schemas.microsoft.com/office/drawing/2010/main">
-                <a:solidFill>
-                  <a:srgbClr val="FFFFFF"/>
-                </a:solidFill>
-              </a14:hiddenFill>
-            </a:ext>
-          </a:extLst>
-        </p:spPr>
-      </p:pic>
-      <p:sp>
-        <p:nvSpPr>
-          <p:cNvPr id="58" name="CaixaDeTexto 57">
-            <a:extLst>
-              <a:ext uri="{FF2B5EF4-FFF2-40B4-BE49-F238E27FC236}">
-                <a16:creationId xmlns:a16="http://schemas.microsoft.com/office/drawing/2014/main" id="{9A873E67-C3CA-4DC3-B4A9-D0B863BA84EB}"/>
-              </a:ext>
-            </a:extLst>
-          </p:cNvPr>
-          <p:cNvSpPr txBox="1"/>
-          <p:nvPr/>
-        </p:nvSpPr>
-        <p:spPr>
-          <a:xfrm>
-            <a:off x="7824409" y="-3992"/>
-            <a:ext cx="2686954" cy="523220"/>
-          </a:xfrm>
-          <a:prstGeom prst="rect">
-            <a:avLst/>
-          </a:prstGeom>
-          <a:noFill/>
-        </p:spPr>
-        <p:txBody>
-          <a:bodyPr wrap="none" rtlCol="0">
-            <a:spAutoFit/>
-          </a:bodyPr>
-          <a:lstStyle/>
-          <a:p>
-            <a:r>
-              <a:rPr lang="pt-BR" sz="2800" dirty="0">
-                <a:latin typeface="Aharoni" panose="02010803020104030203" pitchFamily="2" charset="-79"/>
-                <a:cs typeface="Aharoni" panose="02010803020104030203" pitchFamily="2" charset="-79"/>
-              </a:rPr>
-              <a:t>Aplicação web</a:t>
-            </a:r>
-          </a:p>
-        </p:txBody>
-      </p:sp>
-      <p:pic>
-        <p:nvPicPr>
-          <p:cNvPr id="2078" name="Picture 30" descr="Qr code free icon">
-            <a:extLst>
-              <a:ext uri="{FF2B5EF4-FFF2-40B4-BE49-F238E27FC236}">
-                <a16:creationId xmlns:a16="http://schemas.microsoft.com/office/drawing/2014/main" id="{FEAC9AE8-C204-4FDA-A315-7FE5D0D5CBC7}"/>
-              </a:ext>
-            </a:extLst>
-          </p:cNvPr>
-          <p:cNvPicPr>
-            <a:picLocks noChangeAspect="1" noChangeArrowheads="1"/>
-          </p:cNvPicPr>
-          <p:nvPr/>
-        </p:nvPicPr>
-        <p:blipFill>
-          <a:blip r:embed="rId12">
-            <a:extLst>
-              <a:ext uri="{28A0092B-C50C-407E-A947-70E740481C1C}">
-                <a14:useLocalDpi xmlns:a14="http://schemas.microsoft.com/office/drawing/2010/main" val="0"/>
-              </a:ext>
-            </a:extLst>
-          </a:blip>
-          <a:srcRect/>
-          <a:stretch>
-            <a:fillRect/>
-          </a:stretch>
-        </p:blipFill>
-        <p:spPr bwMode="auto">
-          <a:xfrm>
-            <a:off x="283788" y="1919688"/>
-            <a:ext cx="1140656" cy="1140656"/>
-          </a:xfrm>
-          <a:prstGeom prst="rect">
-            <a:avLst/>
-          </a:prstGeom>
-          <a:noFill/>
-          <a:extLst>
-            <a:ext uri="{909E8E84-426E-40DD-AFC4-6F175D3DCCD1}">
-              <a14:hiddenFill xmlns:a14="http://schemas.microsoft.com/office/drawing/2010/main">
-                <a:solidFill>
-                  <a:srgbClr val="FFFFFF"/>
-                </a:solidFill>
-              </a14:hiddenFill>
-            </a:ext>
-          </a:extLst>
-        </p:spPr>
-      </p:pic>
-      <p:pic>
-        <p:nvPicPr>
-          <p:cNvPr id="2080" name="Picture 32" descr="conteúdo da tabela">
-            <a:extLst>
-              <a:ext uri="{FF2B5EF4-FFF2-40B4-BE49-F238E27FC236}">
-                <a16:creationId xmlns:a16="http://schemas.microsoft.com/office/drawing/2014/main" id="{05C6AA66-C38E-4C8B-8DC6-484182427A57}"/>
-              </a:ext>
-            </a:extLst>
-          </p:cNvPr>
-          <p:cNvPicPr>
-            <a:picLocks noChangeAspect="1" noChangeArrowheads="1"/>
-          </p:cNvPicPr>
-          <p:nvPr/>
-        </p:nvPicPr>
-        <p:blipFill>
-          <a:blip r:embed="rId13">
-            <a:extLst>
-              <a:ext uri="{28A0092B-C50C-407E-A947-70E740481C1C}">
-                <a14:useLocalDpi xmlns:a14="http://schemas.microsoft.com/office/drawing/2010/main" val="0"/>
-              </a:ext>
-            </a:extLst>
-          </a:blip>
-          <a:srcRect/>
-          <a:stretch>
-            <a:fillRect/>
-          </a:stretch>
-        </p:blipFill>
-        <p:spPr bwMode="auto">
-          <a:xfrm>
-            <a:off x="2046069" y="1856596"/>
-            <a:ext cx="1140656" cy="1140656"/>
-          </a:xfrm>
-          <a:prstGeom prst="rect">
-            <a:avLst/>
-          </a:prstGeom>
-          <a:noFill/>
-          <a:extLst>
-            <a:ext uri="{909E8E84-426E-40DD-AFC4-6F175D3DCCD1}">
-              <a14:hiddenFill xmlns:a14="http://schemas.microsoft.com/office/drawing/2010/main">
-                <a:solidFill>
-                  <a:srgbClr val="FFFFFF"/>
-                </a:solidFill>
-              </a14:hiddenFill>
-            </a:ext>
-          </a:extLst>
-        </p:spPr>
-      </p:pic>
-      <p:sp>
-        <p:nvSpPr>
-          <p:cNvPr id="101" name="CaixaDeTexto 100">
-            <a:extLst>
-              <a:ext uri="{FF2B5EF4-FFF2-40B4-BE49-F238E27FC236}">
-                <a16:creationId xmlns:a16="http://schemas.microsoft.com/office/drawing/2014/main" id="{6E9E3B01-1976-4B52-8C58-D58BDCD7839E}"/>
-              </a:ext>
-            </a:extLst>
-          </p:cNvPr>
-          <p:cNvSpPr txBox="1"/>
-          <p:nvPr/>
-        </p:nvSpPr>
-        <p:spPr>
-          <a:xfrm>
-            <a:off x="912287" y="268547"/>
-            <a:ext cx="1465466" cy="523220"/>
-          </a:xfrm>
-          <a:prstGeom prst="rect">
-            <a:avLst/>
-          </a:prstGeom>
-          <a:noFill/>
-        </p:spPr>
-        <p:txBody>
-          <a:bodyPr wrap="none" rtlCol="0">
-            <a:spAutoFit/>
-          </a:bodyPr>
-          <a:lstStyle/>
-          <a:p>
-            <a:r>
-              <a:rPr lang="pt-BR" sz="2800" dirty="0">
-                <a:latin typeface="Aharoni" panose="02010803020104030203" pitchFamily="2" charset="-79"/>
-                <a:cs typeface="Aharoni" panose="02010803020104030203" pitchFamily="2" charset="-79"/>
-              </a:rPr>
-              <a:t>Estação</a:t>
-            </a:r>
-          </a:p>
-        </p:txBody>
-      </p:sp>
-    </p:spTree>
-    <p:extLst>
-      <p:ext uri="{BB962C8B-B14F-4D97-AF65-F5344CB8AC3E}">
-        <p14:creationId xmlns:p14="http://schemas.microsoft.com/office/powerpoint/2010/main" val="2207464406"/>
-      </p:ext>
-    </p:extLst>
-  </p:cSld>
-  <p:clrMapOvr>
-    <a:masterClrMapping/>
-  </p:clrMapOvr>
-</p:sld>
-</file>
-
-<file path=ppt/slides/slide2.xml><?xml version="1.0" encoding="utf-8"?>
-<p:sld xmlns:a="http://schemas.openxmlformats.org/drawingml/2006/main" xmlns:r="http://schemas.openxmlformats.org/officeDocument/2006/relationships" xmlns:p="http://schemas.openxmlformats.org/presentationml/2006/main">
-  <p:cSld>
-    <p:spTree>
-      <p:nvGrpSpPr>
-        <p:cNvPr id="1" name=""/>
-        <p:cNvGrpSpPr/>
-        <p:nvPr/>
-      </p:nvGrpSpPr>
-      <p:grpSpPr>
-        <a:xfrm>
-          <a:off x="0" y="0"/>
-          <a:ext cx="0" cy="0"/>
-          <a:chOff x="0" y="0"/>
-          <a:chExt cx="0" cy="0"/>
-        </a:xfrm>
-      </p:grpSpPr>
-      <p:cxnSp>
-        <p:nvCxnSpPr>
-          <p:cNvPr id="152" name="Conector: Curvo 151">
-            <a:extLst>
-              <a:ext uri="{FF2B5EF4-FFF2-40B4-BE49-F238E27FC236}">
-                <a16:creationId xmlns:a16="http://schemas.microsoft.com/office/drawing/2014/main" id="{31D14FFE-E06D-4658-83F4-C3B8D42EDA06}"/>
-              </a:ext>
-            </a:extLst>
-          </p:cNvPr>
-          <p:cNvCxnSpPr>
-            <a:cxnSpLocks/>
-            <a:stCxn id="19" idx="3"/>
-            <a:endCxn id="5" idx="2"/>
-          </p:cNvCxnSpPr>
-          <p:nvPr/>
-        </p:nvCxnSpPr>
-        <p:spPr>
-          <a:xfrm flipV="1">
-            <a:off x="3008364" y="829779"/>
-            <a:ext cx="4426150" cy="3256858"/>
-          </a:xfrm>
-          <a:prstGeom prst="straightConnector1">
-            <a:avLst/>
-          </a:prstGeom>
-          <a:ln>
-            <a:headEnd type="triangle"/>
-            <a:tailEnd type="triangle"/>
-          </a:ln>
-          <a:effectLst>
-            <a:outerShdw blurRad="50800" dist="38100" dir="2700000" algn="tl" rotWithShape="0">
-              <a:prstClr val="black">
-                <a:alpha val="40000"/>
-              </a:prstClr>
-            </a:outerShdw>
-          </a:effectLst>
-        </p:spPr>
-        <p:style>
-          <a:lnRef idx="1">
-            <a:schemeClr val="dk1"/>
-          </a:lnRef>
-          <a:fillRef idx="0">
-            <a:schemeClr val="dk1"/>
-          </a:fillRef>
-          <a:effectRef idx="0">
-            <a:schemeClr val="dk1"/>
-          </a:effectRef>
-          <a:fontRef idx="minor">
-            <a:schemeClr val="tx1"/>
-          </a:fontRef>
-        </p:style>
-      </p:cxnSp>
-      <p:sp>
-        <p:nvSpPr>
-          <p:cNvPr id="5" name="Nuvem 4">
-            <a:extLst>
-              <a:ext uri="{FF2B5EF4-FFF2-40B4-BE49-F238E27FC236}">
-                <a16:creationId xmlns:a16="http://schemas.microsoft.com/office/drawing/2014/main" id="{7D8A9C01-6E8D-47BD-9576-47950182459D}"/>
-              </a:ext>
-            </a:extLst>
-          </p:cNvPr>
-          <p:cNvSpPr/>
-          <p:nvPr/>
-        </p:nvSpPr>
-        <p:spPr>
-          <a:xfrm>
-            <a:off x="7414058" y="-1442532"/>
+          <a:xfrm>
+            <a:off x="3523882" y="-1800603"/>
             <a:ext cx="6594787" cy="4544622"/>
           </a:xfrm>
           <a:prstGeom prst="cloud">
@@ -4227,8 +3416,8 @@
         </p:blipFill>
         <p:spPr bwMode="auto">
           <a:xfrm>
-            <a:off x="8603831" y="1651012"/>
-            <a:ext cx="886014" cy="822923"/>
+            <a:off x="3856338" y="1090424"/>
+            <a:ext cx="686220" cy="637356"/>
           </a:xfrm>
           <a:prstGeom prst="rect">
             <a:avLst/>
@@ -4274,8 +3463,8 @@
         </p:blipFill>
         <p:spPr bwMode="auto">
           <a:xfrm>
-            <a:off x="11075570" y="1264862"/>
-            <a:ext cx="821107" cy="821107"/>
+            <a:off x="5870501" y="1232659"/>
+            <a:ext cx="681497" cy="681497"/>
           </a:xfrm>
           <a:prstGeom prst="rect">
             <a:avLst/>
@@ -4321,8 +3510,8 @@
         </p:blipFill>
         <p:spPr bwMode="auto">
           <a:xfrm>
-            <a:off x="10014347" y="60559"/>
-            <a:ext cx="1833355" cy="916678"/>
+            <a:off x="4549301" y="26819"/>
+            <a:ext cx="2324167" cy="1162084"/>
           </a:xfrm>
           <a:prstGeom prst="rect">
             <a:avLst/>
@@ -4429,8 +3618,8 @@
         </p:blipFill>
         <p:spPr bwMode="auto">
           <a:xfrm>
-            <a:off x="74993" y="27264"/>
-            <a:ext cx="1912030" cy="1003816"/>
+            <a:off x="85043" y="27264"/>
+            <a:ext cx="2200322" cy="1155169"/>
           </a:xfrm>
           <a:prstGeom prst="rect">
             <a:avLst/>
@@ -4476,8 +3665,8 @@
         </p:blipFill>
         <p:spPr bwMode="auto">
           <a:xfrm>
-            <a:off x="1230840" y="549528"/>
-            <a:ext cx="1691950" cy="1080969"/>
+            <a:off x="1420510" y="893683"/>
+            <a:ext cx="1592919" cy="1017699"/>
           </a:xfrm>
           <a:prstGeom prst="rect">
             <a:avLst/>
@@ -4523,8 +3712,8 @@
         </p:blipFill>
         <p:spPr bwMode="auto">
           <a:xfrm>
-            <a:off x="449024" y="868411"/>
-            <a:ext cx="617450" cy="617450"/>
+            <a:off x="261361" y="1043480"/>
+            <a:ext cx="508598" cy="508598"/>
           </a:xfrm>
           <a:prstGeom prst="rect">
             <a:avLst/>
@@ -4570,8 +3759,8 @@
         </p:blipFill>
         <p:spPr bwMode="auto">
           <a:xfrm>
-            <a:off x="8209259" y="333808"/>
-            <a:ext cx="996606" cy="1006429"/>
+            <a:off x="6939535" y="930334"/>
+            <a:ext cx="846284" cy="854625"/>
           </a:xfrm>
           <a:prstGeom prst="rect">
             <a:avLst/>
@@ -4617,8 +3806,8 @@
         </p:blipFill>
         <p:spPr bwMode="auto">
           <a:xfrm>
-            <a:off x="10125454" y="1933422"/>
-            <a:ext cx="863857" cy="863857"/>
+            <a:off x="4834657" y="1319660"/>
+            <a:ext cx="691332" cy="691332"/>
           </a:xfrm>
           <a:prstGeom prst="rect">
             <a:avLst/>
@@ -4649,8 +3838,8 @@
         </p:nvSpPr>
         <p:spPr>
           <a:xfrm>
-            <a:off x="344297" y="3292158"/>
-            <a:ext cx="2972761" cy="2674574"/>
+            <a:off x="344297" y="3357844"/>
+            <a:ext cx="2972761" cy="2608887"/>
           </a:xfrm>
           <a:prstGeom prst="roundRect">
             <a:avLst>
@@ -4712,8 +3901,8 @@
         </p:nvSpPr>
         <p:spPr>
           <a:xfrm>
-            <a:off x="0" y="6018275"/>
-            <a:ext cx="3850734" cy="461665"/>
+            <a:off x="1297518" y="5956186"/>
+            <a:ext cx="1066318" cy="461665"/>
           </a:xfrm>
           <a:prstGeom prst="rect">
             <a:avLst/>
@@ -4731,7 +3920,7 @@
                 <a:latin typeface="Aharoni" panose="02010803020104030203" pitchFamily="2" charset="-79"/>
                 <a:cs typeface="Aharoni" panose="02010803020104030203" pitchFamily="2" charset="-79"/>
               </a:rPr>
-              <a:t>Dispositivos monitorados</a:t>
+              <a:t>Totem</a:t>
             </a:r>
           </a:p>
         </p:txBody>
@@ -4805,7 +3994,7 @@
         </p:blipFill>
         <p:spPr>
           <a:xfrm>
-            <a:off x="2069248" y="3496826"/>
+            <a:off x="2784296" y="2488465"/>
             <a:ext cx="939116" cy="1179621"/>
           </a:xfrm>
           <a:prstGeom prst="rect">
@@ -4888,8 +4077,8 @@
         </p:blipFill>
         <p:spPr bwMode="auto">
           <a:xfrm>
-            <a:off x="10961688" y="4728043"/>
-            <a:ext cx="886014" cy="886014"/>
+            <a:off x="8160350" y="763818"/>
+            <a:ext cx="691027" cy="703851"/>
           </a:xfrm>
           <a:prstGeom prst="rect">
             <a:avLst/>
@@ -4920,8 +4109,8 @@
         </p:nvSpPr>
         <p:spPr>
           <a:xfrm>
-            <a:off x="8180084" y="3358854"/>
-            <a:ext cx="3890741" cy="2796128"/>
+            <a:off x="4419778" y="3617468"/>
+            <a:ext cx="3007511" cy="2691395"/>
           </a:xfrm>
           <a:prstGeom prst="roundRect">
             <a:avLst>
@@ -4983,7 +4172,7 @@
         </p:nvSpPr>
         <p:spPr>
           <a:xfrm>
-            <a:off x="9457678" y="6154982"/>
+            <a:off x="5367038" y="6323500"/>
             <a:ext cx="1340432" cy="461665"/>
           </a:xfrm>
           <a:prstGeom prst="rect">
@@ -5036,7 +4225,7 @@
         </p:blipFill>
         <p:spPr bwMode="auto">
           <a:xfrm>
-            <a:off x="8525087" y="3608877"/>
+            <a:off x="4737951" y="3739042"/>
             <a:ext cx="1004430" cy="1004430"/>
           </a:xfrm>
           <a:prstGeom prst="rect">
@@ -5083,7 +4272,7 @@
         </p:blipFill>
         <p:spPr bwMode="auto">
           <a:xfrm>
-            <a:off x="9415899" y="4756918"/>
+            <a:off x="5945962" y="4887083"/>
             <a:ext cx="689785" cy="689785"/>
           </a:xfrm>
           <a:prstGeom prst="rect">
@@ -5130,7 +4319,7 @@
         </p:blipFill>
         <p:spPr bwMode="auto">
           <a:xfrm>
-            <a:off x="8276706" y="3382517"/>
+            <a:off x="4591773" y="3559956"/>
             <a:ext cx="496761" cy="496761"/>
           </a:xfrm>
           <a:prstGeom prst="rect">
@@ -5159,20 +4348,18 @@
           </p:cNvPr>
           <p:cNvCxnSpPr>
             <a:cxnSpLocks/>
-            <a:stCxn id="1038" idx="0"/>
+            <a:stCxn id="1042" idx="3"/>
             <a:endCxn id="4" idx="1"/>
           </p:cNvCxnSpPr>
           <p:nvPr/>
         </p:nvCxnSpPr>
         <p:spPr>
-          <a:xfrm rot="16200000" flipV="1">
-            <a:off x="5908845" y="766275"/>
-            <a:ext cx="1978044" cy="3254440"/>
-          </a:xfrm>
-          <a:prstGeom prst="curvedConnector3">
-            <a:avLst>
-              <a:gd name="adj1" fmla="val 50000"/>
-            </a:avLst>
+          <a:xfrm flipV="1">
+            <a:off x="7922369" y="1786896"/>
+            <a:ext cx="3150895" cy="1583215"/>
+          </a:xfrm>
+          <a:prstGeom prst="curvedConnector2">
+            <a:avLst/>
           </a:prstGeom>
           <a:ln>
             <a:headEnd type="triangle"/>
@@ -5212,18 +4399,20 @@
           </p:cNvPr>
           <p:cNvCxnSpPr>
             <a:cxnSpLocks/>
-            <a:stCxn id="27" idx="0"/>
+            <a:stCxn id="19" idx="0"/>
             <a:endCxn id="16" idx="1"/>
           </p:cNvCxnSpPr>
           <p:nvPr/>
         </p:nvCxnSpPr>
         <p:spPr>
           <a:xfrm rot="16200000" flipV="1">
-            <a:off x="1059460" y="2520940"/>
-            <a:ext cx="1079131" cy="463306"/>
+            <a:off x="2172894" y="1407505"/>
+            <a:ext cx="275438" cy="1886482"/>
           </a:xfrm>
           <a:prstGeom prst="curvedConnector3">
-            <a:avLst/>
+            <a:avLst>
+              <a:gd name="adj1" fmla="val 50000"/>
+            </a:avLst>
           </a:prstGeom>
           <a:ln>
             <a:tailEnd type="triangle"/>
@@ -5262,15 +4451,15 @@
           </p:cNvPr>
           <p:cNvCxnSpPr>
             <a:cxnSpLocks/>
-            <a:stCxn id="5" idx="1"/>
+            <a:stCxn id="2" idx="2"/>
             <a:endCxn id="35" idx="0"/>
           </p:cNvCxnSpPr>
           <p:nvPr/>
         </p:nvCxnSpPr>
         <p:spPr>
           <a:xfrm rot="5400000">
-            <a:off x="9613564" y="2510989"/>
-            <a:ext cx="511626" cy="1684150"/>
+            <a:off x="5490147" y="2355721"/>
+            <a:ext cx="1133340" cy="1633302"/>
           </a:xfrm>
           <a:prstGeom prst="curvedConnector3">
             <a:avLst>
@@ -5317,7 +4506,7 @@
         </p:nvSpPr>
         <p:spPr>
           <a:xfrm>
-            <a:off x="5318497" y="6025488"/>
+            <a:off x="9598201" y="6080395"/>
             <a:ext cx="1361270" cy="461665"/>
           </a:xfrm>
           <a:prstGeom prst="rect">
@@ -5370,7 +4559,7 @@
         </p:blipFill>
         <p:spPr bwMode="auto">
           <a:xfrm>
-            <a:off x="10191535" y="3523701"/>
+            <a:off x="6881367" y="2849610"/>
             <a:ext cx="1041002" cy="1041002"/>
           </a:xfrm>
           <a:prstGeom prst="rect">
@@ -5405,9 +4594,9 @@
           <p:nvPr/>
         </p:nvCxnSpPr>
         <p:spPr>
-          <a:xfrm rot="5400000" flipH="1" flipV="1">
-            <a:off x="4046897" y="1704700"/>
-            <a:ext cx="1523976" cy="923523"/>
+          <a:xfrm rot="16200000" flipV="1">
+            <a:off x="10731558" y="2128603"/>
+            <a:ext cx="1326873" cy="643460"/>
           </a:xfrm>
           <a:prstGeom prst="curvedConnector3">
             <a:avLst>
@@ -5455,7 +4644,7 @@
         </p:nvGrpSpPr>
         <p:grpSpPr>
           <a:xfrm>
-            <a:off x="4289355" y="49716"/>
+            <a:off x="10091972" y="432139"/>
             <a:ext cx="1962584" cy="1356201"/>
             <a:chOff x="3746013" y="67225"/>
             <a:chExt cx="1962584" cy="1356201"/>
@@ -5619,8 +4808,8 @@
         </p:nvSpPr>
         <p:spPr>
           <a:xfrm>
-            <a:off x="11086026" y="5614057"/>
-            <a:ext cx="637338" cy="338554"/>
+            <a:off x="8027514" y="1463705"/>
+            <a:ext cx="956698" cy="523220"/>
           </a:xfrm>
           <a:prstGeom prst="rect">
             <a:avLst/>
@@ -5633,9 +4822,17 @@
           </a:bodyPr>
           <a:lstStyle/>
           <a:p>
-            <a:r>
-              <a:rPr lang="pt-BR" sz="1600" b="1" dirty="0"/>
+            <a:pPr algn="ctr"/>
+            <a:r>
+              <a:rPr lang="pt-BR" sz="1400" dirty="0"/>
               <a:t>Login</a:t>
+            </a:r>
+          </a:p>
+          <a:p>
+            <a:pPr algn="ctr"/>
+            <a:r>
+              <a:rPr lang="pt-BR" sz="1400" dirty="0"/>
+              <a:t>Cadastro</a:t>
             </a:r>
           </a:p>
         </p:txBody>
@@ -5654,7 +4851,7 @@
         </p:nvSpPr>
         <p:spPr>
           <a:xfrm>
-            <a:off x="488569" y="1428374"/>
+            <a:off x="251668" y="1561447"/>
             <a:ext cx="568396" cy="338554"/>
           </a:xfrm>
           <a:prstGeom prst="rect">
@@ -5694,7 +4891,7 @@
         </p:nvSpPr>
         <p:spPr>
           <a:xfrm>
-            <a:off x="1407322" y="5491751"/>
+            <a:off x="1429749" y="5432850"/>
             <a:ext cx="607008" cy="338554"/>
           </a:xfrm>
           <a:prstGeom prst="rect">
@@ -5751,27 +4948,231 @@
           </a:p>
         </p:txBody>
       </p:sp>
-      <p:sp>
-        <p:nvSpPr>
-          <p:cNvPr id="115" name="CaixaDeTexto 114">
-            <a:extLst>
-              <a:ext uri="{FF2B5EF4-FFF2-40B4-BE49-F238E27FC236}">
-                <a16:creationId xmlns:a16="http://schemas.microsoft.com/office/drawing/2014/main" id="{DCD55C8E-B68C-40BC-8A2E-151D07F8E61B}"/>
-              </a:ext>
-            </a:extLst>
-          </p:cNvPr>
-          <p:cNvSpPr txBox="1"/>
+      <p:pic>
+        <p:nvPicPr>
+          <p:cNvPr id="1040" name="Picture 16" descr="Team">
+            <a:extLst>
+              <a:ext uri="{FF2B5EF4-FFF2-40B4-BE49-F238E27FC236}">
+                <a16:creationId xmlns:a16="http://schemas.microsoft.com/office/drawing/2014/main" id="{612A93BF-BD56-4FA4-9A52-C4534EABD50E}"/>
+              </a:ext>
+            </a:extLst>
+          </p:cNvPr>
+          <p:cNvPicPr>
+            <a:picLocks noChangeAspect="1" noChangeArrowheads="1"/>
+          </p:cNvPicPr>
           <p:nvPr/>
-        </p:nvSpPr>
-        <p:spPr>
-          <a:xfrm>
-            <a:off x="2126836" y="4599313"/>
-            <a:ext cx="823940" cy="338554"/>
+        </p:nvPicPr>
+        <p:blipFill>
+          <a:blip r:embed="rId17">
+            <a:extLst>
+              <a:ext uri="{28A0092B-C50C-407E-A947-70E740481C1C}">
+                <a14:useLocalDpi xmlns:a14="http://schemas.microsoft.com/office/drawing/2010/main" val="0"/>
+              </a:ext>
+            </a:extLst>
+          </a:blip>
+          <a:srcRect/>
+          <a:stretch>
+            <a:fillRect/>
+          </a:stretch>
+        </p:blipFill>
+        <p:spPr bwMode="auto">
+          <a:xfrm>
+            <a:off x="8711436" y="3697113"/>
+            <a:ext cx="1098777" cy="1098777"/>
           </a:xfrm>
           <a:prstGeom prst="rect">
             <a:avLst/>
           </a:prstGeom>
           <a:noFill/>
+          <a:extLst>
+            <a:ext uri="{909E8E84-426E-40DD-AFC4-6F175D3DCCD1}">
+              <a14:hiddenFill xmlns:a14="http://schemas.microsoft.com/office/drawing/2010/main">
+                <a:solidFill>
+                  <a:srgbClr val="FFFFFF"/>
+                </a:solidFill>
+              </a14:hiddenFill>
+            </a:ext>
+          </a:extLst>
+        </p:spPr>
+      </p:pic>
+      <p:pic>
+        <p:nvPicPr>
+          <p:cNvPr id="78" name="Picture 32" descr="conteúdo da tabela">
+            <a:extLst>
+              <a:ext uri="{FF2B5EF4-FFF2-40B4-BE49-F238E27FC236}">
+                <a16:creationId xmlns:a16="http://schemas.microsoft.com/office/drawing/2014/main" id="{6C5EB986-C435-4B34-A193-0E6722F6EAF5}"/>
+              </a:ext>
+            </a:extLst>
+          </p:cNvPr>
+          <p:cNvPicPr>
+            <a:picLocks noChangeAspect="1" noChangeArrowheads="1"/>
+          </p:cNvPicPr>
+          <p:nvPr/>
+        </p:nvPicPr>
+        <p:blipFill>
+          <a:blip r:embed="rId18">
+            <a:extLst>
+              <a:ext uri="{28A0092B-C50C-407E-A947-70E740481C1C}">
+                <a14:useLocalDpi xmlns:a14="http://schemas.microsoft.com/office/drawing/2010/main" val="0"/>
+              </a:ext>
+            </a:extLst>
+          </a:blip>
+          <a:srcRect/>
+          <a:stretch>
+            <a:fillRect/>
+          </a:stretch>
+        </p:blipFill>
+        <p:spPr bwMode="auto">
+          <a:xfrm>
+            <a:off x="10378004" y="4315326"/>
+            <a:ext cx="1140656" cy="1140656"/>
+          </a:xfrm>
+          <a:prstGeom prst="rect">
+            <a:avLst/>
+          </a:prstGeom>
+          <a:noFill/>
+          <a:extLst>
+            <a:ext uri="{909E8E84-426E-40DD-AFC4-6F175D3DCCD1}">
+              <a14:hiddenFill xmlns:a14="http://schemas.microsoft.com/office/drawing/2010/main">
+                <a:solidFill>
+                  <a:srgbClr val="FFFFFF"/>
+                </a:solidFill>
+              </a14:hiddenFill>
+            </a:ext>
+          </a:extLst>
+        </p:spPr>
+      </p:pic>
+      <p:sp>
+        <p:nvSpPr>
+          <p:cNvPr id="79" name="Retângulo: Cantos Arredondados 78">
+            <a:extLst>
+              <a:ext uri="{FF2B5EF4-FFF2-40B4-BE49-F238E27FC236}">
+                <a16:creationId xmlns:a16="http://schemas.microsoft.com/office/drawing/2014/main" id="{51FD2151-215B-48AE-A43D-BF07A5D65DB9}"/>
+              </a:ext>
+            </a:extLst>
+          </p:cNvPr>
+          <p:cNvSpPr/>
+          <p:nvPr/>
+        </p:nvSpPr>
+        <p:spPr>
+          <a:xfrm>
+            <a:off x="8421369" y="3460080"/>
+            <a:ext cx="3351029" cy="2634102"/>
+          </a:xfrm>
+          <a:prstGeom prst="roundRect">
+            <a:avLst>
+              <a:gd name="adj" fmla="val 0"/>
+            </a:avLst>
+          </a:prstGeom>
+          <a:noFill/>
+          <a:ln w="9525" cap="flat" cmpd="sng" algn="ctr">
+            <a:solidFill>
+              <a:schemeClr val="dk1"/>
+            </a:solidFill>
+            <a:prstDash val="solid"/>
+            <a:round/>
+            <a:headEnd type="none" w="med" len="med"/>
+            <a:tailEnd type="none" w="med" len="med"/>
+          </a:ln>
+          <a:effectLst>
+            <a:outerShdw blurRad="50800" dist="38100" dir="2700000" algn="tl" rotWithShape="0">
+              <a:prstClr val="black">
+                <a:alpha val="40000"/>
+              </a:prstClr>
+            </a:outerShdw>
+          </a:effectLst>
+        </p:spPr>
+        <p:style>
+          <a:lnRef idx="0">
+            <a:scrgbClr r="0" g="0" b="0"/>
+          </a:lnRef>
+          <a:fillRef idx="0">
+            <a:scrgbClr r="0" g="0" b="0"/>
+          </a:fillRef>
+          <a:effectRef idx="0">
+            <a:scrgbClr r="0" g="0" b="0"/>
+          </a:effectRef>
+          <a:fontRef idx="minor">
+            <a:schemeClr val="dk1"/>
+          </a:fontRef>
+        </p:style>
+        <p:txBody>
+          <a:bodyPr rtlCol="0" anchor="ctr"/>
+          <a:lstStyle/>
+          <a:p>
+            <a:pPr algn="ctr"/>
+            <a:endParaRPr lang="pt-BR"/>
+          </a:p>
+        </p:txBody>
+      </p:sp>
+      <p:pic>
+        <p:nvPicPr>
+          <p:cNvPr id="81" name="Picture 14" descr="Warning free icon">
+            <a:extLst>
+              <a:ext uri="{FF2B5EF4-FFF2-40B4-BE49-F238E27FC236}">
+                <a16:creationId xmlns:a16="http://schemas.microsoft.com/office/drawing/2014/main" id="{B2607F99-9769-4F52-98A5-5FC728ED16ED}"/>
+              </a:ext>
+            </a:extLst>
+          </p:cNvPr>
+          <p:cNvPicPr>
+            <a:picLocks noChangeAspect="1" noChangeArrowheads="1"/>
+          </p:cNvPicPr>
+          <p:nvPr/>
+        </p:nvPicPr>
+        <p:blipFill>
+          <a:blip r:embed="rId14">
+            <a:extLst>
+              <a:ext uri="{28A0092B-C50C-407E-A947-70E740481C1C}">
+                <a14:useLocalDpi xmlns:a14="http://schemas.microsoft.com/office/drawing/2010/main" val="0"/>
+              </a:ext>
+            </a:extLst>
+          </a:blip>
+          <a:srcRect/>
+          <a:stretch>
+            <a:fillRect/>
+          </a:stretch>
+        </p:blipFill>
+        <p:spPr bwMode="auto">
+          <a:xfrm>
+            <a:off x="11468343" y="3113769"/>
+            <a:ext cx="496761" cy="496761"/>
+          </a:xfrm>
+          <a:prstGeom prst="rect">
+            <a:avLst/>
+          </a:prstGeom>
+          <a:noFill/>
+          <a:extLst>
+            <a:ext uri="{909E8E84-426E-40DD-AFC4-6F175D3DCCD1}">
+              <a14:hiddenFill xmlns:a14="http://schemas.microsoft.com/office/drawing/2010/main">
+                <a:solidFill>
+                  <a:srgbClr val="FFFFFF"/>
+                </a:solidFill>
+              </a14:hiddenFill>
+            </a:ext>
+          </a:extLst>
+        </p:spPr>
+      </p:pic>
+      <p:sp>
+        <p:nvSpPr>
+          <p:cNvPr id="122" name="CaixaDeTexto 121">
+            <a:extLst>
+              <a:ext uri="{FF2B5EF4-FFF2-40B4-BE49-F238E27FC236}">
+                <a16:creationId xmlns:a16="http://schemas.microsoft.com/office/drawing/2014/main" id="{A67C30BE-D11B-4C06-80A4-FE2647CCFDF6}"/>
+              </a:ext>
+            </a:extLst>
+          </p:cNvPr>
+          <p:cNvSpPr txBox="1"/>
+          <p:nvPr/>
+        </p:nvSpPr>
+        <p:spPr>
+          <a:xfrm>
+            <a:off x="10278836" y="5346847"/>
+            <a:ext cx="1331526" cy="584775"/>
+          </a:xfrm>
+          <a:prstGeom prst="rect">
+            <a:avLst/>
+          </a:prstGeom>
+          <a:noFill/>
         </p:spPr>
         <p:txBody>
           <a:bodyPr wrap="square" rtlCol="0">
@@ -5779,355 +5180,232 @@
           </a:bodyPr>
           <a:lstStyle/>
           <a:p>
+            <a:pPr algn="ctr"/>
             <a:r>
               <a:rPr lang="pt-BR" sz="1600" b="1" dirty="0"/>
-              <a:t>Totem</a:t>
-            </a:r>
-          </a:p>
-        </p:txBody>
-      </p:sp>
-      <p:grpSp>
-        <p:nvGrpSpPr>
-          <p:cNvPr id="1057" name="Agrupar 1056">
-            <a:extLst>
-              <a:ext uri="{FF2B5EF4-FFF2-40B4-BE49-F238E27FC236}">
-                <a16:creationId xmlns:a16="http://schemas.microsoft.com/office/drawing/2014/main" id="{7BF6C113-A67B-480D-BBCF-0E344D524451}"/>
-              </a:ext>
-            </a:extLst>
-          </p:cNvPr>
-          <p:cNvGrpSpPr/>
+              <a:t>Controle de cadastro</a:t>
+            </a:r>
+          </a:p>
+        </p:txBody>
+      </p:sp>
+      <p:sp>
+        <p:nvSpPr>
+          <p:cNvPr id="47" name="CaixaDeTexto 46">
+            <a:extLst>
+              <a:ext uri="{FF2B5EF4-FFF2-40B4-BE49-F238E27FC236}">
+                <a16:creationId xmlns:a16="http://schemas.microsoft.com/office/drawing/2014/main" id="{2D7AFBA1-1899-43FF-83C9-1C80E27E1C98}"/>
+              </a:ext>
+            </a:extLst>
+          </p:cNvPr>
+          <p:cNvSpPr txBox="1"/>
           <p:nvPr/>
-        </p:nvGrpSpPr>
-        <p:grpSpPr>
-          <a:xfrm>
-            <a:off x="4098743" y="2928449"/>
-            <a:ext cx="3652619" cy="3069148"/>
-            <a:chOff x="4098743" y="2928449"/>
-            <a:chExt cx="3652619" cy="3069148"/>
-          </a:xfrm>
-        </p:grpSpPr>
-        <p:pic>
-          <p:nvPicPr>
-            <p:cNvPr id="1040" name="Picture 16" descr="Team">
-              <a:extLst>
-                <a:ext uri="{FF2B5EF4-FFF2-40B4-BE49-F238E27FC236}">
-                  <a16:creationId xmlns:a16="http://schemas.microsoft.com/office/drawing/2014/main" id="{612A93BF-BD56-4FA4-9A52-C4534EABD50E}"/>
-                </a:ext>
-              </a:extLst>
-            </p:cNvPr>
-            <p:cNvPicPr>
-              <a:picLocks noChangeAspect="1" noChangeArrowheads="1"/>
-            </p:cNvPicPr>
-            <p:nvPr/>
-          </p:nvPicPr>
-          <p:blipFill>
-            <a:blip r:embed="rId17">
-              <a:extLst>
-                <a:ext uri="{28A0092B-C50C-407E-A947-70E740481C1C}">
-                  <a14:useLocalDpi xmlns:a14="http://schemas.microsoft.com/office/drawing/2010/main" val="0"/>
-                </a:ext>
-              </a:extLst>
-            </a:blip>
-            <a:srcRect/>
-            <a:stretch>
-              <a:fillRect/>
-            </a:stretch>
-          </p:blipFill>
-          <p:spPr bwMode="auto">
-            <a:xfrm>
-              <a:off x="4835347" y="3460631"/>
-              <a:ext cx="1098777" cy="1098777"/>
-            </a:xfrm>
-            <a:prstGeom prst="rect">
-              <a:avLst/>
-            </a:prstGeom>
-            <a:noFill/>
-            <a:extLst>
-              <a:ext uri="{909E8E84-426E-40DD-AFC4-6F175D3DCCD1}">
-                <a14:hiddenFill xmlns:a14="http://schemas.microsoft.com/office/drawing/2010/main">
-                  <a:solidFill>
-                    <a:srgbClr val="FFFFFF"/>
-                  </a:solidFill>
-                </a14:hiddenFill>
-              </a:ext>
-            </a:extLst>
-          </p:spPr>
-        </p:pic>
-        <p:pic>
-          <p:nvPicPr>
-            <p:cNvPr id="78" name="Picture 32" descr="conteúdo da tabela">
-              <a:extLst>
-                <a:ext uri="{FF2B5EF4-FFF2-40B4-BE49-F238E27FC236}">
-                  <a16:creationId xmlns:a16="http://schemas.microsoft.com/office/drawing/2014/main" id="{6C5EB986-C435-4B34-A193-0E6722F6EAF5}"/>
-                </a:ext>
-              </a:extLst>
-            </p:cNvPr>
-            <p:cNvPicPr>
-              <a:picLocks noChangeAspect="1" noChangeArrowheads="1"/>
-            </p:cNvPicPr>
-            <p:nvPr/>
-          </p:nvPicPr>
-          <p:blipFill>
-            <a:blip r:embed="rId18">
-              <a:extLst>
-                <a:ext uri="{28A0092B-C50C-407E-A947-70E740481C1C}">
-                  <a14:useLocalDpi xmlns:a14="http://schemas.microsoft.com/office/drawing/2010/main" val="0"/>
-                </a:ext>
-              </a:extLst>
-            </a:blip>
-            <a:srcRect/>
-            <a:stretch>
-              <a:fillRect/>
-            </a:stretch>
-          </p:blipFill>
-          <p:spPr bwMode="auto">
-            <a:xfrm>
-              <a:off x="6364273" y="4214009"/>
-              <a:ext cx="1140656" cy="1140656"/>
-            </a:xfrm>
-            <a:prstGeom prst="rect">
-              <a:avLst/>
-            </a:prstGeom>
-            <a:noFill/>
-            <a:extLst>
-              <a:ext uri="{909E8E84-426E-40DD-AFC4-6F175D3DCCD1}">
-                <a14:hiddenFill xmlns:a14="http://schemas.microsoft.com/office/drawing/2010/main">
-                  <a:solidFill>
-                    <a:srgbClr val="FFFFFF"/>
-                  </a:solidFill>
-                </a14:hiddenFill>
-              </a:ext>
-            </a:extLst>
-          </p:spPr>
-        </p:pic>
-        <p:sp>
-          <p:nvSpPr>
-            <p:cNvPr id="79" name="Retângulo: Cantos Arredondados 78">
-              <a:extLst>
-                <a:ext uri="{FF2B5EF4-FFF2-40B4-BE49-F238E27FC236}">
-                  <a16:creationId xmlns:a16="http://schemas.microsoft.com/office/drawing/2014/main" id="{51FD2151-215B-48AE-A43D-BF07A5D65DB9}"/>
-                </a:ext>
-              </a:extLst>
-            </p:cNvPr>
-            <p:cNvSpPr/>
-            <p:nvPr/>
-          </p:nvSpPr>
-          <p:spPr>
-            <a:xfrm>
-              <a:off x="4276214" y="3229016"/>
-              <a:ext cx="3475148" cy="2768581"/>
-            </a:xfrm>
-            <a:prstGeom prst="roundRect">
-              <a:avLst>
-                <a:gd name="adj" fmla="val 0"/>
-              </a:avLst>
-            </a:prstGeom>
-            <a:noFill/>
-            <a:ln w="9525" cap="flat" cmpd="sng" algn="ctr">
-              <a:solidFill>
-                <a:schemeClr val="dk1"/>
-              </a:solidFill>
-              <a:prstDash val="solid"/>
-              <a:round/>
-              <a:headEnd type="none" w="med" len="med"/>
-              <a:tailEnd type="none" w="med" len="med"/>
-            </a:ln>
-            <a:effectLst>
-              <a:outerShdw blurRad="50800" dist="38100" dir="2700000" algn="tl" rotWithShape="0">
-                <a:prstClr val="black">
-                  <a:alpha val="40000"/>
-                </a:prstClr>
-              </a:outerShdw>
-            </a:effectLst>
-          </p:spPr>
-          <p:style>
-            <a:lnRef idx="0">
-              <a:scrgbClr r="0" g="0" b="0"/>
-            </a:lnRef>
-            <a:fillRef idx="0">
-              <a:scrgbClr r="0" g="0" b="0"/>
-            </a:fillRef>
-            <a:effectRef idx="0">
-              <a:scrgbClr r="0" g="0" b="0"/>
-            </a:effectRef>
-            <a:fontRef idx="minor">
-              <a:schemeClr val="dk1"/>
-            </a:fontRef>
-          </p:style>
-          <p:txBody>
-            <a:bodyPr rtlCol="0" anchor="ctr"/>
-            <a:lstStyle/>
-            <a:p>
-              <a:pPr algn="ctr"/>
-              <a:endParaRPr lang="pt-BR"/>
-            </a:p>
-          </p:txBody>
-        </p:sp>
-        <p:pic>
-          <p:nvPicPr>
-            <p:cNvPr id="80" name="Picture 10" descr="Nodejs free icon">
-              <a:extLst>
-                <a:ext uri="{FF2B5EF4-FFF2-40B4-BE49-F238E27FC236}">
-                  <a16:creationId xmlns:a16="http://schemas.microsoft.com/office/drawing/2014/main" id="{44A2EB34-A0E6-4245-9983-E1AFDAF498F0}"/>
-                </a:ext>
-              </a:extLst>
-            </p:cNvPr>
-            <p:cNvPicPr>
-              <a:picLocks noChangeAspect="1" noChangeArrowheads="1"/>
-            </p:cNvPicPr>
-            <p:nvPr/>
-          </p:nvPicPr>
-          <p:blipFill>
-            <a:blip r:embed="rId12">
-              <a:extLst>
-                <a:ext uri="{28A0092B-C50C-407E-A947-70E740481C1C}">
-                  <a14:useLocalDpi xmlns:a14="http://schemas.microsoft.com/office/drawing/2010/main" val="0"/>
-                </a:ext>
-              </a:extLst>
-            </a:blip>
-            <a:stretch>
-              <a:fillRect/>
-            </a:stretch>
-          </p:blipFill>
-          <p:spPr bwMode="auto">
-            <a:xfrm>
-              <a:off x="4507862" y="4763170"/>
-              <a:ext cx="886014" cy="886014"/>
-            </a:xfrm>
-            <a:prstGeom prst="rect">
-              <a:avLst/>
-            </a:prstGeom>
-            <a:noFill/>
-            <a:extLst>
-              <a:ext uri="{909E8E84-426E-40DD-AFC4-6F175D3DCCD1}">
-                <a14:hiddenFill xmlns:a14="http://schemas.microsoft.com/office/drawing/2010/main">
-                  <a:solidFill>
-                    <a:srgbClr val="FFFFFF"/>
-                  </a:solidFill>
-                </a14:hiddenFill>
-              </a:ext>
-            </a:extLst>
-          </p:spPr>
-        </p:pic>
-        <p:pic>
-          <p:nvPicPr>
-            <p:cNvPr id="81" name="Picture 14" descr="Warning free icon">
-              <a:extLst>
-                <a:ext uri="{FF2B5EF4-FFF2-40B4-BE49-F238E27FC236}">
-                  <a16:creationId xmlns:a16="http://schemas.microsoft.com/office/drawing/2014/main" id="{B2607F99-9769-4F52-98A5-5FC728ED16ED}"/>
-                </a:ext>
-              </a:extLst>
-            </p:cNvPr>
-            <p:cNvPicPr>
-              <a:picLocks noChangeAspect="1" noChangeArrowheads="1"/>
-            </p:cNvPicPr>
-            <p:nvPr/>
-          </p:nvPicPr>
-          <p:blipFill>
-            <a:blip r:embed="rId14">
-              <a:extLst>
-                <a:ext uri="{28A0092B-C50C-407E-A947-70E740481C1C}">
-                  <a14:useLocalDpi xmlns:a14="http://schemas.microsoft.com/office/drawing/2010/main" val="0"/>
-                </a:ext>
-              </a:extLst>
-            </a:blip>
-            <a:srcRect/>
-            <a:stretch>
-              <a:fillRect/>
-            </a:stretch>
-          </p:blipFill>
-          <p:spPr bwMode="auto">
-            <a:xfrm>
-              <a:off x="4098743" y="2928449"/>
-              <a:ext cx="496761" cy="496761"/>
-            </a:xfrm>
-            <a:prstGeom prst="rect">
-              <a:avLst/>
-            </a:prstGeom>
-            <a:noFill/>
-            <a:extLst>
-              <a:ext uri="{909E8E84-426E-40DD-AFC4-6F175D3DCCD1}">
-                <a14:hiddenFill xmlns:a14="http://schemas.microsoft.com/office/drawing/2010/main">
-                  <a:solidFill>
-                    <a:srgbClr val="FFFFFF"/>
-                  </a:solidFill>
-                </a14:hiddenFill>
-              </a:ext>
-            </a:extLst>
-          </p:spPr>
-        </p:pic>
-        <p:sp>
-          <p:nvSpPr>
-            <p:cNvPr id="108" name="CaixaDeTexto 107">
-              <a:extLst>
-                <a:ext uri="{FF2B5EF4-FFF2-40B4-BE49-F238E27FC236}">
-                  <a16:creationId xmlns:a16="http://schemas.microsoft.com/office/drawing/2014/main" id="{B8F23A74-2B1F-482E-B812-3BF5618C4B9A}"/>
-                </a:ext>
-              </a:extLst>
-            </p:cNvPr>
-            <p:cNvSpPr txBox="1"/>
-            <p:nvPr/>
-          </p:nvSpPr>
-          <p:spPr>
-            <a:xfrm>
-              <a:off x="4471186" y="5621404"/>
-              <a:ext cx="959365" cy="338554"/>
-            </a:xfrm>
-            <a:prstGeom prst="rect">
-              <a:avLst/>
-            </a:prstGeom>
-            <a:noFill/>
-          </p:spPr>
-          <p:txBody>
-            <a:bodyPr wrap="square" rtlCol="0">
-              <a:spAutoFit/>
-            </a:bodyPr>
-            <a:lstStyle/>
-            <a:p>
-              <a:r>
-                <a:rPr lang="pt-BR" sz="1600" b="1" dirty="0"/>
-                <a:t>Cadastro</a:t>
-              </a:r>
-            </a:p>
-          </p:txBody>
-        </p:sp>
-        <p:sp>
-          <p:nvSpPr>
-            <p:cNvPr id="122" name="CaixaDeTexto 121">
-              <a:extLst>
-                <a:ext uri="{FF2B5EF4-FFF2-40B4-BE49-F238E27FC236}">
-                  <a16:creationId xmlns:a16="http://schemas.microsoft.com/office/drawing/2014/main" id="{A67C30BE-D11B-4C06-80A4-FE2647CCFDF6}"/>
-                </a:ext>
-              </a:extLst>
-            </p:cNvPr>
-            <p:cNvSpPr txBox="1"/>
-            <p:nvPr/>
-          </p:nvSpPr>
-          <p:spPr>
-            <a:xfrm>
-              <a:off x="6265105" y="5245530"/>
-              <a:ext cx="1331526" cy="584775"/>
-            </a:xfrm>
-            <a:prstGeom prst="rect">
-              <a:avLst/>
-            </a:prstGeom>
-            <a:noFill/>
-          </p:spPr>
-          <p:txBody>
-            <a:bodyPr wrap="square" rtlCol="0">
-              <a:spAutoFit/>
-            </a:bodyPr>
-            <a:lstStyle/>
-            <a:p>
-              <a:pPr algn="ctr"/>
-              <a:r>
-                <a:rPr lang="pt-BR" sz="1600" b="1" dirty="0"/>
-                <a:t>Controle de cadastro</a:t>
-              </a:r>
-            </a:p>
-          </p:txBody>
-        </p:sp>
-      </p:grpSp>
+        </p:nvSpPr>
+        <p:spPr>
+          <a:xfrm>
+            <a:off x="6037254" y="5576868"/>
+            <a:ext cx="607008" cy="338554"/>
+          </a:xfrm>
+          <a:prstGeom prst="rect">
+            <a:avLst/>
+          </a:prstGeom>
+          <a:noFill/>
+        </p:spPr>
+        <p:txBody>
+          <a:bodyPr wrap="square" rtlCol="0">
+            <a:spAutoFit/>
+          </a:bodyPr>
+          <a:lstStyle/>
+          <a:p>
+            <a:r>
+              <a:rPr lang="pt-BR" sz="1600" b="1" dirty="0"/>
+              <a:t>Java</a:t>
+            </a:r>
+          </a:p>
+        </p:txBody>
+      </p:sp>
+      <p:sp>
+        <p:nvSpPr>
+          <p:cNvPr id="48" name="CaixaDeTexto 47">
+            <a:extLst>
+              <a:ext uri="{FF2B5EF4-FFF2-40B4-BE49-F238E27FC236}">
+                <a16:creationId xmlns:a16="http://schemas.microsoft.com/office/drawing/2014/main" id="{1B5CD71B-F9FD-4F0D-B489-8ED23AA7BA0A}"/>
+              </a:ext>
+            </a:extLst>
+          </p:cNvPr>
+          <p:cNvSpPr txBox="1"/>
+          <p:nvPr/>
+        </p:nvSpPr>
+        <p:spPr>
+          <a:xfrm>
+            <a:off x="4673566" y="4746546"/>
+            <a:ext cx="1172272" cy="338554"/>
+          </a:xfrm>
+          <a:prstGeom prst="rect">
+            <a:avLst/>
+          </a:prstGeom>
+          <a:noFill/>
+        </p:spPr>
+        <p:txBody>
+          <a:bodyPr wrap="square" rtlCol="0">
+            <a:spAutoFit/>
+          </a:bodyPr>
+          <a:lstStyle/>
+          <a:p>
+            <a:r>
+              <a:rPr lang="pt-BR" sz="1600" b="1" dirty="0"/>
+              <a:t>Dashboard</a:t>
+            </a:r>
+          </a:p>
+        </p:txBody>
+      </p:sp>
+      <p:pic>
+        <p:nvPicPr>
+          <p:cNvPr id="2" name="Picture 2" descr="Sql server free icon">
+            <a:extLst>
+              <a:ext uri="{FF2B5EF4-FFF2-40B4-BE49-F238E27FC236}">
+                <a16:creationId xmlns:a16="http://schemas.microsoft.com/office/drawing/2014/main" id="{0850E74B-EEBC-45FC-B8D1-A3EE8FBF8301}"/>
+              </a:ext>
+            </a:extLst>
+          </p:cNvPr>
+          <p:cNvPicPr>
+            <a:picLocks noChangeAspect="1" noChangeArrowheads="1"/>
+          </p:cNvPicPr>
+          <p:nvPr/>
+        </p:nvPicPr>
+        <p:blipFill>
+          <a:blip r:embed="rId19">
+            <a:extLst>
+              <a:ext uri="{28A0092B-C50C-407E-A947-70E740481C1C}">
+                <a14:useLocalDpi xmlns:a14="http://schemas.microsoft.com/office/drawing/2010/main" val="0"/>
+              </a:ext>
+            </a:extLst>
+          </a:blip>
+          <a:srcRect/>
+          <a:stretch>
+            <a:fillRect/>
+          </a:stretch>
+        </p:blipFill>
+        <p:spPr bwMode="auto">
+          <a:xfrm>
+            <a:off x="6426421" y="1711608"/>
+            <a:ext cx="894094" cy="894094"/>
+          </a:xfrm>
+          <a:prstGeom prst="rect">
+            <a:avLst/>
+          </a:prstGeom>
+          <a:noFill/>
+          <a:extLst>
+            <a:ext uri="{909E8E84-426E-40DD-AFC4-6F175D3DCCD1}">
+              <a14:hiddenFill xmlns:a14="http://schemas.microsoft.com/office/drawing/2010/main">
+                <a:solidFill>
+                  <a:srgbClr val="FFFFFF"/>
+                </a:solidFill>
+              </a14:hiddenFill>
+            </a:ext>
+          </a:extLst>
+        </p:spPr>
+      </p:pic>
+      <p:cxnSp>
+        <p:nvCxnSpPr>
+          <p:cNvPr id="84" name="Conector: Curvo 83">
+            <a:extLst>
+              <a:ext uri="{FF2B5EF4-FFF2-40B4-BE49-F238E27FC236}">
+                <a16:creationId xmlns:a16="http://schemas.microsoft.com/office/drawing/2014/main" id="{97AAFECE-6AFC-49ED-AAFA-266C58F6BD82}"/>
+              </a:ext>
+            </a:extLst>
+          </p:cNvPr>
+          <p:cNvCxnSpPr>
+            <a:cxnSpLocks/>
+            <a:stCxn id="78" idx="0"/>
+            <a:endCxn id="2" idx="3"/>
+          </p:cNvCxnSpPr>
+          <p:nvPr/>
+        </p:nvCxnSpPr>
+        <p:spPr>
+          <a:xfrm rot="16200000" flipV="1">
+            <a:off x="8056089" y="1423082"/>
+            <a:ext cx="2156671" cy="3627817"/>
+          </a:xfrm>
+          <a:prstGeom prst="curvedConnector2">
+            <a:avLst/>
+          </a:prstGeom>
+          <a:ln>
+            <a:headEnd type="triangle"/>
+            <a:tailEnd type="triangle"/>
+          </a:ln>
+          <a:effectLst>
+            <a:outerShdw blurRad="50800" dist="38100" dir="2700000" algn="tl" rotWithShape="0">
+              <a:prstClr val="black">
+                <a:alpha val="40000"/>
+              </a:prstClr>
+            </a:outerShdw>
+          </a:effectLst>
+        </p:spPr>
+        <p:style>
+          <a:lnRef idx="1">
+            <a:schemeClr val="dk1"/>
+          </a:lnRef>
+          <a:fillRef idx="0">
+            <a:schemeClr val="dk1"/>
+          </a:fillRef>
+          <a:effectRef idx="0">
+            <a:schemeClr val="dk1"/>
+          </a:effectRef>
+          <a:fontRef idx="minor">
+            <a:schemeClr val="tx1"/>
+          </a:fontRef>
+        </p:style>
+      </p:cxnSp>
+      <p:cxnSp>
+        <p:nvCxnSpPr>
+          <p:cNvPr id="86" name="Conector: Curvo 85">
+            <a:extLst>
+              <a:ext uri="{FF2B5EF4-FFF2-40B4-BE49-F238E27FC236}">
+                <a16:creationId xmlns:a16="http://schemas.microsoft.com/office/drawing/2014/main" id="{D43447D9-906F-40CA-B6E3-07AC062444B1}"/>
+              </a:ext>
+            </a:extLst>
+          </p:cNvPr>
+          <p:cNvCxnSpPr>
+            <a:cxnSpLocks/>
+            <a:stCxn id="1030" idx="2"/>
+            <a:endCxn id="2" idx="1"/>
+          </p:cNvCxnSpPr>
+          <p:nvPr/>
+        </p:nvCxnSpPr>
+        <p:spPr>
+          <a:xfrm rot="16200000" flipH="1">
+            <a:off x="4198059" y="-69708"/>
+            <a:ext cx="247273" cy="4209451"/>
+          </a:xfrm>
+          <a:prstGeom prst="curvedConnector2">
+            <a:avLst/>
+          </a:prstGeom>
+          <a:ln>
+            <a:tailEnd type="triangle"/>
+          </a:ln>
+          <a:effectLst>
+            <a:outerShdw blurRad="50800" dist="38100" dir="2700000" algn="tl" rotWithShape="0">
+              <a:prstClr val="black">
+                <a:alpha val="40000"/>
+              </a:prstClr>
+            </a:outerShdw>
+          </a:effectLst>
+        </p:spPr>
+        <p:style>
+          <a:lnRef idx="1">
+            <a:schemeClr val="dk1"/>
+          </a:lnRef>
+          <a:fillRef idx="0">
+            <a:schemeClr val="dk1"/>
+          </a:fillRef>
+          <a:effectRef idx="0">
+            <a:schemeClr val="dk1"/>
+          </a:effectRef>
+          <a:fontRef idx="minor">
+            <a:schemeClr val="tx1"/>
+          </a:fontRef>
+        </p:style>
+      </p:cxnSp>
     </p:spTree>
     <p:extLst>
       <p:ext uri="{BB962C8B-B14F-4D97-AF65-F5344CB8AC3E}">

</xml_diff>

<commit_message>
subindo novo jar para container
</commit_message>
<xml_diff>
--- a/Documentação/arquitetura/diagrama_software.pptx
+++ b/Documentação/arquitetura/diagrama_software.pptx
@@ -259,7 +259,7 @@
           <a:p>
             <a:fld id="{DFA6C581-6C24-4FE8-96B9-9DFD4212CBDB}" type="datetimeFigureOut">
               <a:rPr lang="pt-BR" smtClean="0"/>
-              <a:t>15/11/2021</a:t>
+              <a:t>08/12/2021</a:t>
             </a:fld>
             <a:endParaRPr lang="pt-BR"/>
           </a:p>
@@ -457,7 +457,7 @@
           <a:p>
             <a:fld id="{DFA6C581-6C24-4FE8-96B9-9DFD4212CBDB}" type="datetimeFigureOut">
               <a:rPr lang="pt-BR" smtClean="0"/>
-              <a:t>15/11/2021</a:t>
+              <a:t>08/12/2021</a:t>
             </a:fld>
             <a:endParaRPr lang="pt-BR"/>
           </a:p>
@@ -665,7 +665,7 @@
           <a:p>
             <a:fld id="{DFA6C581-6C24-4FE8-96B9-9DFD4212CBDB}" type="datetimeFigureOut">
               <a:rPr lang="pt-BR" smtClean="0"/>
-              <a:t>15/11/2021</a:t>
+              <a:t>08/12/2021</a:t>
             </a:fld>
             <a:endParaRPr lang="pt-BR"/>
           </a:p>
@@ -863,7 +863,7 @@
           <a:p>
             <a:fld id="{DFA6C581-6C24-4FE8-96B9-9DFD4212CBDB}" type="datetimeFigureOut">
               <a:rPr lang="pt-BR" smtClean="0"/>
-              <a:t>15/11/2021</a:t>
+              <a:t>08/12/2021</a:t>
             </a:fld>
             <a:endParaRPr lang="pt-BR"/>
           </a:p>
@@ -1138,7 +1138,7 @@
           <a:p>
             <a:fld id="{DFA6C581-6C24-4FE8-96B9-9DFD4212CBDB}" type="datetimeFigureOut">
               <a:rPr lang="pt-BR" smtClean="0"/>
-              <a:t>15/11/2021</a:t>
+              <a:t>08/12/2021</a:t>
             </a:fld>
             <a:endParaRPr lang="pt-BR"/>
           </a:p>
@@ -1403,7 +1403,7 @@
           <a:p>
             <a:fld id="{DFA6C581-6C24-4FE8-96B9-9DFD4212CBDB}" type="datetimeFigureOut">
               <a:rPr lang="pt-BR" smtClean="0"/>
-              <a:t>15/11/2021</a:t>
+              <a:t>08/12/2021</a:t>
             </a:fld>
             <a:endParaRPr lang="pt-BR"/>
           </a:p>
@@ -1815,7 +1815,7 @@
           <a:p>
             <a:fld id="{DFA6C581-6C24-4FE8-96B9-9DFD4212CBDB}" type="datetimeFigureOut">
               <a:rPr lang="pt-BR" smtClean="0"/>
-              <a:t>15/11/2021</a:t>
+              <a:t>08/12/2021</a:t>
             </a:fld>
             <a:endParaRPr lang="pt-BR"/>
           </a:p>
@@ -1956,7 +1956,7 @@
           <a:p>
             <a:fld id="{DFA6C581-6C24-4FE8-96B9-9DFD4212CBDB}" type="datetimeFigureOut">
               <a:rPr lang="pt-BR" smtClean="0"/>
-              <a:t>15/11/2021</a:t>
+              <a:t>08/12/2021</a:t>
             </a:fld>
             <a:endParaRPr lang="pt-BR"/>
           </a:p>
@@ -2069,7 +2069,7 @@
           <a:p>
             <a:fld id="{DFA6C581-6C24-4FE8-96B9-9DFD4212CBDB}" type="datetimeFigureOut">
               <a:rPr lang="pt-BR" smtClean="0"/>
-              <a:t>15/11/2021</a:t>
+              <a:t>08/12/2021</a:t>
             </a:fld>
             <a:endParaRPr lang="pt-BR"/>
           </a:p>
@@ -2380,7 +2380,7 @@
           <a:p>
             <a:fld id="{DFA6C581-6C24-4FE8-96B9-9DFD4212CBDB}" type="datetimeFigureOut">
               <a:rPr lang="pt-BR" smtClean="0"/>
-              <a:t>15/11/2021</a:t>
+              <a:t>08/12/2021</a:t>
             </a:fld>
             <a:endParaRPr lang="pt-BR"/>
           </a:p>
@@ -2668,7 +2668,7 @@
           <a:p>
             <a:fld id="{DFA6C581-6C24-4FE8-96B9-9DFD4212CBDB}" type="datetimeFigureOut">
               <a:rPr lang="pt-BR" smtClean="0"/>
-              <a:t>15/11/2021</a:t>
+              <a:t>08/12/2021</a:t>
             </a:fld>
             <a:endParaRPr lang="pt-BR"/>
           </a:p>
@@ -2909,7 +2909,7 @@
           <a:p>
             <a:fld id="{DFA6C581-6C24-4FE8-96B9-9DFD4212CBDB}" type="datetimeFigureOut">
               <a:rPr lang="pt-BR" smtClean="0"/>
-              <a:t>15/11/2021</a:t>
+              <a:t>08/12/2021</a:t>
             </a:fld>
             <a:endParaRPr lang="pt-BR"/>
           </a:p>
@@ -3543,7 +3543,7 @@
         <p:spPr>
           <a:xfrm>
             <a:off x="-666198" y="-503103"/>
-            <a:ext cx="4067140" cy="2719025"/>
+            <a:ext cx="4053530" cy="2862120"/>
           </a:xfrm>
           <a:prstGeom prst="cloud">
             <a:avLst/>
@@ -3618,8 +3618,8 @@
         </p:blipFill>
         <p:spPr bwMode="auto">
           <a:xfrm>
-            <a:off x="85043" y="27264"/>
-            <a:ext cx="2200322" cy="1155169"/>
+            <a:off x="12645" y="12880"/>
+            <a:ext cx="2278793" cy="1155169"/>
           </a:xfrm>
           <a:prstGeom prst="rect">
             <a:avLst/>
@@ -3665,7 +3665,7 @@
         </p:blipFill>
         <p:spPr bwMode="auto">
           <a:xfrm>
-            <a:off x="1420510" y="893683"/>
+            <a:off x="1408482" y="822682"/>
             <a:ext cx="1592919" cy="1017699"/>
           </a:xfrm>
           <a:prstGeom prst="rect">
@@ -3712,7 +3712,7 @@
         </p:blipFill>
         <p:spPr bwMode="auto">
           <a:xfrm>
-            <a:off x="261361" y="1043480"/>
+            <a:off x="217284" y="879726"/>
             <a:ext cx="508598" cy="508598"/>
           </a:xfrm>
           <a:prstGeom prst="rect">
@@ -3838,8 +3838,8 @@
         </p:nvSpPr>
         <p:spPr>
           <a:xfrm>
-            <a:off x="344297" y="3357844"/>
-            <a:ext cx="2972761" cy="2608887"/>
+            <a:off x="344298" y="3429000"/>
+            <a:ext cx="2304997" cy="2537731"/>
           </a:xfrm>
           <a:prstGeom prst="roundRect">
             <a:avLst>
@@ -3901,7 +3901,7 @@
         </p:nvSpPr>
         <p:spPr>
           <a:xfrm>
-            <a:off x="1297518" y="5956186"/>
+            <a:off x="963637" y="5966731"/>
             <a:ext cx="1066318" cy="461665"/>
           </a:xfrm>
           <a:prstGeom prst="rect">
@@ -3954,7 +3954,7 @@
         </p:blipFill>
         <p:spPr bwMode="auto">
           <a:xfrm>
-            <a:off x="1397245" y="4852239"/>
+            <a:off x="1658367" y="4511048"/>
             <a:ext cx="639512" cy="639512"/>
           </a:xfrm>
           <a:prstGeom prst="rect">
@@ -3994,7 +3994,7 @@
         </p:blipFill>
         <p:spPr>
           <a:xfrm>
-            <a:off x="2784296" y="2488465"/>
+            <a:off x="2210465" y="2601523"/>
             <a:ext cx="939116" cy="1179621"/>
           </a:xfrm>
           <a:prstGeom prst="rect">
@@ -4109,8 +4109,8 @@
         </p:nvSpPr>
         <p:spPr>
           <a:xfrm>
-            <a:off x="4419778" y="3617468"/>
-            <a:ext cx="3007511" cy="2691395"/>
+            <a:off x="3943781" y="3560856"/>
+            <a:ext cx="2018984" cy="2150108"/>
           </a:xfrm>
           <a:prstGeom prst="roundRect">
             <a:avLst>
@@ -4172,7 +4172,7 @@
         </p:nvSpPr>
         <p:spPr>
           <a:xfrm>
-            <a:off x="5367038" y="6323500"/>
+            <a:off x="4292268" y="5727009"/>
             <a:ext cx="1340432" cy="461665"/>
           </a:xfrm>
           <a:prstGeom prst="rect">
@@ -4225,7 +4225,7 @@
         </p:blipFill>
         <p:spPr bwMode="auto">
           <a:xfrm>
-            <a:off x="4737951" y="3739042"/>
+            <a:off x="4473641" y="3814694"/>
             <a:ext cx="1004430" cy="1004430"/>
           </a:xfrm>
           <a:prstGeom prst="rect">
@@ -4245,10 +4245,10 @@
       </p:pic>
       <p:pic>
         <p:nvPicPr>
-          <p:cNvPr id="36" name="Picture 8" descr="Java free icon">
-            <a:extLst>
-              <a:ext uri="{FF2B5EF4-FFF2-40B4-BE49-F238E27FC236}">
-                <a16:creationId xmlns:a16="http://schemas.microsoft.com/office/drawing/2014/main" id="{8C6E24BD-968E-4EB2-8117-BA08DF8808FD}"/>
+          <p:cNvPr id="1038" name="Picture 14" descr="Warning free icon">
+            <a:extLst>
+              <a:ext uri="{FF2B5EF4-FFF2-40B4-BE49-F238E27FC236}">
+                <a16:creationId xmlns:a16="http://schemas.microsoft.com/office/drawing/2014/main" id="{09385C36-81E1-480A-9B33-6E6157223345}"/>
               </a:ext>
             </a:extLst>
           </p:cNvPr>
@@ -4258,7 +4258,7 @@
           <p:nvPr/>
         </p:nvPicPr>
         <p:blipFill>
-          <a:blip r:embed="rId7">
+          <a:blip r:embed="rId14">
             <a:extLst>
               <a:ext uri="{28A0092B-C50C-407E-A947-70E740481C1C}">
                 <a14:useLocalDpi xmlns:a14="http://schemas.microsoft.com/office/drawing/2010/main" val="0"/>
@@ -4272,8 +4272,8 @@
         </p:blipFill>
         <p:spPr bwMode="auto">
           <a:xfrm>
-            <a:off x="5945962" y="4887083"/>
-            <a:ext cx="689785" cy="689785"/>
+            <a:off x="4283041" y="3520549"/>
+            <a:ext cx="496761" cy="496761"/>
           </a:xfrm>
           <a:prstGeom prst="rect">
             <a:avLst/>
@@ -4290,53 +4290,6 @@
           </a:extLst>
         </p:spPr>
       </p:pic>
-      <p:pic>
-        <p:nvPicPr>
-          <p:cNvPr id="1038" name="Picture 14" descr="Warning free icon">
-            <a:extLst>
-              <a:ext uri="{FF2B5EF4-FFF2-40B4-BE49-F238E27FC236}">
-                <a16:creationId xmlns:a16="http://schemas.microsoft.com/office/drawing/2014/main" id="{09385C36-81E1-480A-9B33-6E6157223345}"/>
-              </a:ext>
-            </a:extLst>
-          </p:cNvPr>
-          <p:cNvPicPr>
-            <a:picLocks noChangeAspect="1" noChangeArrowheads="1"/>
-          </p:cNvPicPr>
-          <p:nvPr/>
-        </p:nvPicPr>
-        <p:blipFill>
-          <a:blip r:embed="rId14">
-            <a:extLst>
-              <a:ext uri="{28A0092B-C50C-407E-A947-70E740481C1C}">
-                <a14:useLocalDpi xmlns:a14="http://schemas.microsoft.com/office/drawing/2010/main" val="0"/>
-              </a:ext>
-            </a:extLst>
-          </a:blip>
-          <a:srcRect/>
-          <a:stretch>
-            <a:fillRect/>
-          </a:stretch>
-        </p:blipFill>
-        <p:spPr bwMode="auto">
-          <a:xfrm>
-            <a:off x="4591773" y="3559956"/>
-            <a:ext cx="496761" cy="496761"/>
-          </a:xfrm>
-          <a:prstGeom prst="rect">
-            <a:avLst/>
-          </a:prstGeom>
-          <a:noFill/>
-          <a:extLst>
-            <a:ext uri="{909E8E84-426E-40DD-AFC4-6F175D3DCCD1}">
-              <a14:hiddenFill xmlns:a14="http://schemas.microsoft.com/office/drawing/2010/main">
-                <a:solidFill>
-                  <a:srgbClr val="FFFFFF"/>
-                </a:solidFill>
-              </a14:hiddenFill>
-            </a:ext>
-          </a:extLst>
-        </p:spPr>
-      </p:pic>
       <p:cxnSp>
         <p:nvCxnSpPr>
           <p:cNvPr id="44" name="Conector: Curvo 43">
@@ -4348,18 +4301,20 @@
           </p:cNvPr>
           <p:cNvCxnSpPr>
             <a:cxnSpLocks/>
-            <a:stCxn id="1042" idx="3"/>
+            <a:stCxn id="1042" idx="0"/>
             <a:endCxn id="4" idx="1"/>
           </p:cNvCxnSpPr>
           <p:nvPr/>
         </p:nvCxnSpPr>
         <p:spPr>
-          <a:xfrm flipV="1">
-            <a:off x="7922369" y="1786896"/>
-            <a:ext cx="3150895" cy="1583215"/>
-          </a:xfrm>
-          <a:prstGeom prst="curvedConnector2">
-            <a:avLst/>
+          <a:xfrm rot="5400000" flipH="1" flipV="1">
+            <a:off x="7850218" y="-127874"/>
+            <a:ext cx="1308276" cy="5137816"/>
+          </a:xfrm>
+          <a:prstGeom prst="curvedConnector3">
+            <a:avLst>
+              <a:gd name="adj1" fmla="val 22877"/>
+            </a:avLst>
           </a:prstGeom>
           <a:ln>
             <a:headEnd type="triangle"/>
@@ -4406,8 +4361,8 @@
         </p:nvCxnSpPr>
         <p:spPr>
           <a:xfrm rot="16200000" flipV="1">
-            <a:off x="2172894" y="1407505"/>
-            <a:ext cx="275438" cy="1886482"/>
+            <a:off x="1897518" y="1819018"/>
+            <a:ext cx="245554" cy="1319456"/>
           </a:xfrm>
           <a:prstGeom prst="curvedConnector3">
             <a:avLst>
@@ -4458,8 +4413,8 @@
         </p:nvCxnSpPr>
         <p:spPr>
           <a:xfrm rot="5400000">
-            <a:off x="5490147" y="2355721"/>
-            <a:ext cx="1133340" cy="1633302"/>
+            <a:off x="5320166" y="2261392"/>
+            <a:ext cx="1208992" cy="1897612"/>
           </a:xfrm>
           <a:prstGeom prst="curvedConnector3">
             <a:avLst>
@@ -4506,8 +4461,8 @@
         </p:nvSpPr>
         <p:spPr>
           <a:xfrm>
-            <a:off x="9598201" y="6080395"/>
-            <a:ext cx="1361270" cy="461665"/>
+            <a:off x="9277999" y="6266150"/>
+            <a:ext cx="1156086" cy="461665"/>
           </a:xfrm>
           <a:prstGeom prst="rect">
             <a:avLst/>
@@ -4525,7 +4480,7 @@
                 <a:latin typeface="Aharoni" panose="02010803020104030203" pitchFamily="2" charset="-79"/>
                 <a:cs typeface="Aharoni" panose="02010803020104030203" pitchFamily="2" charset="-79"/>
               </a:rPr>
-              <a:t>Gerente</a:t>
+              <a:t>Gestor</a:t>
             </a:r>
           </a:p>
         </p:txBody>
@@ -4559,8 +4514,8 @@
         </p:blipFill>
         <p:spPr bwMode="auto">
           <a:xfrm>
-            <a:off x="6881367" y="2849610"/>
-            <a:ext cx="1041002" cy="1041002"/>
+            <a:off x="5487655" y="3095172"/>
+            <a:ext cx="895585" cy="895585"/>
           </a:xfrm>
           <a:prstGeom prst="rect">
             <a:avLst/>
@@ -4595,8 +4550,8 @@
         </p:nvCxnSpPr>
         <p:spPr>
           <a:xfrm rot="16200000" flipV="1">
-            <a:off x="10731558" y="2128603"/>
-            <a:ext cx="1326873" cy="643460"/>
+            <a:off x="10720577" y="2139584"/>
+            <a:ext cx="1393723" cy="688348"/>
           </a:xfrm>
           <a:prstGeom prst="curvedConnector3">
             <a:avLst>
@@ -4851,8 +4806,8 @@
         </p:nvSpPr>
         <p:spPr>
           <a:xfrm>
-            <a:off x="251668" y="1561447"/>
-            <a:ext cx="568396" cy="338554"/>
+            <a:off x="184699" y="1384817"/>
+            <a:ext cx="568396" cy="584775"/>
           </a:xfrm>
           <a:prstGeom prst="rect">
             <a:avLst/>
@@ -4865,6 +4820,7 @@
           </a:bodyPr>
           <a:lstStyle/>
           <a:p>
+            <a:pPr algn="ctr"/>
             <a:r>
               <a:rPr lang="pt-BR" sz="1600" b="1" dirty="0"/>
               <a:t>.</a:t>
@@ -4875,6 +4831,14 @@
             </a:r>
             <a:endParaRPr lang="pt-BR" sz="1600" b="1" dirty="0"/>
           </a:p>
+          <a:p>
+            <a:pPr algn="ctr"/>
+            <a:r>
+              <a:rPr lang="pt-BR" sz="1600" b="1" dirty="0" err="1"/>
+              <a:t>cli</a:t>
+            </a:r>
+            <a:endParaRPr lang="pt-BR" sz="1600" b="1" dirty="0"/>
+          </a:p>
         </p:txBody>
       </p:sp>
       <p:sp>
@@ -4891,8 +4855,8 @@
         </p:nvSpPr>
         <p:spPr>
           <a:xfrm>
-            <a:off x="1429749" y="5432850"/>
-            <a:ext cx="607008" cy="338554"/>
+            <a:off x="1605991" y="5142234"/>
+            <a:ext cx="723930" cy="584775"/>
           </a:xfrm>
           <a:prstGeom prst="rect">
             <a:avLst/>
@@ -4905,11 +4869,20 @@
           </a:bodyPr>
           <a:lstStyle/>
           <a:p>
+            <a:pPr algn="ctr"/>
             <a:r>
               <a:rPr lang="pt-BR" sz="1600" b="1" dirty="0"/>
               <a:t>Java</a:t>
             </a:r>
           </a:p>
+          <a:p>
+            <a:pPr algn="ctr"/>
+            <a:r>
+              <a:rPr lang="pt-BR" sz="1600" b="1" dirty="0" err="1"/>
+              <a:t>Looca</a:t>
+            </a:r>
+            <a:endParaRPr lang="pt-BR" sz="1600" b="1" dirty="0"/>
+          </a:p>
         </p:txBody>
       </p:sp>
       <p:sp>
@@ -4926,8 +4899,8 @@
         </p:nvSpPr>
         <p:spPr>
           <a:xfrm>
-            <a:off x="488569" y="4371338"/>
-            <a:ext cx="878803" cy="338554"/>
+            <a:off x="404775" y="4333658"/>
+            <a:ext cx="1033321" cy="830997"/>
           </a:xfrm>
           <a:prstGeom prst="rect">
             <a:avLst/>
@@ -4940,20 +4913,24 @@
           </a:bodyPr>
           <a:lstStyle/>
           <a:p>
+            <a:pPr algn="ctr"/>
             <a:r>
               <a:rPr lang="pt-BR" sz="1600" b="1" dirty="0" err="1"/>
               <a:t>QRCode</a:t>
             </a:r>
-            <a:endParaRPr lang="pt-BR" sz="1600" b="1" dirty="0"/>
+            <a:r>
+              <a:rPr lang="pt-BR" sz="1600" b="1" dirty="0"/>
+              <a:t> para feedback</a:t>
+            </a:r>
           </a:p>
         </p:txBody>
       </p:sp>
       <p:pic>
         <p:nvPicPr>
-          <p:cNvPr id="1040" name="Picture 16" descr="Team">
-            <a:extLst>
-              <a:ext uri="{FF2B5EF4-FFF2-40B4-BE49-F238E27FC236}">
-                <a16:creationId xmlns:a16="http://schemas.microsoft.com/office/drawing/2014/main" id="{612A93BF-BD56-4FA4-9A52-C4534EABD50E}"/>
+          <p:cNvPr id="78" name="Picture 32" descr="conteúdo da tabela">
+            <a:extLst>
+              <a:ext uri="{FF2B5EF4-FFF2-40B4-BE49-F238E27FC236}">
+                <a16:creationId xmlns:a16="http://schemas.microsoft.com/office/drawing/2014/main" id="{6C5EB986-C435-4B34-A193-0E6722F6EAF5}"/>
               </a:ext>
             </a:extLst>
           </p:cNvPr>
@@ -4977,8 +4954,8 @@
         </p:blipFill>
         <p:spPr bwMode="auto">
           <a:xfrm>
-            <a:off x="8711436" y="3697113"/>
-            <a:ext cx="1098777" cy="1098777"/>
+            <a:off x="9373434" y="3795432"/>
+            <a:ext cx="1140656" cy="1140656"/>
           </a:xfrm>
           <a:prstGeom prst="rect">
             <a:avLst/>
@@ -4995,53 +4972,6 @@
           </a:extLst>
         </p:spPr>
       </p:pic>
-      <p:pic>
-        <p:nvPicPr>
-          <p:cNvPr id="78" name="Picture 32" descr="conteúdo da tabela">
-            <a:extLst>
-              <a:ext uri="{FF2B5EF4-FFF2-40B4-BE49-F238E27FC236}">
-                <a16:creationId xmlns:a16="http://schemas.microsoft.com/office/drawing/2014/main" id="{6C5EB986-C435-4B34-A193-0E6722F6EAF5}"/>
-              </a:ext>
-            </a:extLst>
-          </p:cNvPr>
-          <p:cNvPicPr>
-            <a:picLocks noChangeAspect="1" noChangeArrowheads="1"/>
-          </p:cNvPicPr>
-          <p:nvPr/>
-        </p:nvPicPr>
-        <p:blipFill>
-          <a:blip r:embed="rId18">
-            <a:extLst>
-              <a:ext uri="{28A0092B-C50C-407E-A947-70E740481C1C}">
-                <a14:useLocalDpi xmlns:a14="http://schemas.microsoft.com/office/drawing/2010/main" val="0"/>
-              </a:ext>
-            </a:extLst>
-          </a:blip>
-          <a:srcRect/>
-          <a:stretch>
-            <a:fillRect/>
-          </a:stretch>
-        </p:blipFill>
-        <p:spPr bwMode="auto">
-          <a:xfrm>
-            <a:off x="10378004" y="4315326"/>
-            <a:ext cx="1140656" cy="1140656"/>
-          </a:xfrm>
-          <a:prstGeom prst="rect">
-            <a:avLst/>
-          </a:prstGeom>
-          <a:noFill/>
-          <a:extLst>
-            <a:ext uri="{909E8E84-426E-40DD-AFC4-6F175D3DCCD1}">
-              <a14:hiddenFill xmlns:a14="http://schemas.microsoft.com/office/drawing/2010/main">
-                <a:solidFill>
-                  <a:srgbClr val="FFFFFF"/>
-                </a:solidFill>
-              </a14:hiddenFill>
-            </a:ext>
-          </a:extLst>
-        </p:spPr>
-      </p:pic>
       <p:sp>
         <p:nvSpPr>
           <p:cNvPr id="79" name="Retângulo: Cantos Arredondados 78">
@@ -5056,8 +4986,8 @@
         </p:nvSpPr>
         <p:spPr>
           <a:xfrm>
-            <a:off x="8421369" y="3460080"/>
-            <a:ext cx="3351029" cy="2634102"/>
+            <a:off x="7785819" y="3468967"/>
+            <a:ext cx="3986580" cy="2765745"/>
           </a:xfrm>
           <a:prstGeom prst="roundRect">
             <a:avLst>
@@ -5134,7 +5064,7 @@
         </p:blipFill>
         <p:spPr bwMode="auto">
           <a:xfrm>
-            <a:off x="11468343" y="3113769"/>
+            <a:off x="11513231" y="3180619"/>
             <a:ext cx="496761" cy="496761"/>
           </a:xfrm>
           <a:prstGeom prst="rect">
@@ -5166,7 +5096,7 @@
         </p:nvSpPr>
         <p:spPr>
           <a:xfrm>
-            <a:off x="10278836" y="5346847"/>
+            <a:off x="9277999" y="4885111"/>
             <a:ext cx="1331526" cy="584775"/>
           </a:xfrm>
           <a:prstGeom prst="rect">
@@ -5190,10 +5120,10 @@
       </p:sp>
       <p:sp>
         <p:nvSpPr>
-          <p:cNvPr id="47" name="CaixaDeTexto 46">
-            <a:extLst>
-              <a:ext uri="{FF2B5EF4-FFF2-40B4-BE49-F238E27FC236}">
-                <a16:creationId xmlns:a16="http://schemas.microsoft.com/office/drawing/2014/main" id="{2D7AFBA1-1899-43FF-83C9-1C80E27E1C98}"/>
+          <p:cNvPr id="48" name="CaixaDeTexto 47">
+            <a:extLst>
+              <a:ext uri="{FF2B5EF4-FFF2-40B4-BE49-F238E27FC236}">
+                <a16:creationId xmlns:a16="http://schemas.microsoft.com/office/drawing/2014/main" id="{1B5CD71B-F9FD-4F0D-B489-8ED23AA7BA0A}"/>
               </a:ext>
             </a:extLst>
           </p:cNvPr>
@@ -5202,8 +5132,8 @@
         </p:nvSpPr>
         <p:spPr>
           <a:xfrm>
-            <a:off x="6037254" y="5576868"/>
-            <a:ext cx="607008" cy="338554"/>
+            <a:off x="4367137" y="4846727"/>
+            <a:ext cx="1172272" cy="830997"/>
           </a:xfrm>
           <a:prstGeom prst="rect">
             <a:avLst/>
@@ -5216,54 +5146,34 @@
           </a:bodyPr>
           <a:lstStyle/>
           <a:p>
-            <a:r>
-              <a:rPr lang="pt-BR" sz="1600" b="1" dirty="0"/>
-              <a:t>Java</a:t>
-            </a:r>
-          </a:p>
-        </p:txBody>
-      </p:sp>
-      <p:sp>
-        <p:nvSpPr>
-          <p:cNvPr id="48" name="CaixaDeTexto 47">
-            <a:extLst>
-              <a:ext uri="{FF2B5EF4-FFF2-40B4-BE49-F238E27FC236}">
-                <a16:creationId xmlns:a16="http://schemas.microsoft.com/office/drawing/2014/main" id="{1B5CD71B-F9FD-4F0D-B489-8ED23AA7BA0A}"/>
-              </a:ext>
-            </a:extLst>
-          </p:cNvPr>
-          <p:cNvSpPr txBox="1"/>
-          <p:nvPr/>
-        </p:nvSpPr>
-        <p:spPr>
-          <a:xfrm>
-            <a:off x="4673566" y="4746546"/>
-            <a:ext cx="1172272" cy="338554"/>
-          </a:xfrm>
-          <a:prstGeom prst="rect">
-            <a:avLst/>
-          </a:prstGeom>
-          <a:noFill/>
-        </p:spPr>
-        <p:txBody>
-          <a:bodyPr wrap="square" rtlCol="0">
-            <a:spAutoFit/>
-          </a:bodyPr>
-          <a:lstStyle/>
-          <a:p>
+            <a:pPr algn="ctr"/>
             <a:r>
               <a:rPr lang="pt-BR" sz="1600" b="1" dirty="0"/>
               <a:t>Dashboard</a:t>
             </a:r>
+            <a:br>
+              <a:rPr lang="pt-BR" sz="1600" b="1" dirty="0"/>
+            </a:br>
+            <a:r>
+              <a:rPr lang="pt-BR" sz="1600" b="1" dirty="0"/>
+              <a:t>Métricas</a:t>
+            </a:r>
+            <a:br>
+              <a:rPr lang="pt-BR" sz="1600" b="1" dirty="0"/>
+            </a:br>
+            <a:r>
+              <a:rPr lang="pt-BR" sz="1600" b="1" dirty="0"/>
+              <a:t>Alertas</a:t>
+            </a:r>
           </a:p>
         </p:txBody>
       </p:sp>
       <p:pic>
         <p:nvPicPr>
-          <p:cNvPr id="2" name="Picture 2" descr="Sql server free icon">
-            <a:extLst>
-              <a:ext uri="{FF2B5EF4-FFF2-40B4-BE49-F238E27FC236}">
-                <a16:creationId xmlns:a16="http://schemas.microsoft.com/office/drawing/2014/main" id="{0850E74B-EEBC-45FC-B8D1-A3EE8FBF8301}"/>
+          <p:cNvPr id="1040" name="Picture 16" descr="Team">
+            <a:extLst>
+              <a:ext uri="{FF2B5EF4-FFF2-40B4-BE49-F238E27FC236}">
+                <a16:creationId xmlns:a16="http://schemas.microsoft.com/office/drawing/2014/main" id="{612A93BF-BD56-4FA4-9A52-C4534EABD50E}"/>
               </a:ext>
             </a:extLst>
           </p:cNvPr>
@@ -5273,7 +5183,7 @@
           <p:nvPr/>
         </p:nvPicPr>
         <p:blipFill>
-          <a:blip r:embed="rId19">
+          <a:blip r:embed="rId18">
             <a:extLst>
               <a:ext uri="{28A0092B-C50C-407E-A947-70E740481C1C}">
                 <a14:useLocalDpi xmlns:a14="http://schemas.microsoft.com/office/drawing/2010/main" val="0"/>
@@ -5287,8 +5197,8 @@
         </p:blipFill>
         <p:spPr bwMode="auto">
           <a:xfrm>
-            <a:off x="6426421" y="1711608"/>
-            <a:ext cx="894094" cy="894094"/>
+            <a:off x="7304711" y="2962642"/>
+            <a:ext cx="1098777" cy="1098777"/>
           </a:xfrm>
           <a:prstGeom prst="rect">
             <a:avLst/>
@@ -5305,6 +5215,53 @@
           </a:extLst>
         </p:spPr>
       </p:pic>
+      <p:pic>
+        <p:nvPicPr>
+          <p:cNvPr id="2" name="Picture 2" descr="Sql server free icon">
+            <a:extLst>
+              <a:ext uri="{FF2B5EF4-FFF2-40B4-BE49-F238E27FC236}">
+                <a16:creationId xmlns:a16="http://schemas.microsoft.com/office/drawing/2014/main" id="{0850E74B-EEBC-45FC-B8D1-A3EE8FBF8301}"/>
+              </a:ext>
+            </a:extLst>
+          </p:cNvPr>
+          <p:cNvPicPr>
+            <a:picLocks noChangeAspect="1" noChangeArrowheads="1"/>
+          </p:cNvPicPr>
+          <p:nvPr/>
+        </p:nvPicPr>
+        <p:blipFill>
+          <a:blip r:embed="rId19">
+            <a:extLst>
+              <a:ext uri="{28A0092B-C50C-407E-A947-70E740481C1C}">
+                <a14:useLocalDpi xmlns:a14="http://schemas.microsoft.com/office/drawing/2010/main" val="0"/>
+              </a:ext>
+            </a:extLst>
+          </a:blip>
+          <a:srcRect/>
+          <a:stretch>
+            <a:fillRect/>
+          </a:stretch>
+        </p:blipFill>
+        <p:spPr bwMode="auto">
+          <a:xfrm>
+            <a:off x="6426421" y="1711608"/>
+            <a:ext cx="894094" cy="894094"/>
+          </a:xfrm>
+          <a:prstGeom prst="rect">
+            <a:avLst/>
+          </a:prstGeom>
+          <a:noFill/>
+          <a:extLst>
+            <a:ext uri="{909E8E84-426E-40DD-AFC4-6F175D3DCCD1}">
+              <a14:hiddenFill xmlns:a14="http://schemas.microsoft.com/office/drawing/2010/main">
+                <a:solidFill>
+                  <a:srgbClr val="FFFFFF"/>
+                </a:solidFill>
+              </a14:hiddenFill>
+            </a:ext>
+          </a:extLst>
+        </p:spPr>
+      </p:pic>
       <p:cxnSp>
         <p:nvCxnSpPr>
           <p:cNvPr id="84" name="Conector: Curvo 83">
@@ -5323,8 +5280,8 @@
         </p:nvCxnSpPr>
         <p:spPr>
           <a:xfrm rot="16200000" flipV="1">
-            <a:off x="8056089" y="1423082"/>
-            <a:ext cx="2156671" cy="3627817"/>
+            <a:off x="7813751" y="1665420"/>
+            <a:ext cx="1636777" cy="2623247"/>
           </a:xfrm>
           <a:prstGeom prst="curvedConnector2">
             <a:avLst/>
@@ -5374,8 +5331,8 @@
         </p:nvCxnSpPr>
         <p:spPr>
           <a:xfrm rot="16200000" flipH="1">
-            <a:off x="4198059" y="-69708"/>
-            <a:ext cx="247273" cy="4209451"/>
+            <a:off x="4156544" y="-111222"/>
+            <a:ext cx="318274" cy="4221479"/>
           </a:xfrm>
           <a:prstGeom prst="curvedConnector2">
             <a:avLst/>
@@ -5406,6 +5363,219 @@
           </a:fontRef>
         </p:style>
       </p:cxnSp>
+      <p:pic>
+        <p:nvPicPr>
+          <p:cNvPr id="3" name="Picture 2" descr="Docker free icon">
+            <a:extLst>
+              <a:ext uri="{FF2B5EF4-FFF2-40B4-BE49-F238E27FC236}">
+                <a16:creationId xmlns:a16="http://schemas.microsoft.com/office/drawing/2014/main" id="{1EDE2691-7575-4053-A262-553097E9E6D2}"/>
+              </a:ext>
+            </a:extLst>
+          </p:cNvPr>
+          <p:cNvPicPr>
+            <a:picLocks noChangeAspect="1" noChangeArrowheads="1"/>
+          </p:cNvPicPr>
+          <p:nvPr/>
+        </p:nvPicPr>
+        <p:blipFill>
+          <a:blip r:embed="rId20">
+            <a:extLst>
+              <a:ext uri="{28A0092B-C50C-407E-A947-70E740481C1C}">
+                <a14:useLocalDpi xmlns:a14="http://schemas.microsoft.com/office/drawing/2010/main" val="0"/>
+              </a:ext>
+            </a:extLst>
+          </a:blip>
+          <a:srcRect/>
+          <a:stretch>
+            <a:fillRect/>
+          </a:stretch>
+        </p:blipFill>
+        <p:spPr bwMode="auto">
+          <a:xfrm>
+            <a:off x="1144723" y="1568627"/>
+            <a:ext cx="606131" cy="606131"/>
+          </a:xfrm>
+          <a:prstGeom prst="rect">
+            <a:avLst/>
+          </a:prstGeom>
+          <a:noFill/>
+          <a:extLst>
+            <a:ext uri="{909E8E84-426E-40DD-AFC4-6F175D3DCCD1}">
+              <a14:hiddenFill xmlns:a14="http://schemas.microsoft.com/office/drawing/2010/main">
+                <a:solidFill>
+                  <a:srgbClr val="FFFFFF"/>
+                </a:solidFill>
+              </a14:hiddenFill>
+            </a:ext>
+          </a:extLst>
+        </p:spPr>
+      </p:pic>
+      <p:pic>
+        <p:nvPicPr>
+          <p:cNvPr id="17" name="Picture 4" descr="Note free icon">
+            <a:extLst>
+              <a:ext uri="{FF2B5EF4-FFF2-40B4-BE49-F238E27FC236}">
+                <a16:creationId xmlns:a16="http://schemas.microsoft.com/office/drawing/2014/main" id="{1F02AF9C-D287-4023-8CF5-C2B632DCBCE6}"/>
+              </a:ext>
+            </a:extLst>
+          </p:cNvPr>
+          <p:cNvPicPr>
+            <a:picLocks noChangeAspect="1" noChangeArrowheads="1"/>
+          </p:cNvPicPr>
+          <p:nvPr/>
+        </p:nvPicPr>
+        <p:blipFill>
+          <a:blip r:embed="rId21">
+            <a:extLst>
+              <a:ext uri="{28A0092B-C50C-407E-A947-70E740481C1C}">
+                <a14:useLocalDpi xmlns:a14="http://schemas.microsoft.com/office/drawing/2010/main" val="0"/>
+              </a:ext>
+            </a:extLst>
+          </a:blip>
+          <a:srcRect/>
+          <a:stretch>
+            <a:fillRect/>
+          </a:stretch>
+        </p:blipFill>
+        <p:spPr bwMode="auto">
+          <a:xfrm>
+            <a:off x="8206760" y="4299233"/>
+            <a:ext cx="936238" cy="936238"/>
+          </a:xfrm>
+          <a:prstGeom prst="rect">
+            <a:avLst/>
+          </a:prstGeom>
+          <a:noFill/>
+          <a:extLst>
+            <a:ext uri="{909E8E84-426E-40DD-AFC4-6F175D3DCCD1}">
+              <a14:hiddenFill xmlns:a14="http://schemas.microsoft.com/office/drawing/2010/main">
+                <a:solidFill>
+                  <a:srgbClr val="FFFFFF"/>
+                </a:solidFill>
+              </a14:hiddenFill>
+            </a:ext>
+          </a:extLst>
+        </p:spPr>
+      </p:pic>
+      <p:sp>
+        <p:nvSpPr>
+          <p:cNvPr id="57" name="CaixaDeTexto 56">
+            <a:extLst>
+              <a:ext uri="{FF2B5EF4-FFF2-40B4-BE49-F238E27FC236}">
+                <a16:creationId xmlns:a16="http://schemas.microsoft.com/office/drawing/2014/main" id="{9130BADB-3A5B-4537-AB97-EB2FA57D822E}"/>
+              </a:ext>
+            </a:extLst>
+          </p:cNvPr>
+          <p:cNvSpPr txBox="1"/>
+          <p:nvPr/>
+        </p:nvSpPr>
+        <p:spPr>
+          <a:xfrm>
+            <a:off x="7961328" y="5218488"/>
+            <a:ext cx="1228607" cy="584775"/>
+          </a:xfrm>
+          <a:prstGeom prst="rect">
+            <a:avLst/>
+          </a:prstGeom>
+          <a:noFill/>
+        </p:spPr>
+        <p:txBody>
+          <a:bodyPr wrap="square" rtlCol="0">
+            <a:spAutoFit/>
+          </a:bodyPr>
+          <a:lstStyle/>
+          <a:p>
+            <a:pPr algn="ctr"/>
+            <a:r>
+              <a:rPr lang="pt-BR" sz="1600" b="1" dirty="0"/>
+              <a:t>Relatórios de máquina</a:t>
+            </a:r>
+          </a:p>
+        </p:txBody>
+      </p:sp>
+      <p:pic>
+        <p:nvPicPr>
+          <p:cNvPr id="32" name="Picture 6" descr="Review">
+            <a:extLst>
+              <a:ext uri="{FF2B5EF4-FFF2-40B4-BE49-F238E27FC236}">
+                <a16:creationId xmlns:a16="http://schemas.microsoft.com/office/drawing/2014/main" id="{ED851386-01DE-4675-B036-D2B86DAA7E2A}"/>
+              </a:ext>
+            </a:extLst>
+          </p:cNvPr>
+          <p:cNvPicPr>
+            <a:picLocks noChangeAspect="1" noChangeArrowheads="1"/>
+          </p:cNvPicPr>
+          <p:nvPr/>
+        </p:nvPicPr>
+        <p:blipFill>
+          <a:blip r:embed="rId22">
+            <a:extLst>
+              <a:ext uri="{28A0092B-C50C-407E-A947-70E740481C1C}">
+                <a14:useLocalDpi xmlns:a14="http://schemas.microsoft.com/office/drawing/2010/main" val="0"/>
+              </a:ext>
+            </a:extLst>
+          </a:blip>
+          <a:srcRect/>
+          <a:stretch>
+            <a:fillRect/>
+          </a:stretch>
+        </p:blipFill>
+        <p:spPr bwMode="auto">
+          <a:xfrm>
+            <a:off x="10614839" y="4790771"/>
+            <a:ext cx="936238" cy="936238"/>
+          </a:xfrm>
+          <a:prstGeom prst="rect">
+            <a:avLst/>
+          </a:prstGeom>
+          <a:noFill/>
+          <a:extLst>
+            <a:ext uri="{909E8E84-426E-40DD-AFC4-6F175D3DCCD1}">
+              <a14:hiddenFill xmlns:a14="http://schemas.microsoft.com/office/drawing/2010/main">
+                <a:solidFill>
+                  <a:srgbClr val="FFFFFF"/>
+                </a:solidFill>
+              </a14:hiddenFill>
+            </a:ext>
+          </a:extLst>
+        </p:spPr>
+      </p:pic>
+      <p:sp>
+        <p:nvSpPr>
+          <p:cNvPr id="90" name="CaixaDeTexto 89">
+            <a:extLst>
+              <a:ext uri="{FF2B5EF4-FFF2-40B4-BE49-F238E27FC236}">
+                <a16:creationId xmlns:a16="http://schemas.microsoft.com/office/drawing/2014/main" id="{16900325-36DC-467F-8639-387AAEAD266D}"/>
+              </a:ext>
+            </a:extLst>
+          </p:cNvPr>
+          <p:cNvSpPr txBox="1"/>
+          <p:nvPr/>
+        </p:nvSpPr>
+        <p:spPr>
+          <a:xfrm>
+            <a:off x="10440347" y="5735133"/>
+            <a:ext cx="1228607" cy="338554"/>
+          </a:xfrm>
+          <a:prstGeom prst="rect">
+            <a:avLst/>
+          </a:prstGeom>
+          <a:noFill/>
+        </p:spPr>
+        <p:txBody>
+          <a:bodyPr wrap="square" rtlCol="0">
+            <a:spAutoFit/>
+          </a:bodyPr>
+          <a:lstStyle/>
+          <a:p>
+            <a:pPr algn="ctr"/>
+            <a:r>
+              <a:rPr lang="pt-BR" sz="1600" b="1" dirty="0"/>
+              <a:t>Feedbacks</a:t>
+            </a:r>
+          </a:p>
+        </p:txBody>
+      </p:sp>
     </p:spTree>
     <p:extLst>
       <p:ext uri="{BB962C8B-B14F-4D97-AF65-F5344CB8AC3E}">

</xml_diff>